<commit_message>
Fat update to Phase 2
</commit_message>
<xml_diff>
--- a/Phase 2 - Writing down the details.pptx
+++ b/Phase 2 - Writing down the details.pptx
@@ -8,19 +8,20 @@
     <p:sldId id="271" r:id="rId2"/>
     <p:sldId id="272" r:id="rId3"/>
     <p:sldId id="259" r:id="rId4"/>
-    <p:sldId id="262" r:id="rId5"/>
-    <p:sldId id="258" r:id="rId6"/>
-    <p:sldId id="265" r:id="rId7"/>
-    <p:sldId id="266" r:id="rId8"/>
-    <p:sldId id="260" r:id="rId9"/>
-    <p:sldId id="261" r:id="rId10"/>
-    <p:sldId id="263" r:id="rId11"/>
-    <p:sldId id="264" r:id="rId12"/>
-    <p:sldId id="267" r:id="rId13"/>
-    <p:sldId id="268" r:id="rId14"/>
-    <p:sldId id="257" r:id="rId15"/>
-    <p:sldId id="269" r:id="rId16"/>
-    <p:sldId id="270" r:id="rId17"/>
+    <p:sldId id="258" r:id="rId5"/>
+    <p:sldId id="265" r:id="rId6"/>
+    <p:sldId id="266" r:id="rId7"/>
+    <p:sldId id="260" r:id="rId8"/>
+    <p:sldId id="261" r:id="rId9"/>
+    <p:sldId id="263" r:id="rId10"/>
+    <p:sldId id="264" r:id="rId11"/>
+    <p:sldId id="273" r:id="rId12"/>
+    <p:sldId id="262" r:id="rId13"/>
+    <p:sldId id="267" r:id="rId14"/>
+    <p:sldId id="268" r:id="rId15"/>
+    <p:sldId id="257" r:id="rId16"/>
+    <p:sldId id="269" r:id="rId17"/>
+    <p:sldId id="270" r:id="rId18"/>
   </p:sldIdLst>
   <p:sldSz cx="12192000" cy="6858000"/>
   <p:notesSz cx="6858000" cy="9144000"/>
@@ -127,7 +128,6 @@
             <p14:sldId id="271"/>
             <p14:sldId id="272"/>
             <p14:sldId id="259"/>
-            <p14:sldId id="262"/>
             <p14:sldId id="258"/>
             <p14:sldId id="265"/>
             <p14:sldId id="266"/>
@@ -135,6 +135,8 @@
             <p14:sldId id="261"/>
             <p14:sldId id="263"/>
             <p14:sldId id="264"/>
+            <p14:sldId id="273"/>
+            <p14:sldId id="262"/>
             <p14:sldId id="267"/>
             <p14:sldId id="268"/>
             <p14:sldId id="257"/>
@@ -143,6 +145,9 @@
           </p14:sldIdLst>
         </p14:section>
       </p14:sectionLst>
+    </p:ext>
+    <p:ext uri="{EFAFB233-063F-42B5-8137-9DF3F51BA10A}">
+      <p15:sldGuideLst xmlns:p15="http://schemas.microsoft.com/office/powerpoint/2012/main"/>
     </p:ext>
   </p:extLst>
 </p:presentation>
@@ -297,7 +302,7 @@
           <a:p>
             <a:fld id="{F1B00FCE-A7A8-443A-ABD2-F1E5E91ABEB0}" type="datetimeFigureOut">
               <a:rPr lang="sv-SE" smtClean="0"/>
-              <a:t>2019-01-30</a:t>
+              <a:t>2019-02-03</a:t>
             </a:fld>
             <a:endParaRPr lang="sv-SE"/>
           </a:p>
@@ -497,7 +502,7 @@
           <a:p>
             <a:fld id="{F1B00FCE-A7A8-443A-ABD2-F1E5E91ABEB0}" type="datetimeFigureOut">
               <a:rPr lang="sv-SE" smtClean="0"/>
-              <a:t>2019-01-30</a:t>
+              <a:t>2019-02-03</a:t>
             </a:fld>
             <a:endParaRPr lang="sv-SE"/>
           </a:p>
@@ -707,7 +712,7 @@
           <a:p>
             <a:fld id="{F1B00FCE-A7A8-443A-ABD2-F1E5E91ABEB0}" type="datetimeFigureOut">
               <a:rPr lang="sv-SE" smtClean="0"/>
-              <a:t>2019-01-30</a:t>
+              <a:t>2019-02-03</a:t>
             </a:fld>
             <a:endParaRPr lang="sv-SE"/>
           </a:p>
@@ -907,7 +912,7 @@
           <a:p>
             <a:fld id="{F1B00FCE-A7A8-443A-ABD2-F1E5E91ABEB0}" type="datetimeFigureOut">
               <a:rPr lang="sv-SE" smtClean="0"/>
-              <a:t>2019-01-30</a:t>
+              <a:t>2019-02-03</a:t>
             </a:fld>
             <a:endParaRPr lang="sv-SE"/>
           </a:p>
@@ -1183,7 +1188,7 @@
           <a:p>
             <a:fld id="{F1B00FCE-A7A8-443A-ABD2-F1E5E91ABEB0}" type="datetimeFigureOut">
               <a:rPr lang="sv-SE" smtClean="0"/>
-              <a:t>2019-01-30</a:t>
+              <a:t>2019-02-03</a:t>
             </a:fld>
             <a:endParaRPr lang="sv-SE"/>
           </a:p>
@@ -1451,7 +1456,7 @@
           <a:p>
             <a:fld id="{F1B00FCE-A7A8-443A-ABD2-F1E5E91ABEB0}" type="datetimeFigureOut">
               <a:rPr lang="sv-SE" smtClean="0"/>
-              <a:t>2019-01-30</a:t>
+              <a:t>2019-02-03</a:t>
             </a:fld>
             <a:endParaRPr lang="sv-SE"/>
           </a:p>
@@ -1866,7 +1871,7 @@
           <a:p>
             <a:fld id="{F1B00FCE-A7A8-443A-ABD2-F1E5E91ABEB0}" type="datetimeFigureOut">
               <a:rPr lang="sv-SE" smtClean="0"/>
-              <a:t>2019-01-30</a:t>
+              <a:t>2019-02-03</a:t>
             </a:fld>
             <a:endParaRPr lang="sv-SE"/>
           </a:p>
@@ -2008,7 +2013,7 @@
           <a:p>
             <a:fld id="{F1B00FCE-A7A8-443A-ABD2-F1E5E91ABEB0}" type="datetimeFigureOut">
               <a:rPr lang="sv-SE" smtClean="0"/>
-              <a:t>2019-01-30</a:t>
+              <a:t>2019-02-03</a:t>
             </a:fld>
             <a:endParaRPr lang="sv-SE"/>
           </a:p>
@@ -2121,7 +2126,7 @@
           <a:p>
             <a:fld id="{F1B00FCE-A7A8-443A-ABD2-F1E5E91ABEB0}" type="datetimeFigureOut">
               <a:rPr lang="sv-SE" smtClean="0"/>
-              <a:t>2019-01-30</a:t>
+              <a:t>2019-02-03</a:t>
             </a:fld>
             <a:endParaRPr lang="sv-SE"/>
           </a:p>
@@ -2434,7 +2439,7 @@
           <a:p>
             <a:fld id="{F1B00FCE-A7A8-443A-ABD2-F1E5E91ABEB0}" type="datetimeFigureOut">
               <a:rPr lang="sv-SE" smtClean="0"/>
-              <a:t>2019-01-30</a:t>
+              <a:t>2019-02-03</a:t>
             </a:fld>
             <a:endParaRPr lang="sv-SE"/>
           </a:p>
@@ -2723,7 +2728,7 @@
           <a:p>
             <a:fld id="{F1B00FCE-A7A8-443A-ABD2-F1E5E91ABEB0}" type="datetimeFigureOut">
               <a:rPr lang="sv-SE" smtClean="0"/>
-              <a:t>2019-01-30</a:t>
+              <a:t>2019-02-03</a:t>
             </a:fld>
             <a:endParaRPr lang="sv-SE"/>
           </a:p>
@@ -2966,7 +2971,7 @@
           <a:p>
             <a:fld id="{F1B00FCE-A7A8-443A-ABD2-F1E5E91ABEB0}" type="datetimeFigureOut">
               <a:rPr lang="sv-SE" smtClean="0"/>
-              <a:t>2019-01-30</a:t>
+              <a:t>2019-02-03</a:t>
             </a:fld>
             <a:endParaRPr lang="sv-SE"/>
           </a:p>
@@ -3438,14 +3443,19 @@
             <p:ph type="subTitle" idx="1"/>
           </p:nvPr>
         </p:nvSpPr>
-        <p:spPr/>
-        <p:txBody>
-          <a:bodyPr/>
-          <a:lstStyle/>
-          <a:p>
-            <a:r>
-              <a:rPr lang="en-US" dirty="0"/>
-              <a:t>[One-liner]</a:t>
+        <p:spPr>
+          <a:xfrm>
+            <a:off x="1524000" y="3681169"/>
+            <a:ext cx="9144000" cy="1655762"/>
+          </a:xfrm>
+        </p:spPr>
+        <p:txBody>
+          <a:bodyPr/>
+          <a:lstStyle/>
+          <a:p>
+            <a:r>
+              <a:rPr lang="en-US" dirty="0"/>
+              <a:t>A competitive arena fighter where you have no choice but to count on your teammates!</a:t>
             </a:r>
             <a:endParaRPr lang="sv-SE" dirty="0"/>
           </a:p>
@@ -3486,7 +3496,7 @@
           <p:cNvPr id="2" name="Title 1">
             <a:extLst>
               <a:ext uri="{FF2B5EF4-FFF2-40B4-BE49-F238E27FC236}">
-                <a16:creationId xmlns:a16="http://schemas.microsoft.com/office/drawing/2014/main" id="{F4E20C1F-394D-4922-B19D-B191F4E87485}"/>
+                <a16:creationId xmlns:a16="http://schemas.microsoft.com/office/drawing/2014/main" id="{79E7E43D-7011-4E4E-9031-9670BBF74801}"/>
               </a:ext>
             </a:extLst>
           </p:cNvPr>
@@ -3504,74 +3514,100 @@
           <a:p>
             <a:r>
               <a:rPr lang="en-US" dirty="0"/>
-              <a:t>Character 2 </a:t>
+              <a:t>Character 3</a:t>
             </a:r>
             <a:br>
               <a:rPr lang="en-US" dirty="0"/>
             </a:br>
             <a:r>
               <a:rPr lang="en-US" dirty="0"/>
-              <a:t> - Settler - </a:t>
+              <a:t>- Smasher -</a:t>
             </a:r>
             <a:endParaRPr lang="sv-SE" dirty="0"/>
           </a:p>
         </p:txBody>
       </p:sp>
-      <p:sp>
-        <p:nvSpPr>
-          <p:cNvPr id="3" name="Content Placeholder 2">
-            <a:extLst>
-              <a:ext uri="{FF2B5EF4-FFF2-40B4-BE49-F238E27FC236}">
-                <a16:creationId xmlns:a16="http://schemas.microsoft.com/office/drawing/2014/main" id="{46DF82BD-E600-4392-A6D5-3665FB5EF7C4}"/>
-              </a:ext>
-            </a:extLst>
-          </p:cNvPr>
-          <p:cNvSpPr>
-            <a:spLocks noGrp="1"/>
-          </p:cNvSpPr>
+      <p:pic>
+        <p:nvPicPr>
+          <p:cNvPr id="6" name="Content Placeholder 5">
+            <a:extLst>
+              <a:ext uri="{FF2B5EF4-FFF2-40B4-BE49-F238E27FC236}">
+                <a16:creationId xmlns:a16="http://schemas.microsoft.com/office/drawing/2014/main" id="{88FDE3FE-F641-46EE-BC78-7C6C0192BBE9}"/>
+              </a:ext>
+            </a:extLst>
+          </p:cNvPr>
+          <p:cNvPicPr>
+            <a:picLocks noGrp="1" noChangeAspect="1"/>
+          </p:cNvPicPr>
           <p:nvPr>
             <p:ph idx="1"/>
           </p:nvPr>
+        </p:nvPicPr>
+        <p:blipFill>
+          <a:blip r:embed="rId2">
+            <a:extLst>
+              <a:ext uri="{28A0092B-C50C-407E-A947-70E740481C1C}">
+                <a14:useLocalDpi xmlns:a14="http://schemas.microsoft.com/office/drawing/2010/main" val="0"/>
+              </a:ext>
+            </a:extLst>
+          </a:blip>
+          <a:stretch>
+            <a:fillRect/>
+          </a:stretch>
+        </p:blipFill>
+        <p:spPr>
+          <a:xfrm>
+            <a:off x="6777574" y="1271540"/>
+            <a:ext cx="2983428" cy="4305396"/>
+          </a:xfrm>
+        </p:spPr>
+      </p:pic>
+      <p:sp>
+        <p:nvSpPr>
+          <p:cNvPr id="4" name="Text Placeholder 3">
+            <a:extLst>
+              <a:ext uri="{FF2B5EF4-FFF2-40B4-BE49-F238E27FC236}">
+                <a16:creationId xmlns:a16="http://schemas.microsoft.com/office/drawing/2014/main" id="{D8948BD0-BBCD-461E-B20E-5B53D5D2B27F}"/>
+              </a:ext>
+            </a:extLst>
+          </p:cNvPr>
+          <p:cNvSpPr>
+            <a:spLocks noGrp="1"/>
+          </p:cNvSpPr>
+          <p:nvPr>
+            <p:ph type="body" sz="half" idx="2"/>
+          </p:nvPr>
         </p:nvSpPr>
         <p:spPr/>
         <p:txBody>
           <a:bodyPr/>
           <a:lstStyle/>
           <a:p>
-            <a:endParaRPr lang="sv-SE"/>
-          </a:p>
-        </p:txBody>
-      </p:sp>
-      <p:sp>
-        <p:nvSpPr>
-          <p:cNvPr id="4" name="Text Placeholder 3">
-            <a:extLst>
-              <a:ext uri="{FF2B5EF4-FFF2-40B4-BE49-F238E27FC236}">
-                <a16:creationId xmlns:a16="http://schemas.microsoft.com/office/drawing/2014/main" id="{91380255-BE25-4334-8E4F-5704D6CE5EFD}"/>
-              </a:ext>
-            </a:extLst>
-          </p:cNvPr>
-          <p:cNvSpPr>
-            <a:spLocks noGrp="1"/>
-          </p:cNvSpPr>
-          <p:nvPr>
-            <p:ph type="body" sz="half" idx="2"/>
-          </p:nvPr>
-        </p:nvSpPr>
-        <p:spPr/>
-        <p:txBody>
-          <a:bodyPr/>
-          <a:lstStyle/>
-          <a:p>
-            <a:r>
-              <a:rPr lang="en-US" dirty="0"/>
-              <a:t>Has the ability to ping target location to grant the Smasher vision over that area</a:t>
-            </a:r>
-          </a:p>
-          <a:p>
-            <a:r>
-              <a:rPr lang="en-US" dirty="0"/>
-              <a:t>Has the ability to drag enemies in an area together into one spot </a:t>
+            <a:r>
+              <a:rPr lang="en-US" dirty="0"/>
+              <a:t>Gets warned when pinged by enemy settler.</a:t>
+            </a:r>
+          </a:p>
+          <a:p>
+            <a:r>
+              <a:rPr lang="en-US" b="1" dirty="0"/>
+              <a:t>Primary Ability (Smash): </a:t>
+            </a:r>
+            <a:r>
+              <a:rPr lang="en-US" dirty="0"/>
+              <a:t>Shoots out an energy orb in target direction. By pressing the ability button again a lighting will strike and reduce team spirit based on amount of targets hit. </a:t>
+            </a:r>
+          </a:p>
+          <a:p>
+            <a:r>
+              <a:rPr lang="en-US" dirty="0"/>
+              <a:t>Or</a:t>
+            </a:r>
+          </a:p>
+          <a:p>
+            <a:r>
+              <a:rPr lang="en-US" dirty="0"/>
+              <a:t>Lobs a projectile by holding down ability button to increase distance traveled. </a:t>
             </a:r>
           </a:p>
           <a:p>
@@ -3582,7 +3618,7 @@
     </p:spTree>
     <p:extLst>
       <p:ext uri="{BB962C8B-B14F-4D97-AF65-F5344CB8AC3E}">
-        <p14:creationId xmlns:p14="http://schemas.microsoft.com/office/powerpoint/2010/main" val="1946316444"/>
+        <p14:creationId xmlns:p14="http://schemas.microsoft.com/office/powerpoint/2010/main" val="1820823319"/>
       </p:ext>
     </p:extLst>
   </p:cSld>
@@ -3614,7 +3650,7 @@
           <p:cNvPr id="2" name="Title 1">
             <a:extLst>
               <a:ext uri="{FF2B5EF4-FFF2-40B4-BE49-F238E27FC236}">
-                <a16:creationId xmlns:a16="http://schemas.microsoft.com/office/drawing/2014/main" id="{79E7E43D-7011-4E4E-9031-9670BBF74801}"/>
+                <a16:creationId xmlns:a16="http://schemas.microsoft.com/office/drawing/2014/main" id="{0AAC3489-0D7D-421C-8CB1-F49C8050E054}"/>
               </a:ext>
             </a:extLst>
           </p:cNvPr>
@@ -3625,98 +3661,773 @@
             <p:ph type="title"/>
           </p:nvPr>
         </p:nvSpPr>
-        <p:spPr/>
-        <p:txBody>
-          <a:bodyPr/>
-          <a:lstStyle/>
-          <a:p>
-            <a:r>
-              <a:rPr lang="en-US" dirty="0"/>
-              <a:t>Character 3</a:t>
-            </a:r>
-            <a:br>
-              <a:rPr lang="en-US" dirty="0"/>
-            </a:br>
-            <a:r>
-              <a:rPr lang="en-US" dirty="0"/>
-              <a:t>- Smasher -</a:t>
-            </a:r>
-            <a:endParaRPr lang="sv-SE" dirty="0"/>
-          </a:p>
-        </p:txBody>
-      </p:sp>
-      <p:sp>
-        <p:nvSpPr>
-          <p:cNvPr id="3" name="Content Placeholder 2">
-            <a:extLst>
-              <a:ext uri="{FF2B5EF4-FFF2-40B4-BE49-F238E27FC236}">
-                <a16:creationId xmlns:a16="http://schemas.microsoft.com/office/drawing/2014/main" id="{3611A7F7-03D7-4314-9F23-F7905D59D24A}"/>
-              </a:ext>
-            </a:extLst>
-          </p:cNvPr>
-          <p:cNvSpPr>
-            <a:spLocks noGrp="1"/>
-          </p:cNvSpPr>
-          <p:nvPr>
-            <p:ph idx="1"/>
-          </p:nvPr>
-        </p:nvSpPr>
-        <p:spPr/>
-        <p:txBody>
-          <a:bodyPr/>
-          <a:lstStyle/>
-          <a:p>
-            <a:endParaRPr lang="sv-SE"/>
-          </a:p>
-        </p:txBody>
-      </p:sp>
-      <p:sp>
-        <p:nvSpPr>
-          <p:cNvPr id="4" name="Text Placeholder 3">
-            <a:extLst>
-              <a:ext uri="{FF2B5EF4-FFF2-40B4-BE49-F238E27FC236}">
-                <a16:creationId xmlns:a16="http://schemas.microsoft.com/office/drawing/2014/main" id="{D8948BD0-BBCD-461E-B20E-5B53D5D2B27F}"/>
-              </a:ext>
-            </a:extLst>
-          </p:cNvPr>
-          <p:cNvSpPr>
-            <a:spLocks noGrp="1"/>
-          </p:cNvSpPr>
-          <p:nvPr>
-            <p:ph type="body" sz="half" idx="2"/>
-          </p:nvPr>
-        </p:nvSpPr>
-        <p:spPr/>
-        <p:txBody>
-          <a:bodyPr/>
-          <a:lstStyle/>
-          <a:p>
-            <a:r>
-              <a:rPr lang="en-US" dirty="0"/>
-              <a:t>Can shoot out an energy orb in target direction. By pressing the ability button again a lighting will strike and reduce team spirit based on amount of targets hit. </a:t>
-            </a:r>
-          </a:p>
-          <a:p>
-            <a:r>
-              <a:rPr lang="en-US" dirty="0"/>
-              <a:t>Or</a:t>
-            </a:r>
-          </a:p>
-          <a:p>
-            <a:r>
-              <a:rPr lang="en-US" dirty="0"/>
-              <a:t>Lobs a rock by holding down ability button to increase distance traveled. </a:t>
-            </a:r>
-          </a:p>
-          <a:p>
-            <a:endParaRPr lang="sv-SE" dirty="0"/>
-          </a:p>
-        </p:txBody>
-      </p:sp>
+        <p:spPr>
+          <a:xfrm>
+            <a:off x="839788" y="365126"/>
+            <a:ext cx="10515600" cy="1316038"/>
+          </a:xfrm>
+        </p:spPr>
+        <p:txBody>
+          <a:bodyPr/>
+          <a:lstStyle/>
+          <a:p>
+            <a:pPr algn="ctr"/>
+            <a:endParaRPr lang="en-US" dirty="0"/>
+          </a:p>
+        </p:txBody>
+      </p:sp>
+      <p:sp>
+        <p:nvSpPr>
+          <p:cNvPr id="3" name="Text Placeholder 2">
+            <a:extLst>
+              <a:ext uri="{FF2B5EF4-FFF2-40B4-BE49-F238E27FC236}">
+                <a16:creationId xmlns:a16="http://schemas.microsoft.com/office/drawing/2014/main" id="{D61CCA83-89FF-4B52-AFB0-A057BBD49973}"/>
+              </a:ext>
+            </a:extLst>
+          </p:cNvPr>
+          <p:cNvSpPr>
+            <a:spLocks noGrp="1"/>
+          </p:cNvSpPr>
+          <p:nvPr>
+            <p:ph type="body" idx="1"/>
+          </p:nvPr>
+        </p:nvSpPr>
+        <p:spPr>
+          <a:xfrm>
+            <a:off x="921850" y="1408602"/>
+            <a:ext cx="3275012" cy="823912"/>
+          </a:xfrm>
+        </p:spPr>
+        <p:txBody>
+          <a:bodyPr/>
+          <a:lstStyle/>
+          <a:p>
+            <a:r>
+              <a:rPr lang="en-US" dirty="0"/>
+              <a:t>Blocker</a:t>
+            </a:r>
+          </a:p>
+        </p:txBody>
+      </p:sp>
+      <p:sp>
+        <p:nvSpPr>
+          <p:cNvPr id="5" name="Text Placeholder 4">
+            <a:extLst>
+              <a:ext uri="{FF2B5EF4-FFF2-40B4-BE49-F238E27FC236}">
+                <a16:creationId xmlns:a16="http://schemas.microsoft.com/office/drawing/2014/main" id="{E6B611E2-C375-4176-8622-91EC5F79E2EB}"/>
+              </a:ext>
+            </a:extLst>
+          </p:cNvPr>
+          <p:cNvSpPr>
+            <a:spLocks noGrp="1"/>
+          </p:cNvSpPr>
+          <p:nvPr>
+            <p:ph type="body" sz="quarter" idx="3"/>
+          </p:nvPr>
+        </p:nvSpPr>
+        <p:spPr>
+          <a:xfrm>
+            <a:off x="7435116" y="1408602"/>
+            <a:ext cx="3917096" cy="823912"/>
+          </a:xfrm>
+        </p:spPr>
+        <p:txBody>
+          <a:bodyPr/>
+          <a:lstStyle/>
+          <a:p>
+            <a:r>
+              <a:rPr lang="en-US" dirty="0"/>
+              <a:t>Smasher</a:t>
+            </a:r>
+          </a:p>
+        </p:txBody>
+      </p:sp>
+      <p:sp>
+        <p:nvSpPr>
+          <p:cNvPr id="6" name="Content Placeholder 5">
+            <a:extLst>
+              <a:ext uri="{FF2B5EF4-FFF2-40B4-BE49-F238E27FC236}">
+                <a16:creationId xmlns:a16="http://schemas.microsoft.com/office/drawing/2014/main" id="{DE16B863-0D38-4ECA-AD75-69B09F94C33F}"/>
+              </a:ext>
+            </a:extLst>
+          </p:cNvPr>
+          <p:cNvSpPr>
+            <a:spLocks noGrp="1"/>
+          </p:cNvSpPr>
+          <p:nvPr>
+            <p:ph sz="quarter" idx="4"/>
+          </p:nvPr>
+        </p:nvSpPr>
+        <p:spPr>
+          <a:xfrm>
+            <a:off x="7435116" y="2232514"/>
+            <a:ext cx="3004038" cy="3684588"/>
+          </a:xfrm>
+        </p:spPr>
+        <p:txBody>
+          <a:bodyPr/>
+          <a:lstStyle/>
+          <a:p>
+            <a:pPr marL="514350" indent="-514350">
+              <a:buFont typeface="+mj-lt"/>
+              <a:buAutoNum type="arabicPeriod"/>
+            </a:pPr>
+            <a:r>
+              <a:rPr lang="en-US" dirty="0"/>
+              <a:t>Can’t see enemies</a:t>
+            </a:r>
+          </a:p>
+          <a:p>
+            <a:pPr marL="514350" indent="-514350">
+              <a:buFont typeface="+mj-lt"/>
+              <a:buAutoNum type="arabicPeriod"/>
+            </a:pPr>
+            <a:r>
+              <a:rPr lang="en-US" dirty="0"/>
+              <a:t>Can see pinged enemies</a:t>
+            </a:r>
+          </a:p>
+          <a:p>
+            <a:pPr marL="514350" indent="-514350">
+              <a:buFont typeface="+mj-lt"/>
+              <a:buAutoNum type="arabicPeriod"/>
+            </a:pPr>
+            <a:r>
+              <a:rPr lang="en-US" dirty="0"/>
+              <a:t>Can tell if the team is pinged</a:t>
+            </a:r>
+          </a:p>
+          <a:p>
+            <a:pPr marL="514350" indent="-514350">
+              <a:buFont typeface="+mj-lt"/>
+              <a:buAutoNum type="arabicPeriod"/>
+            </a:pPr>
+            <a:r>
+              <a:rPr lang="en-US" dirty="0"/>
+              <a:t>Sees enemy attack from afar</a:t>
+            </a:r>
+          </a:p>
+        </p:txBody>
+      </p:sp>
+      <p:sp>
+        <p:nvSpPr>
+          <p:cNvPr id="7" name="Content Placeholder 3">
+            <a:extLst>
+              <a:ext uri="{FF2B5EF4-FFF2-40B4-BE49-F238E27FC236}">
+                <a16:creationId xmlns:a16="http://schemas.microsoft.com/office/drawing/2014/main" id="{A57CF45C-CABA-40EA-84C7-B3A28C4C1F61}"/>
+              </a:ext>
+            </a:extLst>
+          </p:cNvPr>
+          <p:cNvSpPr>
+            <a:spLocks noGrp="1"/>
+          </p:cNvSpPr>
+          <p:nvPr>
+            <p:ph sz="half" idx="2"/>
+          </p:nvPr>
+        </p:nvSpPr>
+        <p:spPr>
+          <a:xfrm>
+            <a:off x="921850" y="2336556"/>
+            <a:ext cx="3040796" cy="3684588"/>
+          </a:xfrm>
+        </p:spPr>
+        <p:txBody>
+          <a:bodyPr/>
+          <a:lstStyle/>
+          <a:p>
+            <a:pPr marL="514350" indent="-514350">
+              <a:buFont typeface="+mj-lt"/>
+              <a:buAutoNum type="arabicPeriod"/>
+            </a:pPr>
+            <a:r>
+              <a:rPr lang="en-US" dirty="0"/>
+              <a:t>Can see enemies</a:t>
+            </a:r>
+          </a:p>
+          <a:p>
+            <a:pPr marL="514350" indent="-514350">
+              <a:buFont typeface="+mj-lt"/>
+              <a:buAutoNum type="arabicPeriod"/>
+            </a:pPr>
+            <a:r>
+              <a:rPr lang="en-US" dirty="0"/>
+              <a:t>Can’t see pinged enemies</a:t>
+            </a:r>
+          </a:p>
+          <a:p>
+            <a:pPr marL="514350" indent="-514350">
+              <a:buFont typeface="+mj-lt"/>
+              <a:buAutoNum type="arabicPeriod"/>
+            </a:pPr>
+            <a:r>
+              <a:rPr lang="en-US" dirty="0"/>
+              <a:t>Can’t tell if the team is pinged</a:t>
+            </a:r>
+          </a:p>
+          <a:p>
+            <a:pPr marL="514350" indent="-514350">
+              <a:buFont typeface="+mj-lt"/>
+              <a:buAutoNum type="arabicPeriod"/>
+            </a:pPr>
+            <a:r>
+              <a:rPr lang="en-US" dirty="0"/>
+              <a:t>Can’t see enemy attack</a:t>
+            </a:r>
+          </a:p>
+          <a:p>
+            <a:pPr marL="514350" indent="-514350">
+              <a:buFont typeface="+mj-lt"/>
+              <a:buAutoNum type="arabicPeriod"/>
+            </a:pPr>
+            <a:endParaRPr lang="en-US" dirty="0"/>
+          </a:p>
+          <a:p>
+            <a:endParaRPr lang="en-US" dirty="0"/>
+          </a:p>
+        </p:txBody>
+      </p:sp>
+      <p:sp>
+        <p:nvSpPr>
+          <p:cNvPr id="8" name="Text Placeholder 2">
+            <a:extLst>
+              <a:ext uri="{FF2B5EF4-FFF2-40B4-BE49-F238E27FC236}">
+                <a16:creationId xmlns:a16="http://schemas.microsoft.com/office/drawing/2014/main" id="{4BB8AFC8-0F66-4AB8-AF46-5701475B6B8C}"/>
+              </a:ext>
+            </a:extLst>
+          </p:cNvPr>
+          <p:cNvSpPr txBox="1">
+            <a:spLocks/>
+          </p:cNvSpPr>
+          <p:nvPr/>
+        </p:nvSpPr>
+        <p:spPr>
+          <a:xfrm>
+            <a:off x="4163280" y="1408602"/>
+            <a:ext cx="3275012" cy="823912"/>
+          </a:xfrm>
+          <a:prstGeom prst="rect">
+            <a:avLst/>
+          </a:prstGeom>
+        </p:spPr>
+        <p:txBody>
+          <a:bodyPr vert="horz" lIns="91440" tIns="45720" rIns="91440" bIns="45720" rtlCol="0" anchor="b">
+            <a:normAutofit/>
+          </a:bodyPr>
+          <a:lstStyle>
+            <a:lvl1pPr marL="0" indent="0" algn="l" defTabSz="914400" rtl="0" eaLnBrk="1" latinLnBrk="0" hangingPunct="1">
+              <a:lnSpc>
+                <a:spcPct val="90000"/>
+              </a:lnSpc>
+              <a:spcBef>
+                <a:spcPts val="1000"/>
+              </a:spcBef>
+              <a:buFont typeface="Arial" panose="020B0604020202020204" pitchFamily="34" charset="0"/>
+              <a:buNone/>
+              <a:defRPr sz="2400" b="1" kern="1200">
+                <a:solidFill>
+                  <a:schemeClr val="tx1"/>
+                </a:solidFill>
+                <a:latin typeface="+mn-lt"/>
+                <a:ea typeface="+mn-ea"/>
+                <a:cs typeface="+mn-cs"/>
+              </a:defRPr>
+            </a:lvl1pPr>
+            <a:lvl2pPr marL="457200" indent="0" algn="l" defTabSz="914400" rtl="0" eaLnBrk="1" latinLnBrk="0" hangingPunct="1">
+              <a:lnSpc>
+                <a:spcPct val="90000"/>
+              </a:lnSpc>
+              <a:spcBef>
+                <a:spcPts val="500"/>
+              </a:spcBef>
+              <a:buFont typeface="Arial" panose="020B0604020202020204" pitchFamily="34" charset="0"/>
+              <a:buNone/>
+              <a:defRPr sz="2000" b="1" kern="1200">
+                <a:solidFill>
+                  <a:schemeClr val="tx1"/>
+                </a:solidFill>
+                <a:latin typeface="+mn-lt"/>
+                <a:ea typeface="+mn-ea"/>
+                <a:cs typeface="+mn-cs"/>
+              </a:defRPr>
+            </a:lvl2pPr>
+            <a:lvl3pPr marL="914400" indent="0" algn="l" defTabSz="914400" rtl="0" eaLnBrk="1" latinLnBrk="0" hangingPunct="1">
+              <a:lnSpc>
+                <a:spcPct val="90000"/>
+              </a:lnSpc>
+              <a:spcBef>
+                <a:spcPts val="500"/>
+              </a:spcBef>
+              <a:buFont typeface="Arial" panose="020B0604020202020204" pitchFamily="34" charset="0"/>
+              <a:buNone/>
+              <a:defRPr sz="1800" b="1" kern="1200">
+                <a:solidFill>
+                  <a:schemeClr val="tx1"/>
+                </a:solidFill>
+                <a:latin typeface="+mn-lt"/>
+                <a:ea typeface="+mn-ea"/>
+                <a:cs typeface="+mn-cs"/>
+              </a:defRPr>
+            </a:lvl3pPr>
+            <a:lvl4pPr marL="1371600" indent="0" algn="l" defTabSz="914400" rtl="0" eaLnBrk="1" latinLnBrk="0" hangingPunct="1">
+              <a:lnSpc>
+                <a:spcPct val="90000"/>
+              </a:lnSpc>
+              <a:spcBef>
+                <a:spcPts val="500"/>
+              </a:spcBef>
+              <a:buFont typeface="Arial" panose="020B0604020202020204" pitchFamily="34" charset="0"/>
+              <a:buNone/>
+              <a:defRPr sz="1600" b="1" kern="1200">
+                <a:solidFill>
+                  <a:schemeClr val="tx1"/>
+                </a:solidFill>
+                <a:latin typeface="+mn-lt"/>
+                <a:ea typeface="+mn-ea"/>
+                <a:cs typeface="+mn-cs"/>
+              </a:defRPr>
+            </a:lvl4pPr>
+            <a:lvl5pPr marL="1828800" indent="0" algn="l" defTabSz="914400" rtl="0" eaLnBrk="1" latinLnBrk="0" hangingPunct="1">
+              <a:lnSpc>
+                <a:spcPct val="90000"/>
+              </a:lnSpc>
+              <a:spcBef>
+                <a:spcPts val="500"/>
+              </a:spcBef>
+              <a:buFont typeface="Arial" panose="020B0604020202020204" pitchFamily="34" charset="0"/>
+              <a:buNone/>
+              <a:defRPr sz="1600" b="1" kern="1200">
+                <a:solidFill>
+                  <a:schemeClr val="tx1"/>
+                </a:solidFill>
+                <a:latin typeface="+mn-lt"/>
+                <a:ea typeface="+mn-ea"/>
+                <a:cs typeface="+mn-cs"/>
+              </a:defRPr>
+            </a:lvl5pPr>
+            <a:lvl6pPr marL="2286000" indent="0" algn="l" defTabSz="914400" rtl="0" eaLnBrk="1" latinLnBrk="0" hangingPunct="1">
+              <a:lnSpc>
+                <a:spcPct val="90000"/>
+              </a:lnSpc>
+              <a:spcBef>
+                <a:spcPts val="500"/>
+              </a:spcBef>
+              <a:buFont typeface="Arial" panose="020B0604020202020204" pitchFamily="34" charset="0"/>
+              <a:buNone/>
+              <a:defRPr sz="1600" b="1" kern="1200">
+                <a:solidFill>
+                  <a:schemeClr val="tx1"/>
+                </a:solidFill>
+                <a:latin typeface="+mn-lt"/>
+                <a:ea typeface="+mn-ea"/>
+                <a:cs typeface="+mn-cs"/>
+              </a:defRPr>
+            </a:lvl6pPr>
+            <a:lvl7pPr marL="2743200" indent="0" algn="l" defTabSz="914400" rtl="0" eaLnBrk="1" latinLnBrk="0" hangingPunct="1">
+              <a:lnSpc>
+                <a:spcPct val="90000"/>
+              </a:lnSpc>
+              <a:spcBef>
+                <a:spcPts val="500"/>
+              </a:spcBef>
+              <a:buFont typeface="Arial" panose="020B0604020202020204" pitchFamily="34" charset="0"/>
+              <a:buNone/>
+              <a:defRPr sz="1600" b="1" kern="1200">
+                <a:solidFill>
+                  <a:schemeClr val="tx1"/>
+                </a:solidFill>
+                <a:latin typeface="+mn-lt"/>
+                <a:ea typeface="+mn-ea"/>
+                <a:cs typeface="+mn-cs"/>
+              </a:defRPr>
+            </a:lvl7pPr>
+            <a:lvl8pPr marL="3200400" indent="0" algn="l" defTabSz="914400" rtl="0" eaLnBrk="1" latinLnBrk="0" hangingPunct="1">
+              <a:lnSpc>
+                <a:spcPct val="90000"/>
+              </a:lnSpc>
+              <a:spcBef>
+                <a:spcPts val="500"/>
+              </a:spcBef>
+              <a:buFont typeface="Arial" panose="020B0604020202020204" pitchFamily="34" charset="0"/>
+              <a:buNone/>
+              <a:defRPr sz="1600" b="1" kern="1200">
+                <a:solidFill>
+                  <a:schemeClr val="tx1"/>
+                </a:solidFill>
+                <a:latin typeface="+mn-lt"/>
+                <a:ea typeface="+mn-ea"/>
+                <a:cs typeface="+mn-cs"/>
+              </a:defRPr>
+            </a:lvl8pPr>
+            <a:lvl9pPr marL="3657600" indent="0" algn="l" defTabSz="914400" rtl="0" eaLnBrk="1" latinLnBrk="0" hangingPunct="1">
+              <a:lnSpc>
+                <a:spcPct val="90000"/>
+              </a:lnSpc>
+              <a:spcBef>
+                <a:spcPts val="500"/>
+              </a:spcBef>
+              <a:buFont typeface="Arial" panose="020B0604020202020204" pitchFamily="34" charset="0"/>
+              <a:buNone/>
+              <a:defRPr sz="1600" b="1" kern="1200">
+                <a:solidFill>
+                  <a:schemeClr val="tx1"/>
+                </a:solidFill>
+                <a:latin typeface="+mn-lt"/>
+                <a:ea typeface="+mn-ea"/>
+                <a:cs typeface="+mn-cs"/>
+              </a:defRPr>
+            </a:lvl9pPr>
+          </a:lstStyle>
+          <a:p>
+            <a:r>
+              <a:rPr lang="en-US" dirty="0"/>
+              <a:t>Settler</a:t>
+            </a:r>
+          </a:p>
+        </p:txBody>
+      </p:sp>
+      <p:sp>
+        <p:nvSpPr>
+          <p:cNvPr id="9" name="Content Placeholder 3">
+            <a:extLst>
+              <a:ext uri="{FF2B5EF4-FFF2-40B4-BE49-F238E27FC236}">
+                <a16:creationId xmlns:a16="http://schemas.microsoft.com/office/drawing/2014/main" id="{2DB2E5D6-A127-43E6-B33D-68C759B0A7CC}"/>
+              </a:ext>
+            </a:extLst>
+          </p:cNvPr>
+          <p:cNvSpPr txBox="1">
+            <a:spLocks/>
+          </p:cNvSpPr>
+          <p:nvPr/>
+        </p:nvSpPr>
+        <p:spPr>
+          <a:xfrm>
+            <a:off x="4160104" y="2284535"/>
+            <a:ext cx="3040796" cy="3684588"/>
+          </a:xfrm>
+          <a:prstGeom prst="rect">
+            <a:avLst/>
+          </a:prstGeom>
+        </p:spPr>
+        <p:txBody>
+          <a:bodyPr vert="horz" lIns="91440" tIns="45720" rIns="91440" bIns="45720" rtlCol="0">
+            <a:normAutofit/>
+          </a:bodyPr>
+          <a:lstStyle>
+            <a:lvl1pPr marL="228600" indent="-228600" algn="l" defTabSz="914400" rtl="0" eaLnBrk="1" latinLnBrk="0" hangingPunct="1">
+              <a:lnSpc>
+                <a:spcPct val="90000"/>
+              </a:lnSpc>
+              <a:spcBef>
+                <a:spcPts val="1000"/>
+              </a:spcBef>
+              <a:buFont typeface="Arial" panose="020B0604020202020204" pitchFamily="34" charset="0"/>
+              <a:buChar char="•"/>
+              <a:defRPr sz="2800" kern="1200">
+                <a:solidFill>
+                  <a:schemeClr val="tx1"/>
+                </a:solidFill>
+                <a:latin typeface="+mn-lt"/>
+                <a:ea typeface="+mn-ea"/>
+                <a:cs typeface="+mn-cs"/>
+              </a:defRPr>
+            </a:lvl1pPr>
+            <a:lvl2pPr marL="685800" indent="-228600" algn="l" defTabSz="914400" rtl="0" eaLnBrk="1" latinLnBrk="0" hangingPunct="1">
+              <a:lnSpc>
+                <a:spcPct val="90000"/>
+              </a:lnSpc>
+              <a:spcBef>
+                <a:spcPts val="500"/>
+              </a:spcBef>
+              <a:buFont typeface="Arial" panose="020B0604020202020204" pitchFamily="34" charset="0"/>
+              <a:buChar char="•"/>
+              <a:defRPr sz="2400" kern="1200">
+                <a:solidFill>
+                  <a:schemeClr val="tx1"/>
+                </a:solidFill>
+                <a:latin typeface="+mn-lt"/>
+                <a:ea typeface="+mn-ea"/>
+                <a:cs typeface="+mn-cs"/>
+              </a:defRPr>
+            </a:lvl2pPr>
+            <a:lvl3pPr marL="1143000" indent="-228600" algn="l" defTabSz="914400" rtl="0" eaLnBrk="1" latinLnBrk="0" hangingPunct="1">
+              <a:lnSpc>
+                <a:spcPct val="90000"/>
+              </a:lnSpc>
+              <a:spcBef>
+                <a:spcPts val="500"/>
+              </a:spcBef>
+              <a:buFont typeface="Arial" panose="020B0604020202020204" pitchFamily="34" charset="0"/>
+              <a:buChar char="•"/>
+              <a:defRPr sz="2000" kern="1200">
+                <a:solidFill>
+                  <a:schemeClr val="tx1"/>
+                </a:solidFill>
+                <a:latin typeface="+mn-lt"/>
+                <a:ea typeface="+mn-ea"/>
+                <a:cs typeface="+mn-cs"/>
+              </a:defRPr>
+            </a:lvl3pPr>
+            <a:lvl4pPr marL="1600200" indent="-228600" algn="l" defTabSz="914400" rtl="0" eaLnBrk="1" latinLnBrk="0" hangingPunct="1">
+              <a:lnSpc>
+                <a:spcPct val="90000"/>
+              </a:lnSpc>
+              <a:spcBef>
+                <a:spcPts val="500"/>
+              </a:spcBef>
+              <a:buFont typeface="Arial" panose="020B0604020202020204" pitchFamily="34" charset="0"/>
+              <a:buChar char="•"/>
+              <a:defRPr sz="1800" kern="1200">
+                <a:solidFill>
+                  <a:schemeClr val="tx1"/>
+                </a:solidFill>
+                <a:latin typeface="+mn-lt"/>
+                <a:ea typeface="+mn-ea"/>
+                <a:cs typeface="+mn-cs"/>
+              </a:defRPr>
+            </a:lvl4pPr>
+            <a:lvl5pPr marL="2057400" indent="-228600" algn="l" defTabSz="914400" rtl="0" eaLnBrk="1" latinLnBrk="0" hangingPunct="1">
+              <a:lnSpc>
+                <a:spcPct val="90000"/>
+              </a:lnSpc>
+              <a:spcBef>
+                <a:spcPts val="500"/>
+              </a:spcBef>
+              <a:buFont typeface="Arial" panose="020B0604020202020204" pitchFamily="34" charset="0"/>
+              <a:buChar char="•"/>
+              <a:defRPr sz="1800" kern="1200">
+                <a:solidFill>
+                  <a:schemeClr val="tx1"/>
+                </a:solidFill>
+                <a:latin typeface="+mn-lt"/>
+                <a:ea typeface="+mn-ea"/>
+                <a:cs typeface="+mn-cs"/>
+              </a:defRPr>
+            </a:lvl5pPr>
+            <a:lvl6pPr marL="2514600" indent="-228600" algn="l" defTabSz="914400" rtl="0" eaLnBrk="1" latinLnBrk="0" hangingPunct="1">
+              <a:lnSpc>
+                <a:spcPct val="90000"/>
+              </a:lnSpc>
+              <a:spcBef>
+                <a:spcPts val="500"/>
+              </a:spcBef>
+              <a:buFont typeface="Arial" panose="020B0604020202020204" pitchFamily="34" charset="0"/>
+              <a:buChar char="•"/>
+              <a:defRPr sz="1800" kern="1200">
+                <a:solidFill>
+                  <a:schemeClr val="tx1"/>
+                </a:solidFill>
+                <a:latin typeface="+mn-lt"/>
+                <a:ea typeface="+mn-ea"/>
+                <a:cs typeface="+mn-cs"/>
+              </a:defRPr>
+            </a:lvl6pPr>
+            <a:lvl7pPr marL="2971800" indent="-228600" algn="l" defTabSz="914400" rtl="0" eaLnBrk="1" latinLnBrk="0" hangingPunct="1">
+              <a:lnSpc>
+                <a:spcPct val="90000"/>
+              </a:lnSpc>
+              <a:spcBef>
+                <a:spcPts val="500"/>
+              </a:spcBef>
+              <a:buFont typeface="Arial" panose="020B0604020202020204" pitchFamily="34" charset="0"/>
+              <a:buChar char="•"/>
+              <a:defRPr sz="1800" kern="1200">
+                <a:solidFill>
+                  <a:schemeClr val="tx1"/>
+                </a:solidFill>
+                <a:latin typeface="+mn-lt"/>
+                <a:ea typeface="+mn-ea"/>
+                <a:cs typeface="+mn-cs"/>
+              </a:defRPr>
+            </a:lvl7pPr>
+            <a:lvl8pPr marL="3429000" indent="-228600" algn="l" defTabSz="914400" rtl="0" eaLnBrk="1" latinLnBrk="0" hangingPunct="1">
+              <a:lnSpc>
+                <a:spcPct val="90000"/>
+              </a:lnSpc>
+              <a:spcBef>
+                <a:spcPts val="500"/>
+              </a:spcBef>
+              <a:buFont typeface="Arial" panose="020B0604020202020204" pitchFamily="34" charset="0"/>
+              <a:buChar char="•"/>
+              <a:defRPr sz="1800" kern="1200">
+                <a:solidFill>
+                  <a:schemeClr val="tx1"/>
+                </a:solidFill>
+                <a:latin typeface="+mn-lt"/>
+                <a:ea typeface="+mn-ea"/>
+                <a:cs typeface="+mn-cs"/>
+              </a:defRPr>
+            </a:lvl8pPr>
+            <a:lvl9pPr marL="3886200" indent="-228600" algn="l" defTabSz="914400" rtl="0" eaLnBrk="1" latinLnBrk="0" hangingPunct="1">
+              <a:lnSpc>
+                <a:spcPct val="90000"/>
+              </a:lnSpc>
+              <a:spcBef>
+                <a:spcPts val="500"/>
+              </a:spcBef>
+              <a:buFont typeface="Arial" panose="020B0604020202020204" pitchFamily="34" charset="0"/>
+              <a:buChar char="•"/>
+              <a:defRPr sz="1800" kern="1200">
+                <a:solidFill>
+                  <a:schemeClr val="tx1"/>
+                </a:solidFill>
+                <a:latin typeface="+mn-lt"/>
+                <a:ea typeface="+mn-ea"/>
+                <a:cs typeface="+mn-cs"/>
+              </a:defRPr>
+            </a:lvl9pPr>
+          </a:lstStyle>
+          <a:p>
+            <a:pPr marL="514350" indent="-514350">
+              <a:buFont typeface="+mj-lt"/>
+              <a:buAutoNum type="arabicPeriod"/>
+            </a:pPr>
+            <a:r>
+              <a:rPr lang="en-US" dirty="0"/>
+              <a:t>Can’t see enemies</a:t>
+            </a:r>
+          </a:p>
+          <a:p>
+            <a:pPr marL="514350" indent="-514350">
+              <a:buFont typeface="+mj-lt"/>
+              <a:buAutoNum type="arabicPeriod"/>
+            </a:pPr>
+            <a:r>
+              <a:rPr lang="en-US" dirty="0"/>
+              <a:t>Can ping enemies</a:t>
+            </a:r>
+          </a:p>
+          <a:p>
+            <a:pPr marL="514350" indent="-514350">
+              <a:buFont typeface="+mj-lt"/>
+              <a:buAutoNum type="arabicPeriod"/>
+            </a:pPr>
+            <a:r>
+              <a:rPr lang="en-US" dirty="0"/>
+              <a:t>Can’t tell if the team is pinged</a:t>
+            </a:r>
+          </a:p>
+          <a:p>
+            <a:pPr marL="514350" indent="-514350">
+              <a:buFont typeface="+mj-lt"/>
+              <a:buAutoNum type="arabicPeriod"/>
+            </a:pPr>
+            <a:r>
+              <a:rPr lang="en-US" dirty="0"/>
+              <a:t>Sees enemy attack if close</a:t>
+            </a:r>
+          </a:p>
+        </p:txBody>
+      </p:sp>
+      <p:pic>
+        <p:nvPicPr>
+          <p:cNvPr id="10" name="Content Placeholder 5">
+            <a:extLst>
+              <a:ext uri="{FF2B5EF4-FFF2-40B4-BE49-F238E27FC236}">
+                <a16:creationId xmlns:a16="http://schemas.microsoft.com/office/drawing/2014/main" id="{C39EEE99-53F6-42FC-94B5-69F3A3015AC2}"/>
+              </a:ext>
+            </a:extLst>
+          </p:cNvPr>
+          <p:cNvPicPr>
+            <a:picLocks noChangeAspect="1"/>
+          </p:cNvPicPr>
+          <p:nvPr/>
+        </p:nvPicPr>
+        <p:blipFill rotWithShape="1">
+          <a:blip r:embed="rId2">
+            <a:extLst>
+              <a:ext uri="{28A0092B-C50C-407E-A947-70E740481C1C}">
+                <a14:useLocalDpi xmlns:a14="http://schemas.microsoft.com/office/drawing/2010/main" val="0"/>
+              </a:ext>
+            </a:extLst>
+          </a:blip>
+          <a:srcRect l="12879" t="11904" r="12879" b="11904"/>
+          <a:stretch/>
+        </p:blipFill>
+        <p:spPr>
+          <a:xfrm>
+            <a:off x="1456779" y="481259"/>
+            <a:ext cx="1776980" cy="1083772"/>
+          </a:xfrm>
+          <a:prstGeom prst="rect">
+            <a:avLst/>
+          </a:prstGeom>
+        </p:spPr>
+      </p:pic>
+      <p:pic>
+        <p:nvPicPr>
+          <p:cNvPr id="11" name="Content Placeholder 5">
+            <a:extLst>
+              <a:ext uri="{FF2B5EF4-FFF2-40B4-BE49-F238E27FC236}">
+                <a16:creationId xmlns:a16="http://schemas.microsoft.com/office/drawing/2014/main" id="{42A2758F-3CEC-4A6A-AD2F-708ADB937720}"/>
+              </a:ext>
+            </a:extLst>
+          </p:cNvPr>
+          <p:cNvPicPr>
+            <a:picLocks noChangeAspect="1"/>
+          </p:cNvPicPr>
+          <p:nvPr/>
+        </p:nvPicPr>
+        <p:blipFill rotWithShape="1">
+          <a:blip r:embed="rId3">
+            <a:extLst>
+              <a:ext uri="{28A0092B-C50C-407E-A947-70E740481C1C}">
+                <a14:useLocalDpi xmlns:a14="http://schemas.microsoft.com/office/drawing/2010/main" val="0"/>
+              </a:ext>
+            </a:extLst>
+          </a:blip>
+          <a:srcRect l="33883"/>
+          <a:stretch/>
+        </p:blipFill>
+        <p:spPr>
+          <a:xfrm>
+            <a:off x="4460430" y="385947"/>
+            <a:ext cx="1748014" cy="1274976"/>
+          </a:xfrm>
+          <a:prstGeom prst="rect">
+            <a:avLst/>
+          </a:prstGeom>
+        </p:spPr>
+      </p:pic>
+      <p:pic>
+        <p:nvPicPr>
+          <p:cNvPr id="12" name="Content Placeholder 5">
+            <a:extLst>
+              <a:ext uri="{FF2B5EF4-FFF2-40B4-BE49-F238E27FC236}">
+                <a16:creationId xmlns:a16="http://schemas.microsoft.com/office/drawing/2014/main" id="{371786F2-68AA-4462-AC36-10DE8A4FDB48}"/>
+              </a:ext>
+            </a:extLst>
+          </p:cNvPr>
+          <p:cNvPicPr>
+            <a:picLocks noChangeAspect="1"/>
+          </p:cNvPicPr>
+          <p:nvPr/>
+        </p:nvPicPr>
+        <p:blipFill>
+          <a:blip r:embed="rId4">
+            <a:extLst>
+              <a:ext uri="{28A0092B-C50C-407E-A947-70E740481C1C}">
+                <a14:useLocalDpi xmlns:a14="http://schemas.microsoft.com/office/drawing/2010/main" val="0"/>
+              </a:ext>
+            </a:extLst>
+          </a:blip>
+          <a:stretch>
+            <a:fillRect/>
+          </a:stretch>
+        </p:blipFill>
+        <p:spPr>
+          <a:xfrm flipH="1">
+            <a:off x="8153561" y="300952"/>
+            <a:ext cx="1022804" cy="1476010"/>
+          </a:xfrm>
+          <a:prstGeom prst="rect">
+            <a:avLst/>
+          </a:prstGeom>
+        </p:spPr>
+      </p:pic>
     </p:spTree>
     <p:extLst>
       <p:ext uri="{BB962C8B-B14F-4D97-AF65-F5344CB8AC3E}">
-        <p14:creationId xmlns:p14="http://schemas.microsoft.com/office/powerpoint/2010/main" val="1820823319"/>
+        <p14:creationId xmlns:p14="http://schemas.microsoft.com/office/powerpoint/2010/main" val="1640340427"/>
       </p:ext>
     </p:extLst>
   </p:cSld>
@@ -3748,7 +4459,7 @@
           <p:cNvPr id="2" name="Title 1">
             <a:extLst>
               <a:ext uri="{FF2B5EF4-FFF2-40B4-BE49-F238E27FC236}">
-                <a16:creationId xmlns:a16="http://schemas.microsoft.com/office/drawing/2014/main" id="{91C69F72-C47A-45AB-A8CF-F61E8D4801E2}"/>
+                <a16:creationId xmlns:a16="http://schemas.microsoft.com/office/drawing/2014/main" id="{984EEE85-97F6-4218-8CD9-52D620348135}"/>
               </a:ext>
             </a:extLst>
           </p:cNvPr>
@@ -3759,14 +4470,20 @@
             <p:ph type="title"/>
           </p:nvPr>
         </p:nvSpPr>
-        <p:spPr/>
-        <p:txBody>
-          <a:bodyPr/>
-          <a:lstStyle/>
-          <a:p>
-            <a:r>
-              <a:rPr lang="en-US" dirty="0"/>
-              <a:t>UI Navigation</a:t>
+        <p:spPr>
+          <a:xfrm>
+            <a:off x="3763535" y="17585"/>
+            <a:ext cx="3932237" cy="1600200"/>
+          </a:xfrm>
+        </p:spPr>
+        <p:txBody>
+          <a:bodyPr/>
+          <a:lstStyle/>
+          <a:p>
+            <a:pPr algn="ctr"/>
+            <a:r>
+              <a:rPr lang="en-US" dirty="0"/>
+              <a:t>Flowcharts</a:t>
             </a:r>
             <a:br>
               <a:rPr lang="en-US" dirty="0"/>
@@ -3775,37 +4492,47 @@
           </a:p>
         </p:txBody>
       </p:sp>
-      <p:sp>
-        <p:nvSpPr>
-          <p:cNvPr id="3" name="Content Placeholder 2">
-            <a:extLst>
-              <a:ext uri="{FF2B5EF4-FFF2-40B4-BE49-F238E27FC236}">
-                <a16:creationId xmlns:a16="http://schemas.microsoft.com/office/drawing/2014/main" id="{11781E77-CEFA-4731-B566-4CAE30C8AE22}"/>
-              </a:ext>
-            </a:extLst>
-          </p:cNvPr>
-          <p:cNvSpPr>
-            <a:spLocks noGrp="1"/>
-          </p:cNvSpPr>
+      <p:pic>
+        <p:nvPicPr>
+          <p:cNvPr id="6" name="Content Placeholder 5">
+            <a:extLst>
+              <a:ext uri="{FF2B5EF4-FFF2-40B4-BE49-F238E27FC236}">
+                <a16:creationId xmlns:a16="http://schemas.microsoft.com/office/drawing/2014/main" id="{DCF572A4-F3DF-4356-A797-2D570B824926}"/>
+              </a:ext>
+            </a:extLst>
+          </p:cNvPr>
+          <p:cNvPicPr>
+            <a:picLocks noGrp="1" noChangeAspect="1"/>
+          </p:cNvPicPr>
           <p:nvPr>
             <p:ph idx="1"/>
           </p:nvPr>
-        </p:nvSpPr>
-        <p:spPr/>
-        <p:txBody>
-          <a:bodyPr/>
-          <a:lstStyle/>
-          <a:p>
-            <a:endParaRPr lang="sv-SE"/>
-          </a:p>
-        </p:txBody>
-      </p:sp>
+        </p:nvPicPr>
+        <p:blipFill>
+          <a:blip r:embed="rId2">
+            <a:extLst>
+              <a:ext uri="{28A0092B-C50C-407E-A947-70E740481C1C}">
+                <a14:useLocalDpi xmlns:a14="http://schemas.microsoft.com/office/drawing/2010/main" val="0"/>
+              </a:ext>
+            </a:extLst>
+          </a:blip>
+          <a:stretch>
+            <a:fillRect/>
+          </a:stretch>
+        </p:blipFill>
+        <p:spPr>
+          <a:xfrm>
+            <a:off x="5729654" y="1693069"/>
+            <a:ext cx="6172200" cy="3471862"/>
+          </a:xfrm>
+        </p:spPr>
+      </p:pic>
       <p:sp>
         <p:nvSpPr>
           <p:cNvPr id="4" name="Text Placeholder 3">
             <a:extLst>
               <a:ext uri="{FF2B5EF4-FFF2-40B4-BE49-F238E27FC236}">
-                <a16:creationId xmlns:a16="http://schemas.microsoft.com/office/drawing/2014/main" id="{800CC1F1-FE55-425D-98AB-592001D084C0}"/>
+                <a16:creationId xmlns:a16="http://schemas.microsoft.com/office/drawing/2014/main" id="{5B290FB1-2B04-40EE-AD5E-4AB9A7F3A984}"/>
               </a:ext>
             </a:extLst>
           </p:cNvPr>
@@ -3816,19 +4543,217 @@
             <p:ph type="body" sz="half" idx="2"/>
           </p:nvPr>
         </p:nvSpPr>
-        <p:spPr/>
-        <p:txBody>
-          <a:bodyPr/>
-          <a:lstStyle/>
-          <a:p>
-            <a:endParaRPr lang="sv-SE"/>
+        <p:spPr>
+          <a:xfrm>
+            <a:off x="839788" y="1142999"/>
+            <a:ext cx="4343400" cy="5284177"/>
+          </a:xfrm>
+        </p:spPr>
+        <p:txBody>
+          <a:bodyPr>
+            <a:normAutofit lnSpcReduction="10000"/>
+          </a:bodyPr>
+          <a:lstStyle/>
+          <a:p>
+            <a:r>
+              <a:rPr lang="sv-SE" b="1" dirty="0"/>
+              <a:t>Team that finds enemies first</a:t>
+            </a:r>
+            <a:br>
+              <a:rPr lang="sv-SE" dirty="0"/>
+            </a:br>
+            <a:r>
+              <a:rPr lang="sv-SE" dirty="0"/>
+              <a:t>	▼</a:t>
+            </a:r>
+          </a:p>
+          <a:p>
+            <a:r>
+              <a:rPr lang="sv-SE" i="1" dirty="0"/>
+              <a:t>Blocker</a:t>
+            </a:r>
+            <a:r>
+              <a:rPr lang="sv-SE" dirty="0"/>
+              <a:t> burrows to find enemies </a:t>
+            </a:r>
+            <a:br>
+              <a:rPr lang="sv-SE" dirty="0"/>
+            </a:br>
+            <a:r>
+              <a:rPr lang="sv-SE" dirty="0"/>
+              <a:t>   ► Calls their location to </a:t>
+            </a:r>
+            <a:r>
+              <a:rPr lang="sv-SE" i="1" dirty="0"/>
+              <a:t>Settler</a:t>
+            </a:r>
+            <a:r>
+              <a:rPr lang="sv-SE" dirty="0"/>
+              <a:t> </a:t>
+            </a:r>
+            <a:br>
+              <a:rPr lang="sv-SE" dirty="0"/>
+            </a:br>
+            <a:r>
+              <a:rPr lang="sv-SE" dirty="0"/>
+              <a:t>         ► Settler pings enemies </a:t>
+            </a:r>
+            <a:br>
+              <a:rPr lang="sv-SE" dirty="0"/>
+            </a:br>
+            <a:r>
+              <a:rPr lang="sv-SE" dirty="0"/>
+              <a:t>               ► </a:t>
+            </a:r>
+            <a:r>
+              <a:rPr lang="sv-SE" i="1" dirty="0"/>
+              <a:t>Smasher</a:t>
+            </a:r>
+            <a:r>
+              <a:rPr lang="sv-SE" dirty="0"/>
+              <a:t> sees enemies</a:t>
+            </a:r>
+            <a:br>
+              <a:rPr lang="sv-SE" dirty="0"/>
+            </a:br>
+            <a:r>
+              <a:rPr lang="sv-SE" dirty="0"/>
+              <a:t>                      ► </a:t>
+            </a:r>
+            <a:r>
+              <a:rPr lang="sv-SE" i="1" dirty="0"/>
+              <a:t>Settler</a:t>
+            </a:r>
+            <a:r>
+              <a:rPr lang="sv-SE" dirty="0"/>
+              <a:t> calls where in that visible area he’s going to pull them to </a:t>
+            </a:r>
+            <a:br>
+              <a:rPr lang="sv-SE" dirty="0"/>
+            </a:br>
+            <a:r>
+              <a:rPr lang="sv-SE" dirty="0"/>
+              <a:t>                             ► </a:t>
+            </a:r>
+            <a:r>
+              <a:rPr lang="sv-SE" i="1" dirty="0"/>
+              <a:t>Smasher</a:t>
+            </a:r>
+            <a:r>
+              <a:rPr lang="sv-SE" dirty="0"/>
+              <a:t> tries to hit his </a:t>
+            </a:r>
+          </a:p>
+          <a:p>
+            <a:r>
+              <a:rPr lang="sv-SE" dirty="0"/>
+              <a:t>Hopefully results in a direct hit. </a:t>
+            </a:r>
+          </a:p>
+          <a:p>
+            <a:endParaRPr lang="sv-SE" dirty="0"/>
+          </a:p>
+          <a:p>
+            <a:r>
+              <a:rPr lang="sv-SE" b="1" dirty="0"/>
+              <a:t>Team that gets found</a:t>
+            </a:r>
+          </a:p>
+          <a:p>
+            <a:r>
+              <a:rPr lang="sv-SE" b="1" dirty="0"/>
+              <a:t>	▼</a:t>
+            </a:r>
+          </a:p>
+          <a:p>
+            <a:r>
+              <a:rPr lang="sv-SE" i="1" dirty="0"/>
+              <a:t>Smasher</a:t>
+            </a:r>
+            <a:r>
+              <a:rPr lang="sv-SE" dirty="0"/>
+              <a:t> calls out that they have been spotted </a:t>
+            </a:r>
+            <a:br>
+              <a:rPr lang="sv-SE" dirty="0"/>
+            </a:br>
+            <a:r>
+              <a:rPr lang="sv-SE" dirty="0"/>
+              <a:t>     ► </a:t>
+            </a:r>
+            <a:r>
+              <a:rPr lang="sv-SE" i="1" dirty="0"/>
+              <a:t>Blocker</a:t>
+            </a:r>
+            <a:r>
+              <a:rPr lang="sv-SE" dirty="0"/>
+              <a:t> getting closer to teammates </a:t>
+            </a:r>
+            <a:br>
+              <a:rPr lang="sv-SE" dirty="0"/>
+            </a:br>
+            <a:r>
+              <a:rPr lang="sv-SE" dirty="0"/>
+              <a:t>             ► </a:t>
+            </a:r>
+            <a:r>
+              <a:rPr lang="sv-SE" i="1" dirty="0"/>
+              <a:t>Smasher</a:t>
+            </a:r>
+            <a:r>
+              <a:rPr lang="sv-SE" dirty="0"/>
+              <a:t> calls from where the enemy                    </a:t>
+            </a:r>
+            <a:br>
+              <a:rPr lang="sv-SE" dirty="0"/>
+            </a:br>
+            <a:r>
+              <a:rPr lang="sv-SE" dirty="0"/>
+              <a:t>                  </a:t>
+            </a:r>
+            <a:r>
+              <a:rPr lang="sv-SE" i="1" dirty="0"/>
+              <a:t>SMASH</a:t>
+            </a:r>
+            <a:r>
+              <a:rPr lang="sv-SE" dirty="0"/>
+              <a:t> is coming from </a:t>
+            </a:r>
+            <a:br>
+              <a:rPr lang="sv-SE" dirty="0"/>
+            </a:br>
+            <a:r>
+              <a:rPr lang="sv-SE" dirty="0"/>
+              <a:t>	► </a:t>
+            </a:r>
+            <a:r>
+              <a:rPr lang="sv-SE" i="1" dirty="0"/>
+              <a:t>Settler</a:t>
+            </a:r>
+            <a:r>
+              <a:rPr lang="sv-SE" dirty="0"/>
+              <a:t> makes a guess to ping where 	     the enemies are </a:t>
+            </a:r>
+            <a:br>
+              <a:rPr lang="sv-SE" dirty="0"/>
+            </a:br>
+            <a:r>
+              <a:rPr lang="sv-SE" dirty="0"/>
+              <a:t>	        ► Blocker puts up shield in that 	             direction. </a:t>
+            </a:r>
+          </a:p>
+          <a:p>
+            <a:r>
+              <a:rPr lang="sv-SE" dirty="0"/>
+              <a:t>Hopefully results in a block. </a:t>
+            </a:r>
           </a:p>
         </p:txBody>
       </p:sp>
     </p:spTree>
     <p:extLst>
       <p:ext uri="{BB962C8B-B14F-4D97-AF65-F5344CB8AC3E}">
-        <p14:creationId xmlns:p14="http://schemas.microsoft.com/office/powerpoint/2010/main" val="4149728028"/>
+        <p14:creationId xmlns:p14="http://schemas.microsoft.com/office/powerpoint/2010/main" val="62444224"/>
       </p:ext>
     </p:extLst>
   </p:cSld>
@@ -3860,15 +4785,15 @@
           <p:cNvPr id="2" name="Title 1">
             <a:extLst>
               <a:ext uri="{FF2B5EF4-FFF2-40B4-BE49-F238E27FC236}">
-                <a16:creationId xmlns:a16="http://schemas.microsoft.com/office/drawing/2014/main" id="{63802A01-1A87-452E-879C-0967E50D667B}"/>
-              </a:ext>
-            </a:extLst>
-          </p:cNvPr>
-          <p:cNvSpPr>
-            <a:spLocks noGrp="1"/>
-          </p:cNvSpPr>
-          <p:nvPr>
-            <p:ph type="ctrTitle"/>
+                <a16:creationId xmlns:a16="http://schemas.microsoft.com/office/drawing/2014/main" id="{91C69F72-C47A-45AB-A8CF-F61E8D4801E2}"/>
+              </a:ext>
+            </a:extLst>
+          </p:cNvPr>
+          <p:cNvSpPr>
+            <a:spLocks noGrp="1"/>
+          </p:cNvSpPr>
+          <p:nvPr>
+            <p:ph type="title"/>
           </p:nvPr>
         </p:nvSpPr>
         <p:spPr/>
@@ -3878,26 +4803,29 @@
           <a:p>
             <a:r>
               <a:rPr lang="en-US" dirty="0"/>
-              <a:t>Technicalities</a:t>
-            </a:r>
+              <a:t>UI Navigation</a:t>
+            </a:r>
+            <a:br>
+              <a:rPr lang="en-US" dirty="0"/>
+            </a:br>
             <a:endParaRPr lang="sv-SE" dirty="0"/>
           </a:p>
         </p:txBody>
       </p:sp>
       <p:sp>
         <p:nvSpPr>
-          <p:cNvPr id="3" name="Subtitle 2">
-            <a:extLst>
-              <a:ext uri="{FF2B5EF4-FFF2-40B4-BE49-F238E27FC236}">
-                <a16:creationId xmlns:a16="http://schemas.microsoft.com/office/drawing/2014/main" id="{8CBC278F-D3F7-4925-AB76-D9E48EC2A115}"/>
-              </a:ext>
-            </a:extLst>
-          </p:cNvPr>
-          <p:cNvSpPr>
-            <a:spLocks noGrp="1"/>
-          </p:cNvSpPr>
-          <p:nvPr>
-            <p:ph type="subTitle" idx="1"/>
+          <p:cNvPr id="3" name="Content Placeholder 2">
+            <a:extLst>
+              <a:ext uri="{FF2B5EF4-FFF2-40B4-BE49-F238E27FC236}">
+                <a16:creationId xmlns:a16="http://schemas.microsoft.com/office/drawing/2014/main" id="{11781E77-CEFA-4731-B566-4CAE30C8AE22}"/>
+              </a:ext>
+            </a:extLst>
+          </p:cNvPr>
+          <p:cNvSpPr>
+            <a:spLocks noGrp="1"/>
+          </p:cNvSpPr>
+          <p:nvPr>
+            <p:ph idx="1"/>
           </p:nvPr>
         </p:nvSpPr>
         <p:spPr/>
@@ -3905,10 +4833,31 @@
           <a:bodyPr/>
           <a:lstStyle/>
           <a:p>
-            <a:r>
-              <a:rPr lang="en-US" dirty="0"/>
-              <a:t>And things I find boring</a:t>
-            </a:r>
+            <a:endParaRPr lang="sv-SE"/>
+          </a:p>
+        </p:txBody>
+      </p:sp>
+      <p:sp>
+        <p:nvSpPr>
+          <p:cNvPr id="4" name="Text Placeholder 3">
+            <a:extLst>
+              <a:ext uri="{FF2B5EF4-FFF2-40B4-BE49-F238E27FC236}">
+                <a16:creationId xmlns:a16="http://schemas.microsoft.com/office/drawing/2014/main" id="{800CC1F1-FE55-425D-98AB-592001D084C0}"/>
+              </a:ext>
+            </a:extLst>
+          </p:cNvPr>
+          <p:cNvSpPr>
+            <a:spLocks noGrp="1"/>
+          </p:cNvSpPr>
+          <p:nvPr>
+            <p:ph type="body" sz="half" idx="2"/>
+          </p:nvPr>
+        </p:nvSpPr>
+        <p:spPr/>
+        <p:txBody>
+          <a:bodyPr/>
+          <a:lstStyle/>
+          <a:p>
             <a:endParaRPr lang="sv-SE" dirty="0"/>
           </a:p>
         </p:txBody>
@@ -3916,7 +4865,7 @@
     </p:spTree>
     <p:extLst>
       <p:ext uri="{BB962C8B-B14F-4D97-AF65-F5344CB8AC3E}">
-        <p14:creationId xmlns:p14="http://schemas.microsoft.com/office/powerpoint/2010/main" val="3636568418"/>
+        <p14:creationId xmlns:p14="http://schemas.microsoft.com/office/powerpoint/2010/main" val="4149728028"/>
       </p:ext>
     </p:extLst>
   </p:cSld>
@@ -3948,15 +4897,15 @@
           <p:cNvPr id="2" name="Title 1">
             <a:extLst>
               <a:ext uri="{FF2B5EF4-FFF2-40B4-BE49-F238E27FC236}">
-                <a16:creationId xmlns:a16="http://schemas.microsoft.com/office/drawing/2014/main" id="{C8962F2B-CB0F-4CA8-A918-05CE3FD1EAF5}"/>
-              </a:ext>
-            </a:extLst>
-          </p:cNvPr>
-          <p:cNvSpPr>
-            <a:spLocks noGrp="1"/>
-          </p:cNvSpPr>
-          <p:nvPr>
-            <p:ph type="title"/>
+                <a16:creationId xmlns:a16="http://schemas.microsoft.com/office/drawing/2014/main" id="{63802A01-1A87-452E-879C-0967E50D667B}"/>
+              </a:ext>
+            </a:extLst>
+          </p:cNvPr>
+          <p:cNvSpPr>
+            <a:spLocks noGrp="1"/>
+          </p:cNvSpPr>
+          <p:nvPr>
+            <p:ph type="ctrTitle"/>
           </p:nvPr>
         </p:nvSpPr>
         <p:spPr/>
@@ -3966,117 +4915,37 @@
           <a:p>
             <a:r>
               <a:rPr lang="en-US" dirty="0"/>
-              <a:t>Audience</a:t>
-            </a:r>
-            <a:br>
-              <a:rPr lang="sv-SE" dirty="0"/>
-            </a:br>
+              <a:t>Technicalities</a:t>
+            </a:r>
             <a:endParaRPr lang="sv-SE" dirty="0"/>
           </a:p>
         </p:txBody>
       </p:sp>
-      <p:pic>
-        <p:nvPicPr>
-          <p:cNvPr id="6" name="Content Placeholder 5">
-            <a:extLst>
-              <a:ext uri="{FF2B5EF4-FFF2-40B4-BE49-F238E27FC236}">
-                <a16:creationId xmlns:a16="http://schemas.microsoft.com/office/drawing/2014/main" id="{199B2FD2-5056-4C88-8679-3FCB0B8A8B58}"/>
-              </a:ext>
-            </a:extLst>
-          </p:cNvPr>
-          <p:cNvPicPr>
-            <a:picLocks noGrp="1" noChangeAspect="1"/>
-          </p:cNvPicPr>
-          <p:nvPr>
-            <p:ph idx="1"/>
-          </p:nvPr>
-        </p:nvPicPr>
-        <p:blipFill>
-          <a:blip r:embed="rId2">
-            <a:extLst>
-              <a:ext uri="{28A0092B-C50C-407E-A947-70E740481C1C}">
-                <a14:useLocalDpi xmlns:a14="http://schemas.microsoft.com/office/drawing/2010/main" val="0"/>
-              </a:ext>
-            </a:extLst>
-          </a:blip>
-          <a:stretch>
-            <a:fillRect/>
-          </a:stretch>
-        </p:blipFill>
-        <p:spPr>
-          <a:xfrm>
-            <a:off x="5183188" y="1365833"/>
-            <a:ext cx="6172200" cy="4116809"/>
-          </a:xfrm>
-        </p:spPr>
-      </p:pic>
-      <p:sp>
-        <p:nvSpPr>
-          <p:cNvPr id="4" name="Text Placeholder 3">
-            <a:extLst>
-              <a:ext uri="{FF2B5EF4-FFF2-40B4-BE49-F238E27FC236}">
-                <a16:creationId xmlns:a16="http://schemas.microsoft.com/office/drawing/2014/main" id="{E70149B6-942D-4079-88D0-5206F6085099}"/>
-              </a:ext>
-            </a:extLst>
-          </p:cNvPr>
-          <p:cNvSpPr>
-            <a:spLocks noGrp="1"/>
-          </p:cNvSpPr>
-          <p:nvPr>
-            <p:ph type="body" sz="half" idx="2"/>
+      <p:sp>
+        <p:nvSpPr>
+          <p:cNvPr id="3" name="Subtitle 2">
+            <a:extLst>
+              <a:ext uri="{FF2B5EF4-FFF2-40B4-BE49-F238E27FC236}">
+                <a16:creationId xmlns:a16="http://schemas.microsoft.com/office/drawing/2014/main" id="{8CBC278F-D3F7-4925-AB76-D9E48EC2A115}"/>
+              </a:ext>
+            </a:extLst>
+          </p:cNvPr>
+          <p:cNvSpPr>
+            <a:spLocks noGrp="1"/>
+          </p:cNvSpPr>
+          <p:nvPr>
+            <p:ph type="subTitle" idx="1"/>
           </p:nvPr>
         </p:nvSpPr>
         <p:spPr/>
         <p:txBody>
-          <a:bodyPr>
-            <a:normAutofit/>
-          </a:bodyPr>
-          <a:lstStyle/>
-          <a:p>
-            <a:r>
-              <a:rPr lang="en-US" dirty="0"/>
-              <a:t>People that play </a:t>
-            </a:r>
-            <a:r>
-              <a:rPr lang="en-US" dirty="0" err="1"/>
-              <a:t>mobas</a:t>
-            </a:r>
-            <a:r>
-              <a:rPr lang="en-US" dirty="0"/>
-              <a:t> with friends but want a better way of expressing their teamwork than the long downtime fights that focus more on individual play rather than teamwork. </a:t>
-            </a:r>
-            <a:endParaRPr lang="sv-SE" dirty="0"/>
-          </a:p>
-          <a:p>
-            <a:r>
-              <a:rPr lang="en-US" dirty="0"/>
-              <a:t>People that enjoy sports and the competitive feeling of team vs team. </a:t>
-            </a:r>
-          </a:p>
-          <a:p>
-            <a:r>
-              <a:rPr lang="en-US" dirty="0"/>
-              <a:t>PROBLEM: </a:t>
-            </a:r>
-            <a:r>
-              <a:rPr lang="en-US" dirty="0" err="1"/>
-              <a:t>Mobas</a:t>
-            </a:r>
-            <a:r>
-              <a:rPr lang="en-US" dirty="0"/>
-              <a:t> are not normally controller played games. Target audience might not have required hardware. </a:t>
-            </a:r>
-          </a:p>
-          <a:p>
-            <a:r>
-              <a:rPr lang="en-US" dirty="0"/>
-              <a:t>SOLUTION: Switch to keyboard and mouse for input? </a:t>
-            </a:r>
-          </a:p>
-          <a:p>
-            <a:endParaRPr lang="sv-SE" dirty="0"/>
-          </a:p>
-          <a:p>
+          <a:bodyPr/>
+          <a:lstStyle/>
+          <a:p>
+            <a:r>
+              <a:rPr lang="en-US" dirty="0"/>
+              <a:t>And things I find boring</a:t>
+            </a:r>
             <a:endParaRPr lang="sv-SE" dirty="0"/>
           </a:p>
         </p:txBody>
@@ -4084,7 +4953,7 @@
     </p:spTree>
     <p:extLst>
       <p:ext uri="{BB962C8B-B14F-4D97-AF65-F5344CB8AC3E}">
-        <p14:creationId xmlns:p14="http://schemas.microsoft.com/office/powerpoint/2010/main" val="292963608"/>
+        <p14:creationId xmlns:p14="http://schemas.microsoft.com/office/powerpoint/2010/main" val="3636568418"/>
       </p:ext>
     </p:extLst>
   </p:cSld>
@@ -4116,6 +4985,174 @@
           <p:cNvPr id="2" name="Title 1">
             <a:extLst>
               <a:ext uri="{FF2B5EF4-FFF2-40B4-BE49-F238E27FC236}">
+                <a16:creationId xmlns:a16="http://schemas.microsoft.com/office/drawing/2014/main" id="{C8962F2B-CB0F-4CA8-A918-05CE3FD1EAF5}"/>
+              </a:ext>
+            </a:extLst>
+          </p:cNvPr>
+          <p:cNvSpPr>
+            <a:spLocks noGrp="1"/>
+          </p:cNvSpPr>
+          <p:nvPr>
+            <p:ph type="title"/>
+          </p:nvPr>
+        </p:nvSpPr>
+        <p:spPr/>
+        <p:txBody>
+          <a:bodyPr/>
+          <a:lstStyle/>
+          <a:p>
+            <a:r>
+              <a:rPr lang="en-US" dirty="0"/>
+              <a:t>Audience</a:t>
+            </a:r>
+            <a:br>
+              <a:rPr lang="sv-SE" dirty="0"/>
+            </a:br>
+            <a:endParaRPr lang="sv-SE" dirty="0"/>
+          </a:p>
+        </p:txBody>
+      </p:sp>
+      <p:pic>
+        <p:nvPicPr>
+          <p:cNvPr id="6" name="Content Placeholder 5">
+            <a:extLst>
+              <a:ext uri="{FF2B5EF4-FFF2-40B4-BE49-F238E27FC236}">
+                <a16:creationId xmlns:a16="http://schemas.microsoft.com/office/drawing/2014/main" id="{199B2FD2-5056-4C88-8679-3FCB0B8A8B58}"/>
+              </a:ext>
+            </a:extLst>
+          </p:cNvPr>
+          <p:cNvPicPr>
+            <a:picLocks noGrp="1" noChangeAspect="1"/>
+          </p:cNvPicPr>
+          <p:nvPr>
+            <p:ph idx="1"/>
+          </p:nvPr>
+        </p:nvPicPr>
+        <p:blipFill>
+          <a:blip r:embed="rId2">
+            <a:extLst>
+              <a:ext uri="{28A0092B-C50C-407E-A947-70E740481C1C}">
+                <a14:useLocalDpi xmlns:a14="http://schemas.microsoft.com/office/drawing/2010/main" val="0"/>
+              </a:ext>
+            </a:extLst>
+          </a:blip>
+          <a:stretch>
+            <a:fillRect/>
+          </a:stretch>
+        </p:blipFill>
+        <p:spPr>
+          <a:xfrm>
+            <a:off x="5183188" y="1365833"/>
+            <a:ext cx="6172200" cy="4116809"/>
+          </a:xfrm>
+        </p:spPr>
+      </p:pic>
+      <p:sp>
+        <p:nvSpPr>
+          <p:cNvPr id="4" name="Text Placeholder 3">
+            <a:extLst>
+              <a:ext uri="{FF2B5EF4-FFF2-40B4-BE49-F238E27FC236}">
+                <a16:creationId xmlns:a16="http://schemas.microsoft.com/office/drawing/2014/main" id="{E70149B6-942D-4079-88D0-5206F6085099}"/>
+              </a:ext>
+            </a:extLst>
+          </p:cNvPr>
+          <p:cNvSpPr>
+            <a:spLocks noGrp="1"/>
+          </p:cNvSpPr>
+          <p:nvPr>
+            <p:ph type="body" sz="half" idx="2"/>
+          </p:nvPr>
+        </p:nvSpPr>
+        <p:spPr/>
+        <p:txBody>
+          <a:bodyPr>
+            <a:normAutofit/>
+          </a:bodyPr>
+          <a:lstStyle/>
+          <a:p>
+            <a:r>
+              <a:rPr lang="en-US" dirty="0"/>
+              <a:t>People that play </a:t>
+            </a:r>
+            <a:r>
+              <a:rPr lang="en-US" dirty="0" err="1"/>
+              <a:t>mobas</a:t>
+            </a:r>
+            <a:r>
+              <a:rPr lang="en-US" dirty="0"/>
+              <a:t> with friends but want a better way of expressing their teamwork than the long downtime fights that focus more on individual play rather than teamwork. </a:t>
+            </a:r>
+            <a:endParaRPr lang="sv-SE" dirty="0"/>
+          </a:p>
+          <a:p>
+            <a:r>
+              <a:rPr lang="en-US" dirty="0"/>
+              <a:t>People that enjoy sports and the competitive feeling of team vs team. </a:t>
+            </a:r>
+          </a:p>
+          <a:p>
+            <a:r>
+              <a:rPr lang="en-US" dirty="0"/>
+              <a:t>PROBLEM: </a:t>
+            </a:r>
+            <a:r>
+              <a:rPr lang="en-US" dirty="0" err="1"/>
+              <a:t>Mobas</a:t>
+            </a:r>
+            <a:r>
+              <a:rPr lang="en-US" dirty="0"/>
+              <a:t> are not normally controller played games. Target audience might not have required hardware. </a:t>
+            </a:r>
+          </a:p>
+          <a:p>
+            <a:r>
+              <a:rPr lang="en-US" dirty="0"/>
+              <a:t>SOLUTION: Switch to keyboard and mouse for input? </a:t>
+            </a:r>
+          </a:p>
+          <a:p>
+            <a:endParaRPr lang="sv-SE" dirty="0"/>
+          </a:p>
+          <a:p>
+            <a:endParaRPr lang="sv-SE" dirty="0"/>
+          </a:p>
+        </p:txBody>
+      </p:sp>
+    </p:spTree>
+    <p:extLst>
+      <p:ext uri="{BB962C8B-B14F-4D97-AF65-F5344CB8AC3E}">
+        <p14:creationId xmlns:p14="http://schemas.microsoft.com/office/powerpoint/2010/main" val="292963608"/>
+      </p:ext>
+    </p:extLst>
+  </p:cSld>
+  <p:clrMapOvr>
+    <a:masterClrMapping/>
+  </p:clrMapOvr>
+</p:sld>
+</file>
+
+<file path=ppt/slides/slide16.xml><?xml version="1.0" encoding="utf-8"?>
+<p:sld xmlns:a="http://schemas.openxmlformats.org/drawingml/2006/main" xmlns:r="http://schemas.openxmlformats.org/officeDocument/2006/relationships" xmlns:p="http://schemas.openxmlformats.org/presentationml/2006/main">
+  <p:cSld>
+    <p:spTree>
+      <p:nvGrpSpPr>
+        <p:cNvPr id="1" name=""/>
+        <p:cNvGrpSpPr/>
+        <p:nvPr/>
+      </p:nvGrpSpPr>
+      <p:grpSpPr>
+        <a:xfrm>
+          <a:off x="0" y="0"/>
+          <a:ext cx="0" cy="0"/>
+          <a:chOff x="0" y="0"/>
+          <a:chExt cx="0" cy="0"/>
+        </a:xfrm>
+      </p:grpSpPr>
+      <p:sp>
+        <p:nvSpPr>
+          <p:cNvPr id="2" name="Title 1">
+            <a:extLst>
+              <a:ext uri="{FF2B5EF4-FFF2-40B4-BE49-F238E27FC236}">
                 <a16:creationId xmlns:a16="http://schemas.microsoft.com/office/drawing/2014/main" id="{80B5F65D-C035-4D36-82DC-14D2B496D935}"/>
               </a:ext>
             </a:extLst>
@@ -4216,7 +5253,7 @@
 </p:sld>
 </file>
 
-<file path=ppt/slides/slide16.xml><?xml version="1.0" encoding="utf-8"?>
+<file path=ppt/slides/slide17.xml><?xml version="1.0" encoding="utf-8"?>
 <p:sld xmlns:a="http://schemas.openxmlformats.org/drawingml/2006/main" xmlns:r="http://schemas.openxmlformats.org/officeDocument/2006/relationships" xmlns:p="http://schemas.openxmlformats.org/presentationml/2006/main">
   <p:cSld>
     <p:spTree>
@@ -4583,128 +5620,6 @@
           <p:cNvPr id="2" name="Title 1">
             <a:extLst>
               <a:ext uri="{FF2B5EF4-FFF2-40B4-BE49-F238E27FC236}">
-                <a16:creationId xmlns:a16="http://schemas.microsoft.com/office/drawing/2014/main" id="{984EEE85-97F6-4218-8CD9-52D620348135}"/>
-              </a:ext>
-            </a:extLst>
-          </p:cNvPr>
-          <p:cNvSpPr>
-            <a:spLocks noGrp="1"/>
-          </p:cNvSpPr>
-          <p:nvPr>
-            <p:ph type="title"/>
-          </p:nvPr>
-        </p:nvSpPr>
-        <p:spPr/>
-        <p:txBody>
-          <a:bodyPr/>
-          <a:lstStyle/>
-          <a:p>
-            <a:r>
-              <a:rPr lang="en-US" dirty="0"/>
-              <a:t>Flowchart</a:t>
-            </a:r>
-            <a:br>
-              <a:rPr lang="en-US" dirty="0"/>
-            </a:br>
-            <a:endParaRPr lang="sv-SE" dirty="0"/>
-          </a:p>
-        </p:txBody>
-      </p:sp>
-      <p:pic>
-        <p:nvPicPr>
-          <p:cNvPr id="6" name="Content Placeholder 5">
-            <a:extLst>
-              <a:ext uri="{FF2B5EF4-FFF2-40B4-BE49-F238E27FC236}">
-                <a16:creationId xmlns:a16="http://schemas.microsoft.com/office/drawing/2014/main" id="{DCF572A4-F3DF-4356-A797-2D570B824926}"/>
-              </a:ext>
-            </a:extLst>
-          </p:cNvPr>
-          <p:cNvPicPr>
-            <a:picLocks noGrp="1" noChangeAspect="1"/>
-          </p:cNvPicPr>
-          <p:nvPr>
-            <p:ph idx="1"/>
-          </p:nvPr>
-        </p:nvPicPr>
-        <p:blipFill>
-          <a:blip r:embed="rId2">
-            <a:extLst>
-              <a:ext uri="{28A0092B-C50C-407E-A947-70E740481C1C}">
-                <a14:useLocalDpi xmlns:a14="http://schemas.microsoft.com/office/drawing/2010/main" val="0"/>
-              </a:ext>
-            </a:extLst>
-          </a:blip>
-          <a:stretch>
-            <a:fillRect/>
-          </a:stretch>
-        </p:blipFill>
-        <p:spPr>
-          <a:xfrm>
-            <a:off x="5183188" y="1688306"/>
-            <a:ext cx="6172200" cy="3471862"/>
-          </a:xfrm>
-        </p:spPr>
-      </p:pic>
-      <p:sp>
-        <p:nvSpPr>
-          <p:cNvPr id="4" name="Text Placeholder 3">
-            <a:extLst>
-              <a:ext uri="{FF2B5EF4-FFF2-40B4-BE49-F238E27FC236}">
-                <a16:creationId xmlns:a16="http://schemas.microsoft.com/office/drawing/2014/main" id="{5B290FB1-2B04-40EE-AD5E-4AB9A7F3A984}"/>
-              </a:ext>
-            </a:extLst>
-          </p:cNvPr>
-          <p:cNvSpPr>
-            <a:spLocks noGrp="1"/>
-          </p:cNvSpPr>
-          <p:nvPr>
-            <p:ph type="body" sz="half" idx="2"/>
-          </p:nvPr>
-        </p:nvSpPr>
-        <p:spPr/>
-        <p:txBody>
-          <a:bodyPr/>
-          <a:lstStyle/>
-          <a:p>
-            <a:endParaRPr lang="sv-SE"/>
-          </a:p>
-        </p:txBody>
-      </p:sp>
-    </p:spTree>
-    <p:extLst>
-      <p:ext uri="{BB962C8B-B14F-4D97-AF65-F5344CB8AC3E}">
-        <p14:creationId xmlns:p14="http://schemas.microsoft.com/office/powerpoint/2010/main" val="62444224"/>
-      </p:ext>
-    </p:extLst>
-  </p:cSld>
-  <p:clrMapOvr>
-    <a:masterClrMapping/>
-  </p:clrMapOvr>
-</p:sld>
-</file>
-
-<file path=ppt/slides/slide5.xml><?xml version="1.0" encoding="utf-8"?>
-<p:sld xmlns:a="http://schemas.openxmlformats.org/drawingml/2006/main" xmlns:r="http://schemas.openxmlformats.org/officeDocument/2006/relationships" xmlns:p="http://schemas.openxmlformats.org/presentationml/2006/main">
-  <p:cSld>
-    <p:spTree>
-      <p:nvGrpSpPr>
-        <p:cNvPr id="1" name=""/>
-        <p:cNvGrpSpPr/>
-        <p:nvPr/>
-      </p:nvGrpSpPr>
-      <p:grpSpPr>
-        <a:xfrm>
-          <a:off x="0" y="0"/>
-          <a:ext cx="0" cy="0"/>
-          <a:chOff x="0" y="0"/>
-          <a:chExt cx="0" cy="0"/>
-        </a:xfrm>
-      </p:grpSpPr>
-      <p:sp>
-        <p:nvSpPr>
-          <p:cNvPr id="2" name="Title 1">
-            <a:extLst>
-              <a:ext uri="{FF2B5EF4-FFF2-40B4-BE49-F238E27FC236}">
                 <a16:creationId xmlns:a16="http://schemas.microsoft.com/office/drawing/2014/main" id="{C11F10CA-1F45-4870-B45A-607B37484767}"/>
               </a:ext>
             </a:extLst>
@@ -4882,6 +5797,297 @@
 </p:sld>
 </file>
 
+<file path=ppt/slides/slide5.xml><?xml version="1.0" encoding="utf-8"?>
+<p:sld xmlns:a="http://schemas.openxmlformats.org/drawingml/2006/main" xmlns:r="http://schemas.openxmlformats.org/officeDocument/2006/relationships" xmlns:p="http://schemas.openxmlformats.org/presentationml/2006/main">
+  <p:cSld>
+    <p:spTree>
+      <p:nvGrpSpPr>
+        <p:cNvPr id="1" name=""/>
+        <p:cNvGrpSpPr/>
+        <p:nvPr/>
+      </p:nvGrpSpPr>
+      <p:grpSpPr>
+        <a:xfrm>
+          <a:off x="0" y="0"/>
+          <a:ext cx="0" cy="0"/>
+          <a:chOff x="0" y="0"/>
+          <a:chExt cx="0" cy="0"/>
+        </a:xfrm>
+      </p:grpSpPr>
+      <p:sp>
+        <p:nvSpPr>
+          <p:cNvPr id="2" name="Title 1">
+            <a:extLst>
+              <a:ext uri="{FF2B5EF4-FFF2-40B4-BE49-F238E27FC236}">
+                <a16:creationId xmlns:a16="http://schemas.microsoft.com/office/drawing/2014/main" id="{ED66AA39-7D30-4C7A-BB4B-4753E492CC83}"/>
+              </a:ext>
+            </a:extLst>
+          </p:cNvPr>
+          <p:cNvSpPr>
+            <a:spLocks noGrp="1"/>
+          </p:cNvSpPr>
+          <p:nvPr>
+            <p:ph type="title"/>
+          </p:nvPr>
+        </p:nvSpPr>
+        <p:spPr/>
+        <p:txBody>
+          <a:bodyPr/>
+          <a:lstStyle/>
+          <a:p>
+            <a:r>
+              <a:rPr lang="en-US" i="1" dirty="0"/>
+              <a:t>Team Spirit</a:t>
+            </a:r>
+            <a:br>
+              <a:rPr lang="en-US" i="1" dirty="0"/>
+            </a:br>
+            <a:endParaRPr lang="sv-SE" i="1" dirty="0"/>
+          </a:p>
+        </p:txBody>
+      </p:sp>
+      <p:pic>
+        <p:nvPicPr>
+          <p:cNvPr id="6" name="Content Placeholder 5">
+            <a:extLst>
+              <a:ext uri="{FF2B5EF4-FFF2-40B4-BE49-F238E27FC236}">
+                <a16:creationId xmlns:a16="http://schemas.microsoft.com/office/drawing/2014/main" id="{E940C70E-52D8-4E6A-B1C9-5014B433C8B2}"/>
+              </a:ext>
+            </a:extLst>
+          </p:cNvPr>
+          <p:cNvPicPr>
+            <a:picLocks noGrp="1" noChangeAspect="1"/>
+          </p:cNvPicPr>
+          <p:nvPr>
+            <p:ph idx="1"/>
+          </p:nvPr>
+        </p:nvPicPr>
+        <p:blipFill>
+          <a:blip r:embed="rId2">
+            <a:extLst>
+              <a:ext uri="{28A0092B-C50C-407E-A947-70E740481C1C}">
+                <a14:useLocalDpi xmlns:a14="http://schemas.microsoft.com/office/drawing/2010/main" val="0"/>
+              </a:ext>
+            </a:extLst>
+          </a:blip>
+          <a:stretch>
+            <a:fillRect/>
+          </a:stretch>
+        </p:blipFill>
+        <p:spPr>
+          <a:xfrm>
+            <a:off x="8547098" y="248492"/>
+            <a:ext cx="3644902" cy="3289150"/>
+          </a:xfrm>
+        </p:spPr>
+      </p:pic>
+      <p:sp>
+        <p:nvSpPr>
+          <p:cNvPr id="4" name="Text Placeholder 3">
+            <a:extLst>
+              <a:ext uri="{FF2B5EF4-FFF2-40B4-BE49-F238E27FC236}">
+                <a16:creationId xmlns:a16="http://schemas.microsoft.com/office/drawing/2014/main" id="{5DF5992A-1B73-4309-A084-5BEEFF417477}"/>
+              </a:ext>
+            </a:extLst>
+          </p:cNvPr>
+          <p:cNvSpPr>
+            <a:spLocks noGrp="1"/>
+          </p:cNvSpPr>
+          <p:nvPr>
+            <p:ph type="body" sz="half" idx="2"/>
+          </p:nvPr>
+        </p:nvSpPr>
+        <p:spPr/>
+        <p:txBody>
+          <a:bodyPr/>
+          <a:lstStyle/>
+          <a:p>
+            <a:r>
+              <a:rPr lang="en-US" dirty="0"/>
+              <a:t>The health of the game</a:t>
+            </a:r>
+          </a:p>
+          <a:p>
+            <a:r>
+              <a:rPr lang="en-US" dirty="0"/>
+              <a:t>Win by reducing enemies’ team spirit to 0</a:t>
+            </a:r>
+          </a:p>
+          <a:p>
+            <a:r>
+              <a:rPr lang="en-US" dirty="0"/>
+              <a:t>You share team spirit with you teammates</a:t>
+            </a:r>
+          </a:p>
+          <a:p>
+            <a:r>
+              <a:rPr lang="en-US" dirty="0"/>
+              <a:t>Team spirit is </a:t>
+            </a:r>
+            <a:r>
+              <a:rPr lang="en-US" i="1" dirty="0"/>
+              <a:t>gained</a:t>
+            </a:r>
+            <a:r>
+              <a:rPr lang="en-US" dirty="0"/>
+              <a:t> by:</a:t>
+            </a:r>
+          </a:p>
+          <a:p>
+            <a:pPr marL="285750" indent="-285750">
+              <a:buFont typeface="Arial" panose="020B0604020202020204" pitchFamily="34" charset="0"/>
+              <a:buChar char="•"/>
+            </a:pPr>
+            <a:r>
+              <a:rPr lang="en-US" dirty="0"/>
+              <a:t>Hitting and combining skills</a:t>
+            </a:r>
+          </a:p>
+          <a:p>
+            <a:pPr marL="285750" indent="-285750">
+              <a:buFont typeface="Arial" panose="020B0604020202020204" pitchFamily="34" charset="0"/>
+              <a:buChar char="•"/>
+            </a:pPr>
+            <a:r>
+              <a:rPr lang="en-US" dirty="0"/>
+              <a:t>Sticking together with your teammates</a:t>
+            </a:r>
+          </a:p>
+          <a:p>
+            <a:pPr marL="285750" indent="-285750">
+              <a:buFont typeface="Arial" panose="020B0604020202020204" pitchFamily="34" charset="0"/>
+              <a:buChar char="•"/>
+            </a:pPr>
+            <a:endParaRPr lang="en-US" dirty="0"/>
+          </a:p>
+          <a:p>
+            <a:r>
+              <a:rPr lang="en-US" dirty="0"/>
+              <a:t>Team spirit is </a:t>
+            </a:r>
+            <a:r>
+              <a:rPr lang="en-US" i="1" dirty="0"/>
+              <a:t>lost</a:t>
+            </a:r>
+            <a:r>
+              <a:rPr lang="en-US" dirty="0"/>
+              <a:t> by: </a:t>
+            </a:r>
+          </a:p>
+          <a:p>
+            <a:pPr marL="285750" indent="-285750">
+              <a:buFont typeface="Arial" panose="020B0604020202020204" pitchFamily="34" charset="0"/>
+              <a:buChar char="•"/>
+            </a:pPr>
+            <a:r>
+              <a:rPr lang="en-US" dirty="0"/>
+              <a:t>Getting direct hits from enemy </a:t>
+            </a:r>
+            <a:r>
+              <a:rPr lang="en-US" i="1" dirty="0"/>
+              <a:t>smasher</a:t>
+            </a:r>
+          </a:p>
+          <a:p>
+            <a:pPr marL="285750" indent="-285750">
+              <a:buFont typeface="Arial" panose="020B0604020202020204" pitchFamily="34" charset="0"/>
+              <a:buChar char="•"/>
+            </a:pPr>
+            <a:r>
+              <a:rPr lang="en-US" dirty="0"/>
+              <a:t>Being apart from teammates </a:t>
+            </a:r>
+          </a:p>
+          <a:p>
+            <a:endParaRPr lang="sv-SE" dirty="0"/>
+          </a:p>
+        </p:txBody>
+      </p:sp>
+      <p:pic>
+        <p:nvPicPr>
+          <p:cNvPr id="8" name="Picture 7">
+            <a:extLst>
+              <a:ext uri="{FF2B5EF4-FFF2-40B4-BE49-F238E27FC236}">
+                <a16:creationId xmlns:a16="http://schemas.microsoft.com/office/drawing/2014/main" id="{CCF1F00D-D827-4AA3-9FCC-2728B4C8D4C0}"/>
+              </a:ext>
+            </a:extLst>
+          </p:cNvPr>
+          <p:cNvPicPr>
+            <a:picLocks noChangeAspect="1"/>
+          </p:cNvPicPr>
+          <p:nvPr/>
+        </p:nvPicPr>
+        <p:blipFill>
+          <a:blip r:embed="rId3">
+            <a:extLst>
+              <a:ext uri="{28A0092B-C50C-407E-A947-70E740481C1C}">
+                <a14:useLocalDpi xmlns:a14="http://schemas.microsoft.com/office/drawing/2010/main" val="0"/>
+              </a:ext>
+            </a:extLst>
+          </a:blip>
+          <a:stretch>
+            <a:fillRect/>
+          </a:stretch>
+        </p:blipFill>
+        <p:spPr>
+          <a:xfrm>
+            <a:off x="4992610" y="248492"/>
+            <a:ext cx="3644904" cy="3289151"/>
+          </a:xfrm>
+          <a:prstGeom prst="rect">
+            <a:avLst/>
+          </a:prstGeom>
+        </p:spPr>
+      </p:pic>
+      <p:pic>
+        <p:nvPicPr>
+          <p:cNvPr id="10" name="Picture 9">
+            <a:extLst>
+              <a:ext uri="{FF2B5EF4-FFF2-40B4-BE49-F238E27FC236}">
+                <a16:creationId xmlns:a16="http://schemas.microsoft.com/office/drawing/2014/main" id="{20E4771A-9C9B-4C04-B1C4-9B4E9515B03D}"/>
+              </a:ext>
+            </a:extLst>
+          </p:cNvPr>
+          <p:cNvPicPr>
+            <a:picLocks noChangeAspect="1"/>
+          </p:cNvPicPr>
+          <p:nvPr/>
+        </p:nvPicPr>
+        <p:blipFill>
+          <a:blip r:embed="rId4">
+            <a:extLst>
+              <a:ext uri="{28A0092B-C50C-407E-A947-70E740481C1C}">
+                <a14:useLocalDpi xmlns:a14="http://schemas.microsoft.com/office/drawing/2010/main" val="0"/>
+              </a:ext>
+            </a:extLst>
+          </a:blip>
+          <a:stretch>
+            <a:fillRect/>
+          </a:stretch>
+        </p:blipFill>
+        <p:spPr>
+          <a:xfrm>
+            <a:off x="6683190" y="3320358"/>
+            <a:ext cx="3644902" cy="3289150"/>
+          </a:xfrm>
+          <a:prstGeom prst="rect">
+            <a:avLst/>
+          </a:prstGeom>
+        </p:spPr>
+      </p:pic>
+    </p:spTree>
+    <p:extLst>
+      <p:ext uri="{BB962C8B-B14F-4D97-AF65-F5344CB8AC3E}">
+        <p14:creationId xmlns:p14="http://schemas.microsoft.com/office/powerpoint/2010/main" val="3669198517"/>
+      </p:ext>
+    </p:extLst>
+  </p:cSld>
+  <p:clrMapOvr>
+    <a:masterClrMapping/>
+  </p:clrMapOvr>
+</p:sld>
+</file>
+
 <file path=ppt/slides/slide6.xml><?xml version="1.0" encoding="utf-8"?>
 <p:sld xmlns:a="http://schemas.openxmlformats.org/drawingml/2006/main" xmlns:r="http://schemas.openxmlformats.org/officeDocument/2006/relationships" xmlns:p="http://schemas.openxmlformats.org/presentationml/2006/main">
   <p:cSld>
@@ -4904,7 +6110,7 @@
           <p:cNvPr id="2" name="Title 1">
             <a:extLst>
               <a:ext uri="{FF2B5EF4-FFF2-40B4-BE49-F238E27FC236}">
-                <a16:creationId xmlns:a16="http://schemas.microsoft.com/office/drawing/2014/main" id="{ED66AA39-7D30-4C7A-BB4B-4753E492CC83}"/>
+                <a16:creationId xmlns:a16="http://schemas.microsoft.com/office/drawing/2014/main" id="{6BF93163-499A-47AA-9474-6D2964F120B7}"/>
               </a:ext>
             </a:extLst>
           </p:cNvPr>
@@ -4915,53 +6121,68 @@
             <p:ph type="title"/>
           </p:nvPr>
         </p:nvSpPr>
-        <p:spPr/>
-        <p:txBody>
-          <a:bodyPr/>
-          <a:lstStyle/>
-          <a:p>
-            <a:r>
-              <a:rPr lang="en-US" i="1" dirty="0"/>
-              <a:t>Team Spirit</a:t>
+        <p:spPr>
+          <a:xfrm>
+            <a:off x="839788" y="457200"/>
+            <a:ext cx="3932237" cy="1600200"/>
+          </a:xfrm>
+        </p:spPr>
+        <p:txBody>
+          <a:bodyPr/>
+          <a:lstStyle/>
+          <a:p>
+            <a:r>
+              <a:rPr lang="en-US"/>
+              <a:t>More Gameplay</a:t>
             </a:r>
             <a:br>
-              <a:rPr lang="en-US" i="1" dirty="0"/>
+              <a:rPr lang="en-US"/>
             </a:br>
-            <a:endParaRPr lang="sv-SE" i="1" dirty="0"/>
-          </a:p>
-        </p:txBody>
-      </p:sp>
-      <p:sp>
-        <p:nvSpPr>
-          <p:cNvPr id="3" name="Content Placeholder 2">
-            <a:extLst>
-              <a:ext uri="{FF2B5EF4-FFF2-40B4-BE49-F238E27FC236}">
-                <a16:creationId xmlns:a16="http://schemas.microsoft.com/office/drawing/2014/main" id="{2569DF82-2BCB-473A-906E-5CB5F395D933}"/>
-              </a:ext>
-            </a:extLst>
-          </p:cNvPr>
-          <p:cNvSpPr>
-            <a:spLocks noGrp="1"/>
-          </p:cNvSpPr>
+            <a:endParaRPr lang="sv-SE" dirty="0"/>
+          </a:p>
+        </p:txBody>
+      </p:sp>
+      <p:pic>
+        <p:nvPicPr>
+          <p:cNvPr id="6" name="Content Placeholder 5">
+            <a:extLst>
+              <a:ext uri="{FF2B5EF4-FFF2-40B4-BE49-F238E27FC236}">
+                <a16:creationId xmlns:a16="http://schemas.microsoft.com/office/drawing/2014/main" id="{F89362D3-1C54-4F29-B3B7-AE687E37AF01}"/>
+              </a:ext>
+            </a:extLst>
+          </p:cNvPr>
+          <p:cNvPicPr>
+            <a:picLocks noGrp="1" noChangeAspect="1"/>
+          </p:cNvPicPr>
           <p:nvPr>
             <p:ph idx="1"/>
           </p:nvPr>
-        </p:nvSpPr>
-        <p:spPr/>
-        <p:txBody>
-          <a:bodyPr/>
-          <a:lstStyle/>
-          <a:p>
-            <a:endParaRPr lang="sv-SE"/>
-          </a:p>
-        </p:txBody>
-      </p:sp>
+        </p:nvPicPr>
+        <p:blipFill>
+          <a:blip r:embed="rId2">
+            <a:extLst>
+              <a:ext uri="{28A0092B-C50C-407E-A947-70E740481C1C}">
+                <a14:useLocalDpi xmlns:a14="http://schemas.microsoft.com/office/drawing/2010/main" val="0"/>
+              </a:ext>
+            </a:extLst>
+          </a:blip>
+          <a:stretch>
+            <a:fillRect/>
+          </a:stretch>
+        </p:blipFill>
+        <p:spPr>
+          <a:xfrm>
+            <a:off x="5183188" y="1688306"/>
+            <a:ext cx="6172200" cy="3471862"/>
+          </a:xfrm>
+        </p:spPr>
+      </p:pic>
       <p:sp>
         <p:nvSpPr>
           <p:cNvPr id="4" name="Text Placeholder 3">
             <a:extLst>
               <a:ext uri="{FF2B5EF4-FFF2-40B4-BE49-F238E27FC236}">
-                <a16:creationId xmlns:a16="http://schemas.microsoft.com/office/drawing/2014/main" id="{5DF5992A-1B73-4309-A084-5BEEFF417477}"/>
+                <a16:creationId xmlns:a16="http://schemas.microsoft.com/office/drawing/2014/main" id="{98171228-6868-4C39-AF14-5D4DDFC87CEB}"/>
               </a:ext>
             </a:extLst>
           </p:cNvPr>
@@ -4972,40 +6193,41 @@
             <p:ph type="body" sz="half" idx="2"/>
           </p:nvPr>
         </p:nvSpPr>
-        <p:spPr/>
-        <p:txBody>
-          <a:bodyPr/>
-          <a:lstStyle/>
-          <a:p>
-            <a:r>
-              <a:rPr lang="en-US" dirty="0"/>
-              <a:t>The health of the game</a:t>
-            </a:r>
-          </a:p>
-          <a:p>
-            <a:r>
-              <a:rPr lang="en-US" dirty="0"/>
-              <a:t>Win by reducing enemies’ team spirit to 0</a:t>
-            </a:r>
-          </a:p>
-          <a:p>
-            <a:r>
-              <a:rPr lang="en-US" dirty="0"/>
-              <a:t>You share team spirit with you teammates</a:t>
-            </a:r>
-          </a:p>
-          <a:p>
-            <a:r>
-              <a:rPr lang="en-US" dirty="0"/>
-              <a:t>Team spirit is </a:t>
-            </a:r>
-            <a:r>
-              <a:rPr lang="en-US" i="1" dirty="0"/>
-              <a:t>gained</a:t>
-            </a:r>
-            <a:r>
-              <a:rPr lang="en-US" dirty="0"/>
-              <a:t> by:</a:t>
+        <p:spPr>
+          <a:xfrm>
+            <a:off x="839788" y="2057400"/>
+            <a:ext cx="3932237" cy="3811588"/>
+          </a:xfrm>
+        </p:spPr>
+        <p:txBody>
+          <a:bodyPr/>
+          <a:lstStyle/>
+          <a:p>
+            <a:r>
+              <a:rPr lang="en-US"/>
+              <a:t>All characters are invisible unless pinged by </a:t>
+            </a:r>
+            <a:r>
+              <a:rPr lang="en-US" i="1"/>
+              <a:t>Settler</a:t>
+            </a:r>
+            <a:r>
+              <a:rPr lang="en-US"/>
+              <a:t> or sensed by a burrowed </a:t>
+            </a:r>
+            <a:r>
+              <a:rPr lang="en-US" i="1"/>
+              <a:t>Blocker</a:t>
+            </a:r>
+            <a:r>
+              <a:rPr lang="en-US"/>
+              <a:t>. </a:t>
+            </a:r>
+          </a:p>
+          <a:p>
+            <a:r>
+              <a:rPr lang="en-US"/>
+              <a:t>Or low field of vision</a:t>
             </a:r>
           </a:p>
           <a:p>
@@ -5014,8 +6236,8 @@
               <a:buChar char="•"/>
             </a:pPr>
             <a:r>
-              <a:rPr lang="en-US" dirty="0"/>
-              <a:t>Hitting and combining skills</a:t>
+              <a:rPr lang="en-US"/>
+              <a:t>Dark</a:t>
             </a:r>
           </a:p>
           <a:p>
@@ -5024,8 +6246,8 @@
               <a:buChar char="•"/>
             </a:pPr>
             <a:r>
-              <a:rPr lang="en-US" dirty="0"/>
-              <a:t>Sticking together with your teammates</a:t>
+              <a:rPr lang="en-US"/>
+              <a:t>Lost saturation</a:t>
             </a:r>
           </a:p>
           <a:p>
@@ -5033,20 +6255,9 @@
               <a:buFont typeface="Arial" panose="020B0604020202020204" pitchFamily="34" charset="0"/>
               <a:buChar char="•"/>
             </a:pPr>
-            <a:endParaRPr lang="en-US" dirty="0"/>
-          </a:p>
-          <a:p>
-            <a:r>
-              <a:rPr lang="en-US" dirty="0"/>
-              <a:t>Team spirit is </a:t>
-            </a:r>
-            <a:r>
-              <a:rPr lang="en-US" i="1" dirty="0"/>
-              <a:t>lost</a:t>
-            </a:r>
-            <a:r>
-              <a:rPr lang="en-US" dirty="0"/>
-              <a:t> by: </a:t>
+            <a:r>
+              <a:rPr lang="en-US"/>
+              <a:t>Fog of war</a:t>
             </a:r>
           </a:p>
           <a:p>
@@ -5055,18 +6266,20 @@
               <a:buChar char="•"/>
             </a:pPr>
             <a:r>
-              <a:rPr lang="en-US" dirty="0"/>
-              <a:t>Getting direct hits from enemy smasher</a:t>
-            </a:r>
-          </a:p>
-          <a:p>
-            <a:pPr marL="285750" indent="-285750">
-              <a:buFont typeface="Arial" panose="020B0604020202020204" pitchFamily="34" charset="0"/>
-              <a:buChar char="•"/>
-            </a:pPr>
-            <a:r>
-              <a:rPr lang="en-US" dirty="0"/>
-              <a:t>Being apart from teammates </a:t>
+              <a:rPr lang="en-US"/>
+              <a:t>Less LOD</a:t>
+            </a:r>
+          </a:p>
+          <a:p>
+            <a:r>
+              <a:rPr lang="en-US"/>
+              <a:t>Or tricky terrain</a:t>
+            </a:r>
+          </a:p>
+          <a:p>
+            <a:r>
+              <a:rPr lang="en-US"/>
+              <a:t>Or </a:t>
             </a:r>
           </a:p>
           <a:p>
@@ -5077,7 +6290,7 @@
     </p:spTree>
     <p:extLst>
       <p:ext uri="{BB962C8B-B14F-4D97-AF65-F5344CB8AC3E}">
-        <p14:creationId xmlns:p14="http://schemas.microsoft.com/office/powerpoint/2010/main" val="3669198517"/>
+        <p14:creationId xmlns:p14="http://schemas.microsoft.com/office/powerpoint/2010/main" val="524035836"/>
       </p:ext>
     </p:extLst>
   </p:cSld>
@@ -5109,7 +6322,7 @@
           <p:cNvPr id="2" name="Title 1">
             <a:extLst>
               <a:ext uri="{FF2B5EF4-FFF2-40B4-BE49-F238E27FC236}">
-                <a16:creationId xmlns:a16="http://schemas.microsoft.com/office/drawing/2014/main" id="{6BF93163-499A-47AA-9474-6D2964F120B7}"/>
+                <a16:creationId xmlns:a16="http://schemas.microsoft.com/office/drawing/2014/main" id="{16770CBD-B57C-4612-A0EC-F969F6881FA2}"/>
               </a:ext>
             </a:extLst>
           </p:cNvPr>
@@ -5120,14 +6333,20 @@
             <p:ph type="title"/>
           </p:nvPr>
         </p:nvSpPr>
-        <p:spPr/>
-        <p:txBody>
-          <a:bodyPr/>
-          <a:lstStyle/>
-          <a:p>
-            <a:r>
-              <a:rPr lang="en-US" dirty="0"/>
-              <a:t>More Gameplay</a:t>
+        <p:spPr>
+          <a:xfrm>
+            <a:off x="4129880" y="142721"/>
+            <a:ext cx="3932237" cy="1600200"/>
+          </a:xfrm>
+        </p:spPr>
+        <p:txBody>
+          <a:bodyPr/>
+          <a:lstStyle/>
+          <a:p>
+            <a:pPr algn="ctr"/>
+            <a:r>
+              <a:rPr lang="en-US" dirty="0"/>
+              <a:t>What can I do?</a:t>
             </a:r>
             <a:br>
               <a:rPr lang="en-US" dirty="0"/>
@@ -5136,37 +6355,46 @@
           </a:p>
         </p:txBody>
       </p:sp>
-      <p:sp>
-        <p:nvSpPr>
-          <p:cNvPr id="3" name="Content Placeholder 2">
-            <a:extLst>
-              <a:ext uri="{FF2B5EF4-FFF2-40B4-BE49-F238E27FC236}">
-                <a16:creationId xmlns:a16="http://schemas.microsoft.com/office/drawing/2014/main" id="{45E8D48F-0CA4-4ECB-9AB3-4F7693FD2F22}"/>
-              </a:ext>
-            </a:extLst>
-          </p:cNvPr>
-          <p:cNvSpPr>
-            <a:spLocks noGrp="1"/>
-          </p:cNvSpPr>
+      <p:pic>
+        <p:nvPicPr>
+          <p:cNvPr id="6" name="Content Placeholder 5">
+            <a:extLst>
+              <a:ext uri="{FF2B5EF4-FFF2-40B4-BE49-F238E27FC236}">
+                <a16:creationId xmlns:a16="http://schemas.microsoft.com/office/drawing/2014/main" id="{DEB21D5E-DAD7-493E-8842-9140C516D9CD}"/>
+              </a:ext>
+            </a:extLst>
+          </p:cNvPr>
+          <p:cNvPicPr>
+            <a:picLocks noGrp="1" noChangeAspect="1"/>
+          </p:cNvPicPr>
           <p:nvPr>
             <p:ph idx="1"/>
           </p:nvPr>
-        </p:nvSpPr>
-        <p:spPr/>
-        <p:txBody>
-          <a:bodyPr/>
-          <a:lstStyle/>
-          <a:p>
-            <a:endParaRPr lang="sv-SE"/>
-          </a:p>
-        </p:txBody>
-      </p:sp>
+        </p:nvPicPr>
+        <p:blipFill rotWithShape="1">
+          <a:blip r:embed="rId2">
+            <a:extLst>
+              <a:ext uri="{28A0092B-C50C-407E-A947-70E740481C1C}">
+                <a14:useLocalDpi xmlns:a14="http://schemas.microsoft.com/office/drawing/2010/main" val="0"/>
+              </a:ext>
+            </a:extLst>
+          </a:blip>
+          <a:srcRect l="50283"/>
+          <a:stretch/>
+        </p:blipFill>
+        <p:spPr>
+          <a:xfrm>
+            <a:off x="485120" y="2420652"/>
+            <a:ext cx="1149627" cy="2016695"/>
+          </a:xfrm>
+        </p:spPr>
+      </p:pic>
       <p:sp>
         <p:nvSpPr>
           <p:cNvPr id="4" name="Text Placeholder 3">
             <a:extLst>
               <a:ext uri="{FF2B5EF4-FFF2-40B4-BE49-F238E27FC236}">
-                <a16:creationId xmlns:a16="http://schemas.microsoft.com/office/drawing/2014/main" id="{98171228-6868-4C39-AF14-5D4DDFC87CEB}"/>
+                <a16:creationId xmlns:a16="http://schemas.microsoft.com/office/drawing/2014/main" id="{7EFA16DA-B755-4AF8-9394-2934880CA886}"/>
               </a:ext>
             </a:extLst>
           </p:cNvPr>
@@ -5177,41 +6405,436 @@
             <p:ph type="body" sz="half" idx="2"/>
           </p:nvPr>
         </p:nvSpPr>
-        <p:spPr/>
-        <p:txBody>
-          <a:bodyPr/>
-          <a:lstStyle/>
-          <a:p>
-            <a:r>
-              <a:rPr lang="en-US" dirty="0"/>
-              <a:t>All characters are invisible unless pinged by </a:t>
-            </a:r>
-            <a:r>
-              <a:rPr lang="en-US" i="1" dirty="0"/>
-              <a:t>Settler</a:t>
-            </a:r>
-            <a:r>
-              <a:rPr lang="en-US" dirty="0"/>
-              <a:t> or sensed by a burrowed </a:t>
-            </a:r>
-            <a:r>
-              <a:rPr lang="en-US" i="1" dirty="0"/>
-              <a:t>Blocker</a:t>
-            </a:r>
-            <a:r>
-              <a:rPr lang="en-US" dirty="0"/>
-              <a:t>. </a:t>
+        <p:spPr>
+          <a:xfrm>
+            <a:off x="1602497" y="1965775"/>
+            <a:ext cx="3932237" cy="3811588"/>
+          </a:xfrm>
+        </p:spPr>
+        <p:txBody>
+          <a:bodyPr/>
+          <a:lstStyle/>
+          <a:p>
+            <a:r>
+              <a:rPr lang="en-US" dirty="0"/>
+              <a:t>Walk in different speed depending on how far you push the stick left stick</a:t>
             </a:r>
           </a:p>
           <a:p>
             <a:endParaRPr lang="sv-SE" dirty="0"/>
           </a:p>
-        </p:txBody>
-      </p:sp>
+          <a:p>
+            <a:endParaRPr lang="sv-SE" dirty="0"/>
+          </a:p>
+          <a:p>
+            <a:r>
+              <a:rPr lang="sv-SE" dirty="0"/>
+              <a:t>R</a:t>
+            </a:r>
+            <a:r>
+              <a:rPr lang="en-US" dirty="0" err="1"/>
+              <a:t>otate</a:t>
+            </a:r>
+            <a:r>
+              <a:rPr lang="en-US" dirty="0"/>
+              <a:t> your character to aim abilities with right stick</a:t>
+            </a:r>
+          </a:p>
+          <a:p>
+            <a:endParaRPr lang="en-US" dirty="0"/>
+          </a:p>
+          <a:p>
+            <a:endParaRPr lang="en-US" dirty="0"/>
+          </a:p>
+        </p:txBody>
+      </p:sp>
+      <p:pic>
+        <p:nvPicPr>
+          <p:cNvPr id="13" name="Content Placeholder 5">
+            <a:extLst>
+              <a:ext uri="{FF2B5EF4-FFF2-40B4-BE49-F238E27FC236}">
+                <a16:creationId xmlns:a16="http://schemas.microsoft.com/office/drawing/2014/main" id="{73E603FA-D419-4292-8055-501BDFE132F7}"/>
+              </a:ext>
+            </a:extLst>
+          </p:cNvPr>
+          <p:cNvPicPr>
+            <a:picLocks noChangeAspect="1"/>
+          </p:cNvPicPr>
+          <p:nvPr/>
+        </p:nvPicPr>
+        <p:blipFill rotWithShape="1">
+          <a:blip r:embed="rId2">
+            <a:extLst>
+              <a:ext uri="{28A0092B-C50C-407E-A947-70E740481C1C}">
+                <a14:useLocalDpi xmlns:a14="http://schemas.microsoft.com/office/drawing/2010/main" val="0"/>
+              </a:ext>
+            </a:extLst>
+          </a:blip>
+          <a:srcRect r="50283"/>
+          <a:stretch/>
+        </p:blipFill>
+        <p:spPr>
+          <a:xfrm>
+            <a:off x="398950" y="1161830"/>
+            <a:ext cx="1149627" cy="2016695"/>
+          </a:xfrm>
+          <a:prstGeom prst="rect">
+            <a:avLst/>
+          </a:prstGeom>
+        </p:spPr>
+      </p:pic>
+      <p:sp>
+        <p:nvSpPr>
+          <p:cNvPr id="15" name="Text Placeholder 3">
+            <a:extLst>
+              <a:ext uri="{FF2B5EF4-FFF2-40B4-BE49-F238E27FC236}">
+                <a16:creationId xmlns:a16="http://schemas.microsoft.com/office/drawing/2014/main" id="{1DD11461-3094-4C8F-8A6D-B485FF3380A4}"/>
+              </a:ext>
+            </a:extLst>
+          </p:cNvPr>
+          <p:cNvSpPr txBox="1">
+            <a:spLocks/>
+          </p:cNvSpPr>
+          <p:nvPr/>
+        </p:nvSpPr>
+        <p:spPr>
+          <a:xfrm>
+            <a:off x="6959234" y="2004646"/>
+            <a:ext cx="3932237" cy="3811588"/>
+          </a:xfrm>
+          <a:prstGeom prst="rect">
+            <a:avLst/>
+          </a:prstGeom>
+        </p:spPr>
+        <p:txBody>
+          <a:bodyPr vert="horz" lIns="91440" tIns="45720" rIns="91440" bIns="45720" rtlCol="0">
+            <a:normAutofit/>
+          </a:bodyPr>
+          <a:lstStyle>
+            <a:lvl1pPr marL="0" indent="0" algn="l" defTabSz="914400" rtl="0" eaLnBrk="1" latinLnBrk="0" hangingPunct="1">
+              <a:lnSpc>
+                <a:spcPct val="90000"/>
+              </a:lnSpc>
+              <a:spcBef>
+                <a:spcPts val="1000"/>
+              </a:spcBef>
+              <a:buFont typeface="Arial" panose="020B0604020202020204" pitchFamily="34" charset="0"/>
+              <a:buNone/>
+              <a:defRPr sz="1600" kern="1200">
+                <a:solidFill>
+                  <a:schemeClr val="tx1"/>
+                </a:solidFill>
+                <a:latin typeface="+mn-lt"/>
+                <a:ea typeface="+mn-ea"/>
+                <a:cs typeface="+mn-cs"/>
+              </a:defRPr>
+            </a:lvl1pPr>
+            <a:lvl2pPr marL="457200" indent="0" algn="l" defTabSz="914400" rtl="0" eaLnBrk="1" latinLnBrk="0" hangingPunct="1">
+              <a:lnSpc>
+                <a:spcPct val="90000"/>
+              </a:lnSpc>
+              <a:spcBef>
+                <a:spcPts val="500"/>
+              </a:spcBef>
+              <a:buFont typeface="Arial" panose="020B0604020202020204" pitchFamily="34" charset="0"/>
+              <a:buNone/>
+              <a:defRPr sz="1400" kern="1200">
+                <a:solidFill>
+                  <a:schemeClr val="tx1"/>
+                </a:solidFill>
+                <a:latin typeface="+mn-lt"/>
+                <a:ea typeface="+mn-ea"/>
+                <a:cs typeface="+mn-cs"/>
+              </a:defRPr>
+            </a:lvl2pPr>
+            <a:lvl3pPr marL="914400" indent="0" algn="l" defTabSz="914400" rtl="0" eaLnBrk="1" latinLnBrk="0" hangingPunct="1">
+              <a:lnSpc>
+                <a:spcPct val="90000"/>
+              </a:lnSpc>
+              <a:spcBef>
+                <a:spcPts val="500"/>
+              </a:spcBef>
+              <a:buFont typeface="Arial" panose="020B0604020202020204" pitchFamily="34" charset="0"/>
+              <a:buNone/>
+              <a:defRPr sz="1200" kern="1200">
+                <a:solidFill>
+                  <a:schemeClr val="tx1"/>
+                </a:solidFill>
+                <a:latin typeface="+mn-lt"/>
+                <a:ea typeface="+mn-ea"/>
+                <a:cs typeface="+mn-cs"/>
+              </a:defRPr>
+            </a:lvl3pPr>
+            <a:lvl4pPr marL="1371600" indent="0" algn="l" defTabSz="914400" rtl="0" eaLnBrk="1" latinLnBrk="0" hangingPunct="1">
+              <a:lnSpc>
+                <a:spcPct val="90000"/>
+              </a:lnSpc>
+              <a:spcBef>
+                <a:spcPts val="500"/>
+              </a:spcBef>
+              <a:buFont typeface="Arial" panose="020B0604020202020204" pitchFamily="34" charset="0"/>
+              <a:buNone/>
+              <a:defRPr sz="1000" kern="1200">
+                <a:solidFill>
+                  <a:schemeClr val="tx1"/>
+                </a:solidFill>
+                <a:latin typeface="+mn-lt"/>
+                <a:ea typeface="+mn-ea"/>
+                <a:cs typeface="+mn-cs"/>
+              </a:defRPr>
+            </a:lvl4pPr>
+            <a:lvl5pPr marL="1828800" indent="0" algn="l" defTabSz="914400" rtl="0" eaLnBrk="1" latinLnBrk="0" hangingPunct="1">
+              <a:lnSpc>
+                <a:spcPct val="90000"/>
+              </a:lnSpc>
+              <a:spcBef>
+                <a:spcPts val="500"/>
+              </a:spcBef>
+              <a:buFont typeface="Arial" panose="020B0604020202020204" pitchFamily="34" charset="0"/>
+              <a:buNone/>
+              <a:defRPr sz="1000" kern="1200">
+                <a:solidFill>
+                  <a:schemeClr val="tx1"/>
+                </a:solidFill>
+                <a:latin typeface="+mn-lt"/>
+                <a:ea typeface="+mn-ea"/>
+                <a:cs typeface="+mn-cs"/>
+              </a:defRPr>
+            </a:lvl5pPr>
+            <a:lvl6pPr marL="2286000" indent="0" algn="l" defTabSz="914400" rtl="0" eaLnBrk="1" latinLnBrk="0" hangingPunct="1">
+              <a:lnSpc>
+                <a:spcPct val="90000"/>
+              </a:lnSpc>
+              <a:spcBef>
+                <a:spcPts val="500"/>
+              </a:spcBef>
+              <a:buFont typeface="Arial" panose="020B0604020202020204" pitchFamily="34" charset="0"/>
+              <a:buNone/>
+              <a:defRPr sz="1000" kern="1200">
+                <a:solidFill>
+                  <a:schemeClr val="tx1"/>
+                </a:solidFill>
+                <a:latin typeface="+mn-lt"/>
+                <a:ea typeface="+mn-ea"/>
+                <a:cs typeface="+mn-cs"/>
+              </a:defRPr>
+            </a:lvl6pPr>
+            <a:lvl7pPr marL="2743200" indent="0" algn="l" defTabSz="914400" rtl="0" eaLnBrk="1" latinLnBrk="0" hangingPunct="1">
+              <a:lnSpc>
+                <a:spcPct val="90000"/>
+              </a:lnSpc>
+              <a:spcBef>
+                <a:spcPts val="500"/>
+              </a:spcBef>
+              <a:buFont typeface="Arial" panose="020B0604020202020204" pitchFamily="34" charset="0"/>
+              <a:buNone/>
+              <a:defRPr sz="1000" kern="1200">
+                <a:solidFill>
+                  <a:schemeClr val="tx1"/>
+                </a:solidFill>
+                <a:latin typeface="+mn-lt"/>
+                <a:ea typeface="+mn-ea"/>
+                <a:cs typeface="+mn-cs"/>
+              </a:defRPr>
+            </a:lvl7pPr>
+            <a:lvl8pPr marL="3200400" indent="0" algn="l" defTabSz="914400" rtl="0" eaLnBrk="1" latinLnBrk="0" hangingPunct="1">
+              <a:lnSpc>
+                <a:spcPct val="90000"/>
+              </a:lnSpc>
+              <a:spcBef>
+                <a:spcPts val="500"/>
+              </a:spcBef>
+              <a:buFont typeface="Arial" panose="020B0604020202020204" pitchFamily="34" charset="0"/>
+              <a:buNone/>
+              <a:defRPr sz="1000" kern="1200">
+                <a:solidFill>
+                  <a:schemeClr val="tx1"/>
+                </a:solidFill>
+                <a:latin typeface="+mn-lt"/>
+                <a:ea typeface="+mn-ea"/>
+                <a:cs typeface="+mn-cs"/>
+              </a:defRPr>
+            </a:lvl8pPr>
+            <a:lvl9pPr marL="3657600" indent="0" algn="l" defTabSz="914400" rtl="0" eaLnBrk="1" latinLnBrk="0" hangingPunct="1">
+              <a:lnSpc>
+                <a:spcPct val="90000"/>
+              </a:lnSpc>
+              <a:spcBef>
+                <a:spcPts val="500"/>
+              </a:spcBef>
+              <a:buFont typeface="Arial" panose="020B0604020202020204" pitchFamily="34" charset="0"/>
+              <a:buNone/>
+              <a:defRPr sz="1000" kern="1200">
+                <a:solidFill>
+                  <a:schemeClr val="tx1"/>
+                </a:solidFill>
+                <a:latin typeface="+mn-lt"/>
+                <a:ea typeface="+mn-ea"/>
+                <a:cs typeface="+mn-cs"/>
+              </a:defRPr>
+            </a:lvl9pPr>
+          </a:lstStyle>
+          <a:p>
+            <a:r>
+              <a:rPr lang="en-US" dirty="0"/>
+              <a:t>Use </a:t>
+            </a:r>
+            <a:r>
+              <a:rPr lang="en-US" b="1" dirty="0"/>
+              <a:t>Primary Ability</a:t>
+            </a:r>
+          </a:p>
+          <a:p>
+            <a:endParaRPr lang="en-US" dirty="0"/>
+          </a:p>
+          <a:p>
+            <a:endParaRPr lang="en-US" dirty="0"/>
+          </a:p>
+          <a:p>
+            <a:endParaRPr lang="en-US" dirty="0"/>
+          </a:p>
+          <a:p>
+            <a:r>
+              <a:rPr lang="en-US" dirty="0"/>
+              <a:t>Use </a:t>
+            </a:r>
+            <a:r>
+              <a:rPr lang="en-US" b="1" dirty="0"/>
+              <a:t>Secondary Ability</a:t>
+            </a:r>
+          </a:p>
+          <a:p>
+            <a:endParaRPr lang="en-US" dirty="0"/>
+          </a:p>
+          <a:p>
+            <a:endParaRPr lang="en-US" dirty="0"/>
+          </a:p>
+          <a:p>
+            <a:endParaRPr lang="en-US" dirty="0"/>
+          </a:p>
+          <a:p>
+            <a:r>
+              <a:rPr lang="en-US" dirty="0"/>
+              <a:t>Give your teammates a high five</a:t>
+            </a:r>
+          </a:p>
+          <a:p>
+            <a:endParaRPr lang="en-US" dirty="0"/>
+          </a:p>
+        </p:txBody>
+      </p:sp>
+      <p:pic>
+        <p:nvPicPr>
+          <p:cNvPr id="17" name="Picture 16">
+            <a:extLst>
+              <a:ext uri="{FF2B5EF4-FFF2-40B4-BE49-F238E27FC236}">
+                <a16:creationId xmlns:a16="http://schemas.microsoft.com/office/drawing/2014/main" id="{19083168-21B9-4303-93AF-46E122064AF1}"/>
+              </a:ext>
+            </a:extLst>
+          </p:cNvPr>
+          <p:cNvPicPr>
+            <a:picLocks noChangeAspect="1"/>
+          </p:cNvPicPr>
+          <p:nvPr/>
+        </p:nvPicPr>
+        <p:blipFill>
+          <a:blip r:embed="rId3">
+            <a:extLst>
+              <a:ext uri="{28A0092B-C50C-407E-A947-70E740481C1C}">
+                <a14:useLocalDpi xmlns:a14="http://schemas.microsoft.com/office/drawing/2010/main" val="0"/>
+              </a:ext>
+            </a:extLst>
+          </a:blip>
+          <a:stretch>
+            <a:fillRect/>
+          </a:stretch>
+        </p:blipFill>
+        <p:spPr>
+          <a:xfrm>
+            <a:off x="6004312" y="1625054"/>
+            <a:ext cx="954922" cy="1360040"/>
+          </a:xfrm>
+          <a:prstGeom prst="rect">
+            <a:avLst/>
+          </a:prstGeom>
+        </p:spPr>
+      </p:pic>
+      <p:pic>
+        <p:nvPicPr>
+          <p:cNvPr id="19" name="Picture 18">
+            <a:extLst>
+              <a:ext uri="{FF2B5EF4-FFF2-40B4-BE49-F238E27FC236}">
+                <a16:creationId xmlns:a16="http://schemas.microsoft.com/office/drawing/2014/main" id="{375406C6-6A79-4EBF-8A31-0B608EC2F653}"/>
+              </a:ext>
+            </a:extLst>
+          </p:cNvPr>
+          <p:cNvPicPr>
+            <a:picLocks noChangeAspect="1"/>
+          </p:cNvPicPr>
+          <p:nvPr/>
+        </p:nvPicPr>
+        <p:blipFill>
+          <a:blip r:embed="rId4">
+            <a:extLst>
+              <a:ext uri="{28A0092B-C50C-407E-A947-70E740481C1C}">
+                <a14:useLocalDpi xmlns:a14="http://schemas.microsoft.com/office/drawing/2010/main" val="0"/>
+              </a:ext>
+            </a:extLst>
+          </a:blip>
+          <a:stretch>
+            <a:fillRect/>
+          </a:stretch>
+        </p:blipFill>
+        <p:spPr>
+          <a:xfrm>
+            <a:off x="6095999" y="3011714"/>
+            <a:ext cx="887481" cy="1263988"/>
+          </a:xfrm>
+          <a:prstGeom prst="rect">
+            <a:avLst/>
+          </a:prstGeom>
+        </p:spPr>
+      </p:pic>
+      <p:pic>
+        <p:nvPicPr>
+          <p:cNvPr id="21" name="Picture 20">
+            <a:extLst>
+              <a:ext uri="{FF2B5EF4-FFF2-40B4-BE49-F238E27FC236}">
+                <a16:creationId xmlns:a16="http://schemas.microsoft.com/office/drawing/2014/main" id="{49682483-856A-4EF1-8BC8-9A3ABCABB451}"/>
+              </a:ext>
+            </a:extLst>
+          </p:cNvPr>
+          <p:cNvPicPr>
+            <a:picLocks noChangeAspect="1"/>
+          </p:cNvPicPr>
+          <p:nvPr/>
+        </p:nvPicPr>
+        <p:blipFill>
+          <a:blip r:embed="rId5">
+            <a:extLst>
+              <a:ext uri="{28A0092B-C50C-407E-A947-70E740481C1C}">
+                <a14:useLocalDpi xmlns:a14="http://schemas.microsoft.com/office/drawing/2010/main" val="0"/>
+              </a:ext>
+            </a:extLst>
+          </a:blip>
+          <a:stretch>
+            <a:fillRect/>
+          </a:stretch>
+        </p:blipFill>
+        <p:spPr>
+          <a:xfrm>
+            <a:off x="6130626" y="4498556"/>
+            <a:ext cx="852854" cy="852854"/>
+          </a:xfrm>
+          <a:prstGeom prst="rect">
+            <a:avLst/>
+          </a:prstGeom>
+        </p:spPr>
+      </p:pic>
     </p:spTree>
     <p:extLst>
       <p:ext uri="{BB962C8B-B14F-4D97-AF65-F5344CB8AC3E}">
-        <p14:creationId xmlns:p14="http://schemas.microsoft.com/office/powerpoint/2010/main" val="524035836"/>
+        <p14:creationId xmlns:p14="http://schemas.microsoft.com/office/powerpoint/2010/main" val="3940611967"/>
       </p:ext>
     </p:extLst>
   </p:cSld>
@@ -5243,7 +6866,7 @@
           <p:cNvPr id="2" name="Title 1">
             <a:extLst>
               <a:ext uri="{FF2B5EF4-FFF2-40B4-BE49-F238E27FC236}">
-                <a16:creationId xmlns:a16="http://schemas.microsoft.com/office/drawing/2014/main" id="{16770CBD-B57C-4612-A0EC-F969F6881FA2}"/>
+                <a16:creationId xmlns:a16="http://schemas.microsoft.com/office/drawing/2014/main" id="{E0EBFBC3-0ACD-476D-AD57-7C9B2488AD84}"/>
               </a:ext>
             </a:extLst>
           </p:cNvPr>
@@ -5261,89 +6884,121 @@
           <a:p>
             <a:r>
               <a:rPr lang="en-US" dirty="0"/>
-              <a:t>What can I do?</a:t>
+              <a:t>Character 1</a:t>
             </a:r>
             <a:br>
               <a:rPr lang="en-US" dirty="0"/>
             </a:br>
+            <a:r>
+              <a:rPr lang="en-US" dirty="0"/>
+              <a:t> - Blocker - </a:t>
+            </a:r>
             <a:endParaRPr lang="sv-SE" dirty="0"/>
           </a:p>
         </p:txBody>
       </p:sp>
-      <p:sp>
-        <p:nvSpPr>
-          <p:cNvPr id="3" name="Content Placeholder 2">
-            <a:extLst>
-              <a:ext uri="{FF2B5EF4-FFF2-40B4-BE49-F238E27FC236}">
-                <a16:creationId xmlns:a16="http://schemas.microsoft.com/office/drawing/2014/main" id="{599B5677-31D8-4F21-BE04-E544064B06F3}"/>
-              </a:ext>
-            </a:extLst>
-          </p:cNvPr>
-          <p:cNvSpPr>
-            <a:spLocks noGrp="1"/>
-          </p:cNvSpPr>
+      <p:pic>
+        <p:nvPicPr>
+          <p:cNvPr id="6" name="Content Placeholder 5">
+            <a:extLst>
+              <a:ext uri="{FF2B5EF4-FFF2-40B4-BE49-F238E27FC236}">
+                <a16:creationId xmlns:a16="http://schemas.microsoft.com/office/drawing/2014/main" id="{ACBD9DB8-5CD8-4436-8B19-4BA978198F1F}"/>
+              </a:ext>
+            </a:extLst>
+          </p:cNvPr>
+          <p:cNvPicPr>
+            <a:picLocks noGrp="1" noChangeAspect="1"/>
+          </p:cNvPicPr>
           <p:nvPr>
             <p:ph idx="1"/>
           </p:nvPr>
+        </p:nvPicPr>
+        <p:blipFill>
+          <a:blip r:embed="rId2">
+            <a:extLst>
+              <a:ext uri="{28A0092B-C50C-407E-A947-70E740481C1C}">
+                <a14:useLocalDpi xmlns:a14="http://schemas.microsoft.com/office/drawing/2010/main" val="0"/>
+              </a:ext>
+            </a:extLst>
+          </a:blip>
+          <a:stretch>
+            <a:fillRect/>
+          </a:stretch>
+        </p:blipFill>
+        <p:spPr>
+          <a:xfrm>
+            <a:off x="5379741" y="1706969"/>
+            <a:ext cx="6130922" cy="3643630"/>
+          </a:xfrm>
+        </p:spPr>
+      </p:pic>
+      <p:sp>
+        <p:nvSpPr>
+          <p:cNvPr id="4" name="Text Placeholder 3">
+            <a:extLst>
+              <a:ext uri="{FF2B5EF4-FFF2-40B4-BE49-F238E27FC236}">
+                <a16:creationId xmlns:a16="http://schemas.microsoft.com/office/drawing/2014/main" id="{EA6CA6D3-2882-4AFA-9FE6-F4358E46D3DE}"/>
+              </a:ext>
+            </a:extLst>
+          </p:cNvPr>
+          <p:cNvSpPr>
+            <a:spLocks noGrp="1"/>
+          </p:cNvSpPr>
+          <p:nvPr>
+            <p:ph type="body" sz="half" idx="2"/>
+          </p:nvPr>
         </p:nvSpPr>
         <p:spPr/>
         <p:txBody>
           <a:bodyPr/>
           <a:lstStyle/>
           <a:p>
+            <a:r>
+              <a:rPr lang="en-US" b="1" dirty="0"/>
+              <a:t>Primary Ability: </a:t>
+            </a:r>
+            <a:r>
+              <a:rPr lang="en-US" dirty="0"/>
+              <a:t>Digs down to get enemy location through sensing vibrations. </a:t>
+            </a:r>
+          </a:p>
+          <a:p>
+            <a:r>
+              <a:rPr lang="sv-SE" dirty="0"/>
+              <a:t>H</a:t>
+            </a:r>
+            <a:r>
+              <a:rPr lang="en-US" dirty="0"/>
+              <a:t>as an overheating system so he can only stay down for so long before having to come back up to rest. </a:t>
+            </a:r>
+          </a:p>
+          <a:p>
+            <a:r>
+              <a:rPr lang="en-US" b="1" dirty="0"/>
+              <a:t>Secondary Ability: </a:t>
+            </a:r>
+            <a:r>
+              <a:rPr lang="en-US" dirty="0"/>
+              <a:t>Blocks enemy </a:t>
+            </a:r>
+            <a:r>
+              <a:rPr lang="en-US" b="1" i="1" dirty="0"/>
+              <a:t>smash</a:t>
+            </a:r>
+            <a:r>
+              <a:rPr lang="en-US" dirty="0"/>
+              <a:t> by raising a wall of earth. </a:t>
+            </a:r>
+          </a:p>
+          <a:p>
             <a:endParaRPr lang="sv-SE" dirty="0"/>
-          </a:p>
-        </p:txBody>
-      </p:sp>
-      <p:sp>
-        <p:nvSpPr>
-          <p:cNvPr id="4" name="Text Placeholder 3">
-            <a:extLst>
-              <a:ext uri="{FF2B5EF4-FFF2-40B4-BE49-F238E27FC236}">
-                <a16:creationId xmlns:a16="http://schemas.microsoft.com/office/drawing/2014/main" id="{7EFA16DA-B755-4AF8-9394-2934880CA886}"/>
-              </a:ext>
-            </a:extLst>
-          </p:cNvPr>
-          <p:cNvSpPr>
-            <a:spLocks noGrp="1"/>
-          </p:cNvSpPr>
-          <p:nvPr>
-            <p:ph type="body" sz="half" idx="2"/>
-          </p:nvPr>
-        </p:nvSpPr>
-        <p:spPr/>
-        <p:txBody>
-          <a:bodyPr/>
-          <a:lstStyle/>
-          <a:p>
-            <a:r>
-              <a:rPr lang="en-US" dirty="0"/>
-              <a:t>Top-down walking around on 2 </a:t>
-            </a:r>
-            <a:r>
-              <a:rPr lang="en-US" dirty="0" err="1"/>
-              <a:t>axises</a:t>
-            </a:r>
-            <a:endParaRPr lang="en-US" dirty="0"/>
-          </a:p>
-          <a:p>
-            <a:r>
-              <a:rPr lang="en-US" dirty="0"/>
-              <a:t>Walk in different speed depending on how far you push the stick left stick</a:t>
-            </a:r>
-          </a:p>
-          <a:p>
-            <a:r>
-              <a:rPr lang="en-US" dirty="0"/>
-              <a:t>Aim abilities with right stick</a:t>
-            </a:r>
           </a:p>
         </p:txBody>
       </p:sp>
     </p:spTree>
     <p:extLst>
       <p:ext uri="{BB962C8B-B14F-4D97-AF65-F5344CB8AC3E}">
-        <p14:creationId xmlns:p14="http://schemas.microsoft.com/office/powerpoint/2010/main" val="3940611967"/>
+        <p14:creationId xmlns:p14="http://schemas.microsoft.com/office/powerpoint/2010/main" val="1361230086"/>
       </p:ext>
     </p:extLst>
   </p:cSld>
@@ -5375,7 +7030,7 @@
           <p:cNvPr id="2" name="Title 1">
             <a:extLst>
               <a:ext uri="{FF2B5EF4-FFF2-40B4-BE49-F238E27FC236}">
-                <a16:creationId xmlns:a16="http://schemas.microsoft.com/office/drawing/2014/main" id="{E0EBFBC3-0ACD-476D-AD57-7C9B2488AD84}"/>
+                <a16:creationId xmlns:a16="http://schemas.microsoft.com/office/drawing/2014/main" id="{F4E20C1F-394D-4922-B19D-B191F4E87485}"/>
               </a:ext>
             </a:extLst>
           </p:cNvPr>
@@ -5393,78 +7048,104 @@
           <a:p>
             <a:r>
               <a:rPr lang="en-US" dirty="0"/>
-              <a:t>Character 1</a:t>
+              <a:t>Character 2 </a:t>
             </a:r>
             <a:br>
               <a:rPr lang="en-US" dirty="0"/>
             </a:br>
             <a:r>
               <a:rPr lang="en-US" dirty="0"/>
-              <a:t> - Blocker - </a:t>
+              <a:t> - Settler - </a:t>
             </a:r>
             <a:endParaRPr lang="sv-SE" dirty="0"/>
           </a:p>
         </p:txBody>
       </p:sp>
-      <p:sp>
-        <p:nvSpPr>
-          <p:cNvPr id="3" name="Content Placeholder 2">
-            <a:extLst>
-              <a:ext uri="{FF2B5EF4-FFF2-40B4-BE49-F238E27FC236}">
-                <a16:creationId xmlns:a16="http://schemas.microsoft.com/office/drawing/2014/main" id="{F4703CE2-B868-4984-84F8-35EBC629E46B}"/>
-              </a:ext>
-            </a:extLst>
-          </p:cNvPr>
-          <p:cNvSpPr>
-            <a:spLocks noGrp="1"/>
-          </p:cNvSpPr>
+      <p:pic>
+        <p:nvPicPr>
+          <p:cNvPr id="6" name="Content Placeholder 5">
+            <a:extLst>
+              <a:ext uri="{FF2B5EF4-FFF2-40B4-BE49-F238E27FC236}">
+                <a16:creationId xmlns:a16="http://schemas.microsoft.com/office/drawing/2014/main" id="{ECB56958-D2BE-41D6-A436-D56B0F484B79}"/>
+              </a:ext>
+            </a:extLst>
+          </p:cNvPr>
+          <p:cNvPicPr>
+            <a:picLocks noGrp="1" noChangeAspect="1"/>
+          </p:cNvPicPr>
           <p:nvPr>
             <p:ph idx="1"/>
           </p:nvPr>
+        </p:nvPicPr>
+        <p:blipFill rotWithShape="1">
+          <a:blip r:embed="rId2">
+            <a:extLst>
+              <a:ext uri="{28A0092B-C50C-407E-A947-70E740481C1C}">
+                <a14:useLocalDpi xmlns:a14="http://schemas.microsoft.com/office/drawing/2010/main" val="0"/>
+              </a:ext>
+            </a:extLst>
+          </a:blip>
+          <a:srcRect l="33883"/>
+          <a:stretch/>
+        </p:blipFill>
+        <p:spPr>
+          <a:xfrm>
+            <a:off x="5694629" y="1751666"/>
+            <a:ext cx="4080842" cy="2976508"/>
+          </a:xfrm>
+        </p:spPr>
+      </p:pic>
+      <p:sp>
+        <p:nvSpPr>
+          <p:cNvPr id="4" name="Text Placeholder 3">
+            <a:extLst>
+              <a:ext uri="{FF2B5EF4-FFF2-40B4-BE49-F238E27FC236}">
+                <a16:creationId xmlns:a16="http://schemas.microsoft.com/office/drawing/2014/main" id="{91380255-BE25-4334-8E4F-5704D6CE5EFD}"/>
+              </a:ext>
+            </a:extLst>
+          </p:cNvPr>
+          <p:cNvSpPr>
+            <a:spLocks noGrp="1"/>
+          </p:cNvSpPr>
+          <p:nvPr>
+            <p:ph type="body" sz="half" idx="2"/>
+          </p:nvPr>
         </p:nvSpPr>
         <p:spPr/>
         <p:txBody>
           <a:bodyPr/>
           <a:lstStyle/>
           <a:p>
-            <a:endParaRPr lang="sv-SE"/>
-          </a:p>
-        </p:txBody>
-      </p:sp>
-      <p:sp>
-        <p:nvSpPr>
-          <p:cNvPr id="4" name="Text Placeholder 3">
-            <a:extLst>
-              <a:ext uri="{FF2B5EF4-FFF2-40B4-BE49-F238E27FC236}">
-                <a16:creationId xmlns:a16="http://schemas.microsoft.com/office/drawing/2014/main" id="{EA6CA6D3-2882-4AFA-9FE6-F4358E46D3DE}"/>
-              </a:ext>
-            </a:extLst>
-          </p:cNvPr>
-          <p:cNvSpPr>
-            <a:spLocks noGrp="1"/>
-          </p:cNvSpPr>
-          <p:nvPr>
-            <p:ph type="body" sz="half" idx="2"/>
-          </p:nvPr>
-        </p:nvSpPr>
-        <p:spPr/>
-        <p:txBody>
-          <a:bodyPr/>
-          <a:lstStyle/>
-          <a:p>
-            <a:r>
-              <a:rPr lang="en-US" dirty="0"/>
-              <a:t>Digs down to get enemy location through sensing vibrations</a:t>
-            </a:r>
-          </a:p>
-          <a:p>
-            <a:r>
-              <a:rPr lang="en-US" dirty="0"/>
-              <a:t>Has the ability to block enemy smash, but is unable to see it </a:t>
-            </a:r>
-          </a:p>
-          <a:p>
-            <a:endParaRPr lang="en-US" dirty="0"/>
+            <a:r>
+              <a:rPr lang="en-US" b="1" dirty="0"/>
+              <a:t>Primary Ability: </a:t>
+            </a:r>
+            <a:r>
+              <a:rPr lang="en-US" dirty="0"/>
+              <a:t>Pings target location to grant the </a:t>
+            </a:r>
+            <a:r>
+              <a:rPr lang="en-US" i="1" dirty="0"/>
+              <a:t>Smasher</a:t>
+            </a:r>
+            <a:r>
+              <a:rPr lang="en-US" dirty="0"/>
+              <a:t> and </a:t>
+            </a:r>
+            <a:r>
+              <a:rPr lang="en-US" i="1" dirty="0"/>
+              <a:t>Blocker</a:t>
+            </a:r>
+            <a:r>
+              <a:rPr lang="en-US" dirty="0"/>
+              <a:t> vision over that area</a:t>
+            </a:r>
+          </a:p>
+          <a:p>
+            <a:r>
+              <a:rPr lang="en-US" dirty="0"/>
+              <a:t>Has the ability to drag enemies in an area together into one spot </a:t>
+            </a:r>
           </a:p>
           <a:p>
             <a:endParaRPr lang="sv-SE" dirty="0"/>
@@ -5474,7 +7155,7 @@
     </p:spTree>
     <p:extLst>
       <p:ext uri="{BB962C8B-B14F-4D97-AF65-F5344CB8AC3E}">
-        <p14:creationId xmlns:p14="http://schemas.microsoft.com/office/powerpoint/2010/main" val="1361230086"/>
+        <p14:creationId xmlns:p14="http://schemas.microsoft.com/office/powerpoint/2010/main" val="1946316444"/>
       </p:ext>
     </p:extLst>
   </p:cSld>

</xml_diff>

<commit_message>
After Mentoring lot to do
</commit_message>
<xml_diff>
--- a/Phase 2 - Writing down the details.pptx
+++ b/Phase 2 - Writing down the details.pptx
@@ -4,6 +4,9 @@
   <p:sldMasterIdLst>
     <p:sldMasterId id="2147483719" r:id="rId1"/>
   </p:sldMasterIdLst>
+  <p:notesMasterIdLst>
+    <p:notesMasterId r:id="rId21"/>
+  </p:notesMasterIdLst>
   <p:sldIdLst>
     <p:sldId id="271" r:id="rId2"/>
     <p:sldId id="272" r:id="rId3"/>
@@ -22,6 +25,8 @@
     <p:sldId id="257" r:id="rId16"/>
     <p:sldId id="269" r:id="rId17"/>
     <p:sldId id="270" r:id="rId18"/>
+    <p:sldId id="274" r:id="rId19"/>
+    <p:sldId id="275" r:id="rId20"/>
   </p:sldIdLst>
   <p:sldSz cx="12192000" cy="6858000"/>
   <p:notesSz cx="6858000" cy="9144000"/>
@@ -142,6 +147,8 @@
             <p14:sldId id="257"/>
             <p14:sldId id="269"/>
             <p14:sldId id="270"/>
+            <p14:sldId id="274"/>
+            <p14:sldId id="275"/>
           </p14:sldIdLst>
         </p14:section>
       </p14:sectionLst>
@@ -151,6 +158,439 @@
     </p:ext>
   </p:extLst>
 </p:presentation>
+</file>
+
+<file path=ppt/notesMasters/notesMaster1.xml><?xml version="1.0" encoding="utf-8"?>
+<p:notesMaster xmlns:a="http://schemas.openxmlformats.org/drawingml/2006/main" xmlns:r="http://schemas.openxmlformats.org/officeDocument/2006/relationships" xmlns:p="http://schemas.openxmlformats.org/presentationml/2006/main">
+  <p:cSld>
+    <p:bg>
+      <p:bgRef idx="1001">
+        <a:schemeClr val="bg1"/>
+      </p:bgRef>
+    </p:bg>
+    <p:spTree>
+      <p:nvGrpSpPr>
+        <p:cNvPr id="1" name=""/>
+        <p:cNvGrpSpPr/>
+        <p:nvPr/>
+      </p:nvGrpSpPr>
+      <p:grpSpPr>
+        <a:xfrm>
+          <a:off x="0" y="0"/>
+          <a:ext cx="0" cy="0"/>
+          <a:chOff x="0" y="0"/>
+          <a:chExt cx="0" cy="0"/>
+        </a:xfrm>
+      </p:grpSpPr>
+      <p:sp>
+        <p:nvSpPr>
+          <p:cNvPr id="2" name="Header Placeholder 1"/>
+          <p:cNvSpPr>
+            <a:spLocks noGrp="1"/>
+          </p:cNvSpPr>
+          <p:nvPr>
+            <p:ph type="hdr" sz="quarter"/>
+          </p:nvPr>
+        </p:nvSpPr>
+        <p:spPr>
+          <a:xfrm>
+            <a:off x="0" y="0"/>
+            <a:ext cx="2971800" cy="458788"/>
+          </a:xfrm>
+          <a:prstGeom prst="rect">
+            <a:avLst/>
+          </a:prstGeom>
+        </p:spPr>
+        <p:txBody>
+          <a:bodyPr vert="horz" lIns="91440" tIns="45720" rIns="91440" bIns="45720" rtlCol="0"/>
+          <a:lstStyle>
+            <a:lvl1pPr algn="l">
+              <a:defRPr sz="1200"/>
+            </a:lvl1pPr>
+          </a:lstStyle>
+          <a:p>
+            <a:endParaRPr lang="en-US"/>
+          </a:p>
+        </p:txBody>
+      </p:sp>
+      <p:sp>
+        <p:nvSpPr>
+          <p:cNvPr id="3" name="Date Placeholder 2"/>
+          <p:cNvSpPr>
+            <a:spLocks noGrp="1"/>
+          </p:cNvSpPr>
+          <p:nvPr>
+            <p:ph type="dt" idx="1"/>
+          </p:nvPr>
+        </p:nvSpPr>
+        <p:spPr>
+          <a:xfrm>
+            <a:off x="3884613" y="0"/>
+            <a:ext cx="2971800" cy="458788"/>
+          </a:xfrm>
+          <a:prstGeom prst="rect">
+            <a:avLst/>
+          </a:prstGeom>
+        </p:spPr>
+        <p:txBody>
+          <a:bodyPr vert="horz" lIns="91440" tIns="45720" rIns="91440" bIns="45720" rtlCol="0"/>
+          <a:lstStyle>
+            <a:lvl1pPr algn="r">
+              <a:defRPr sz="1200"/>
+            </a:lvl1pPr>
+          </a:lstStyle>
+          <a:p>
+            <a:fld id="{79E66A4A-C2E0-4DF6-9D5C-EB676889AEDC}" type="datetimeFigureOut">
+              <a:rPr lang="en-US" smtClean="0"/>
+              <a:t>2/4/2019</a:t>
+            </a:fld>
+            <a:endParaRPr lang="en-US"/>
+          </a:p>
+        </p:txBody>
+      </p:sp>
+      <p:sp>
+        <p:nvSpPr>
+          <p:cNvPr id="4" name="Slide Image Placeholder 3"/>
+          <p:cNvSpPr>
+            <a:spLocks noGrp="1" noRot="1" noChangeAspect="1"/>
+          </p:cNvSpPr>
+          <p:nvPr>
+            <p:ph type="sldImg" idx="2"/>
+          </p:nvPr>
+        </p:nvSpPr>
+        <p:spPr>
+          <a:xfrm>
+            <a:off x="685800" y="1143000"/>
+            <a:ext cx="5486400" cy="3086100"/>
+          </a:xfrm>
+          <a:prstGeom prst="rect">
+            <a:avLst/>
+          </a:prstGeom>
+          <a:noFill/>
+          <a:ln w="12700">
+            <a:solidFill>
+              <a:prstClr val="black"/>
+            </a:solidFill>
+          </a:ln>
+        </p:spPr>
+        <p:txBody>
+          <a:bodyPr vert="horz" lIns="91440" tIns="45720" rIns="91440" bIns="45720" rtlCol="0" anchor="ctr"/>
+          <a:lstStyle/>
+          <a:p>
+            <a:endParaRPr lang="en-US"/>
+          </a:p>
+        </p:txBody>
+      </p:sp>
+      <p:sp>
+        <p:nvSpPr>
+          <p:cNvPr id="5" name="Notes Placeholder 4"/>
+          <p:cNvSpPr>
+            <a:spLocks noGrp="1"/>
+          </p:cNvSpPr>
+          <p:nvPr>
+            <p:ph type="body" sz="quarter" idx="3"/>
+          </p:nvPr>
+        </p:nvSpPr>
+        <p:spPr>
+          <a:xfrm>
+            <a:off x="685800" y="4400550"/>
+            <a:ext cx="5486400" cy="3600450"/>
+          </a:xfrm>
+          <a:prstGeom prst="rect">
+            <a:avLst/>
+          </a:prstGeom>
+        </p:spPr>
+        <p:txBody>
+          <a:bodyPr vert="horz" lIns="91440" tIns="45720" rIns="91440" bIns="45720" rtlCol="0"/>
+          <a:lstStyle/>
+          <a:p>
+            <a:pPr lvl="0"/>
+            <a:r>
+              <a:rPr lang="en-US"/>
+              <a:t>Edit Master text styles</a:t>
+            </a:r>
+          </a:p>
+          <a:p>
+            <a:pPr lvl="1"/>
+            <a:r>
+              <a:rPr lang="en-US"/>
+              <a:t>Second level</a:t>
+            </a:r>
+          </a:p>
+          <a:p>
+            <a:pPr lvl="2"/>
+            <a:r>
+              <a:rPr lang="en-US"/>
+              <a:t>Third level</a:t>
+            </a:r>
+          </a:p>
+          <a:p>
+            <a:pPr lvl="3"/>
+            <a:r>
+              <a:rPr lang="en-US"/>
+              <a:t>Fourth level</a:t>
+            </a:r>
+          </a:p>
+          <a:p>
+            <a:pPr lvl="4"/>
+            <a:r>
+              <a:rPr lang="en-US"/>
+              <a:t>Fifth level</a:t>
+            </a:r>
+          </a:p>
+        </p:txBody>
+      </p:sp>
+      <p:sp>
+        <p:nvSpPr>
+          <p:cNvPr id="6" name="Footer Placeholder 5"/>
+          <p:cNvSpPr>
+            <a:spLocks noGrp="1"/>
+          </p:cNvSpPr>
+          <p:nvPr>
+            <p:ph type="ftr" sz="quarter" idx="4"/>
+          </p:nvPr>
+        </p:nvSpPr>
+        <p:spPr>
+          <a:xfrm>
+            <a:off x="0" y="8685213"/>
+            <a:ext cx="2971800" cy="458787"/>
+          </a:xfrm>
+          <a:prstGeom prst="rect">
+            <a:avLst/>
+          </a:prstGeom>
+        </p:spPr>
+        <p:txBody>
+          <a:bodyPr vert="horz" lIns="91440" tIns="45720" rIns="91440" bIns="45720" rtlCol="0" anchor="b"/>
+          <a:lstStyle>
+            <a:lvl1pPr algn="l">
+              <a:defRPr sz="1200"/>
+            </a:lvl1pPr>
+          </a:lstStyle>
+          <a:p>
+            <a:endParaRPr lang="en-US"/>
+          </a:p>
+        </p:txBody>
+      </p:sp>
+      <p:sp>
+        <p:nvSpPr>
+          <p:cNvPr id="7" name="Slide Number Placeholder 6"/>
+          <p:cNvSpPr>
+            <a:spLocks noGrp="1"/>
+          </p:cNvSpPr>
+          <p:nvPr>
+            <p:ph type="sldNum" sz="quarter" idx="5"/>
+          </p:nvPr>
+        </p:nvSpPr>
+        <p:spPr>
+          <a:xfrm>
+            <a:off x="3884613" y="8685213"/>
+            <a:ext cx="2971800" cy="458787"/>
+          </a:xfrm>
+          <a:prstGeom prst="rect">
+            <a:avLst/>
+          </a:prstGeom>
+        </p:spPr>
+        <p:txBody>
+          <a:bodyPr vert="horz" lIns="91440" tIns="45720" rIns="91440" bIns="45720" rtlCol="0" anchor="b"/>
+          <a:lstStyle>
+            <a:lvl1pPr algn="r">
+              <a:defRPr sz="1200"/>
+            </a:lvl1pPr>
+          </a:lstStyle>
+          <a:p>
+            <a:fld id="{5988FF66-755F-4465-A568-8C79AA8BD5FD}" type="slidenum">
+              <a:rPr lang="en-US" smtClean="0"/>
+              <a:t>‹#›</a:t>
+            </a:fld>
+            <a:endParaRPr lang="en-US"/>
+          </a:p>
+        </p:txBody>
+      </p:sp>
+    </p:spTree>
+    <p:extLst>
+      <p:ext uri="{BB962C8B-B14F-4D97-AF65-F5344CB8AC3E}">
+        <p14:creationId xmlns:p14="http://schemas.microsoft.com/office/powerpoint/2010/main" val="2660108977"/>
+      </p:ext>
+    </p:extLst>
+  </p:cSld>
+  <p:clrMap bg1="lt1" tx1="dk1" bg2="lt2" tx2="dk2" accent1="accent1" accent2="accent2" accent3="accent3" accent4="accent4" accent5="accent5" accent6="accent6" hlink="hlink" folHlink="folHlink"/>
+  <p:notesStyle>
+    <a:lvl1pPr marL="0" algn="l" defTabSz="914400" rtl="0" eaLnBrk="1" latinLnBrk="0" hangingPunct="1">
+      <a:defRPr sz="1200" kern="1200">
+        <a:solidFill>
+          <a:schemeClr val="tx1"/>
+        </a:solidFill>
+        <a:latin typeface="+mn-lt"/>
+        <a:ea typeface="+mn-ea"/>
+        <a:cs typeface="+mn-cs"/>
+      </a:defRPr>
+    </a:lvl1pPr>
+    <a:lvl2pPr marL="457200" algn="l" defTabSz="914400" rtl="0" eaLnBrk="1" latinLnBrk="0" hangingPunct="1">
+      <a:defRPr sz="1200" kern="1200">
+        <a:solidFill>
+          <a:schemeClr val="tx1"/>
+        </a:solidFill>
+        <a:latin typeface="+mn-lt"/>
+        <a:ea typeface="+mn-ea"/>
+        <a:cs typeface="+mn-cs"/>
+      </a:defRPr>
+    </a:lvl2pPr>
+    <a:lvl3pPr marL="914400" algn="l" defTabSz="914400" rtl="0" eaLnBrk="1" latinLnBrk="0" hangingPunct="1">
+      <a:defRPr sz="1200" kern="1200">
+        <a:solidFill>
+          <a:schemeClr val="tx1"/>
+        </a:solidFill>
+        <a:latin typeface="+mn-lt"/>
+        <a:ea typeface="+mn-ea"/>
+        <a:cs typeface="+mn-cs"/>
+      </a:defRPr>
+    </a:lvl3pPr>
+    <a:lvl4pPr marL="1371600" algn="l" defTabSz="914400" rtl="0" eaLnBrk="1" latinLnBrk="0" hangingPunct="1">
+      <a:defRPr sz="1200" kern="1200">
+        <a:solidFill>
+          <a:schemeClr val="tx1"/>
+        </a:solidFill>
+        <a:latin typeface="+mn-lt"/>
+        <a:ea typeface="+mn-ea"/>
+        <a:cs typeface="+mn-cs"/>
+      </a:defRPr>
+    </a:lvl4pPr>
+    <a:lvl5pPr marL="1828800" algn="l" defTabSz="914400" rtl="0" eaLnBrk="1" latinLnBrk="0" hangingPunct="1">
+      <a:defRPr sz="1200" kern="1200">
+        <a:solidFill>
+          <a:schemeClr val="tx1"/>
+        </a:solidFill>
+        <a:latin typeface="+mn-lt"/>
+        <a:ea typeface="+mn-ea"/>
+        <a:cs typeface="+mn-cs"/>
+      </a:defRPr>
+    </a:lvl5pPr>
+    <a:lvl6pPr marL="2286000" algn="l" defTabSz="914400" rtl="0" eaLnBrk="1" latinLnBrk="0" hangingPunct="1">
+      <a:defRPr sz="1200" kern="1200">
+        <a:solidFill>
+          <a:schemeClr val="tx1"/>
+        </a:solidFill>
+        <a:latin typeface="+mn-lt"/>
+        <a:ea typeface="+mn-ea"/>
+        <a:cs typeface="+mn-cs"/>
+      </a:defRPr>
+    </a:lvl6pPr>
+    <a:lvl7pPr marL="2743200" algn="l" defTabSz="914400" rtl="0" eaLnBrk="1" latinLnBrk="0" hangingPunct="1">
+      <a:defRPr sz="1200" kern="1200">
+        <a:solidFill>
+          <a:schemeClr val="tx1"/>
+        </a:solidFill>
+        <a:latin typeface="+mn-lt"/>
+        <a:ea typeface="+mn-ea"/>
+        <a:cs typeface="+mn-cs"/>
+      </a:defRPr>
+    </a:lvl7pPr>
+    <a:lvl8pPr marL="3200400" algn="l" defTabSz="914400" rtl="0" eaLnBrk="1" latinLnBrk="0" hangingPunct="1">
+      <a:defRPr sz="1200" kern="1200">
+        <a:solidFill>
+          <a:schemeClr val="tx1"/>
+        </a:solidFill>
+        <a:latin typeface="+mn-lt"/>
+        <a:ea typeface="+mn-ea"/>
+        <a:cs typeface="+mn-cs"/>
+      </a:defRPr>
+    </a:lvl8pPr>
+    <a:lvl9pPr marL="3657600" algn="l" defTabSz="914400" rtl="0" eaLnBrk="1" latinLnBrk="0" hangingPunct="1">
+      <a:defRPr sz="1200" kern="1200">
+        <a:solidFill>
+          <a:schemeClr val="tx1"/>
+        </a:solidFill>
+        <a:latin typeface="+mn-lt"/>
+        <a:ea typeface="+mn-ea"/>
+        <a:cs typeface="+mn-cs"/>
+      </a:defRPr>
+    </a:lvl9pPr>
+  </p:notesStyle>
+</p:notesMaster>
+</file>
+
+<file path=ppt/notesSlides/notesSlide1.xml><?xml version="1.0" encoding="utf-8"?>
+<p:notes xmlns:a="http://schemas.openxmlformats.org/drawingml/2006/main" xmlns:r="http://schemas.openxmlformats.org/officeDocument/2006/relationships" xmlns:p="http://schemas.openxmlformats.org/presentationml/2006/main">
+  <p:cSld>
+    <p:spTree>
+      <p:nvGrpSpPr>
+        <p:cNvPr id="1" name=""/>
+        <p:cNvGrpSpPr/>
+        <p:nvPr/>
+      </p:nvGrpSpPr>
+      <p:grpSpPr>
+        <a:xfrm>
+          <a:off x="0" y="0"/>
+          <a:ext cx="0" cy="0"/>
+          <a:chOff x="0" y="0"/>
+          <a:chExt cx="0" cy="0"/>
+        </a:xfrm>
+      </p:grpSpPr>
+      <p:sp>
+        <p:nvSpPr>
+          <p:cNvPr id="2" name="Slide Image Placeholder 1"/>
+          <p:cNvSpPr>
+            <a:spLocks noGrp="1" noRot="1" noChangeAspect="1"/>
+          </p:cNvSpPr>
+          <p:nvPr>
+            <p:ph type="sldImg"/>
+          </p:nvPr>
+        </p:nvSpPr>
+        <p:spPr/>
+      </p:sp>
+      <p:sp>
+        <p:nvSpPr>
+          <p:cNvPr id="3" name="Notes Placeholder 2"/>
+          <p:cNvSpPr>
+            <a:spLocks noGrp="1"/>
+          </p:cNvSpPr>
+          <p:nvPr>
+            <p:ph type="body" idx="1"/>
+          </p:nvPr>
+        </p:nvSpPr>
+        <p:spPr/>
+        <p:txBody>
+          <a:bodyPr/>
+          <a:lstStyle/>
+          <a:p>
+            <a:endParaRPr lang="en-US" dirty="0"/>
+          </a:p>
+        </p:txBody>
+      </p:sp>
+      <p:sp>
+        <p:nvSpPr>
+          <p:cNvPr id="4" name="Slide Number Placeholder 3"/>
+          <p:cNvSpPr>
+            <a:spLocks noGrp="1"/>
+          </p:cNvSpPr>
+          <p:nvPr>
+            <p:ph type="sldNum" sz="quarter" idx="5"/>
+          </p:nvPr>
+        </p:nvSpPr>
+        <p:spPr/>
+        <p:txBody>
+          <a:bodyPr/>
+          <a:lstStyle/>
+          <a:p>
+            <a:fld id="{5988FF66-755F-4465-A568-8C79AA8BD5FD}" type="slidenum">
+              <a:rPr lang="en-US" smtClean="0"/>
+              <a:t>12</a:t>
+            </a:fld>
+            <a:endParaRPr lang="en-US"/>
+          </a:p>
+        </p:txBody>
+      </p:sp>
+    </p:spTree>
+    <p:extLst>
+      <p:ext uri="{BB962C8B-B14F-4D97-AF65-F5344CB8AC3E}">
+        <p14:creationId xmlns:p14="http://schemas.microsoft.com/office/powerpoint/2010/main" val="1146839651"/>
+      </p:ext>
+    </p:extLst>
+  </p:cSld>
+  <p:clrMapOvr>
+    <a:masterClrMapping/>
+  </p:clrMapOvr>
+</p:notes>
 </file>
 
 <file path=ppt/slideLayouts/slideLayout1.xml><?xml version="1.0" encoding="utf-8"?>
@@ -302,7 +742,7 @@
           <a:p>
             <a:fld id="{F1B00FCE-A7A8-443A-ABD2-F1E5E91ABEB0}" type="datetimeFigureOut">
               <a:rPr lang="sv-SE" smtClean="0"/>
-              <a:t>2019-02-03</a:t>
+              <a:t>2019-02-04</a:t>
             </a:fld>
             <a:endParaRPr lang="sv-SE"/>
           </a:p>
@@ -502,7 +942,7 @@
           <a:p>
             <a:fld id="{F1B00FCE-A7A8-443A-ABD2-F1E5E91ABEB0}" type="datetimeFigureOut">
               <a:rPr lang="sv-SE" smtClean="0"/>
-              <a:t>2019-02-03</a:t>
+              <a:t>2019-02-04</a:t>
             </a:fld>
             <a:endParaRPr lang="sv-SE"/>
           </a:p>
@@ -712,7 +1152,7 @@
           <a:p>
             <a:fld id="{F1B00FCE-A7A8-443A-ABD2-F1E5E91ABEB0}" type="datetimeFigureOut">
               <a:rPr lang="sv-SE" smtClean="0"/>
-              <a:t>2019-02-03</a:t>
+              <a:t>2019-02-04</a:t>
             </a:fld>
             <a:endParaRPr lang="sv-SE"/>
           </a:p>
@@ -912,7 +1352,7 @@
           <a:p>
             <a:fld id="{F1B00FCE-A7A8-443A-ABD2-F1E5E91ABEB0}" type="datetimeFigureOut">
               <a:rPr lang="sv-SE" smtClean="0"/>
-              <a:t>2019-02-03</a:t>
+              <a:t>2019-02-04</a:t>
             </a:fld>
             <a:endParaRPr lang="sv-SE"/>
           </a:p>
@@ -1188,7 +1628,7 @@
           <a:p>
             <a:fld id="{F1B00FCE-A7A8-443A-ABD2-F1E5E91ABEB0}" type="datetimeFigureOut">
               <a:rPr lang="sv-SE" smtClean="0"/>
-              <a:t>2019-02-03</a:t>
+              <a:t>2019-02-04</a:t>
             </a:fld>
             <a:endParaRPr lang="sv-SE"/>
           </a:p>
@@ -1456,7 +1896,7 @@
           <a:p>
             <a:fld id="{F1B00FCE-A7A8-443A-ABD2-F1E5E91ABEB0}" type="datetimeFigureOut">
               <a:rPr lang="sv-SE" smtClean="0"/>
-              <a:t>2019-02-03</a:t>
+              <a:t>2019-02-04</a:t>
             </a:fld>
             <a:endParaRPr lang="sv-SE"/>
           </a:p>
@@ -1871,7 +2311,7 @@
           <a:p>
             <a:fld id="{F1B00FCE-A7A8-443A-ABD2-F1E5E91ABEB0}" type="datetimeFigureOut">
               <a:rPr lang="sv-SE" smtClean="0"/>
-              <a:t>2019-02-03</a:t>
+              <a:t>2019-02-04</a:t>
             </a:fld>
             <a:endParaRPr lang="sv-SE"/>
           </a:p>
@@ -2013,7 +2453,7 @@
           <a:p>
             <a:fld id="{F1B00FCE-A7A8-443A-ABD2-F1E5E91ABEB0}" type="datetimeFigureOut">
               <a:rPr lang="sv-SE" smtClean="0"/>
-              <a:t>2019-02-03</a:t>
+              <a:t>2019-02-04</a:t>
             </a:fld>
             <a:endParaRPr lang="sv-SE"/>
           </a:p>
@@ -2126,7 +2566,7 @@
           <a:p>
             <a:fld id="{F1B00FCE-A7A8-443A-ABD2-F1E5E91ABEB0}" type="datetimeFigureOut">
               <a:rPr lang="sv-SE" smtClean="0"/>
-              <a:t>2019-02-03</a:t>
+              <a:t>2019-02-04</a:t>
             </a:fld>
             <a:endParaRPr lang="sv-SE"/>
           </a:p>
@@ -2439,7 +2879,7 @@
           <a:p>
             <a:fld id="{F1B00FCE-A7A8-443A-ABD2-F1E5E91ABEB0}" type="datetimeFigureOut">
               <a:rPr lang="sv-SE" smtClean="0"/>
-              <a:t>2019-02-03</a:t>
+              <a:t>2019-02-04</a:t>
             </a:fld>
             <a:endParaRPr lang="sv-SE"/>
           </a:p>
@@ -2728,7 +3168,7 @@
           <a:p>
             <a:fld id="{F1B00FCE-A7A8-443A-ABD2-F1E5E91ABEB0}" type="datetimeFigureOut">
               <a:rPr lang="sv-SE" smtClean="0"/>
-              <a:t>2019-02-03</a:t>
+              <a:t>2019-02-04</a:t>
             </a:fld>
             <a:endParaRPr lang="sv-SE"/>
           </a:p>
@@ -2971,7 +3411,7 @@
           <a:p>
             <a:fld id="{F1B00FCE-A7A8-443A-ABD2-F1E5E91ABEB0}" type="datetimeFigureOut">
               <a:rPr lang="sv-SE" smtClean="0"/>
-              <a:t>2019-02-03</a:t>
+              <a:t>2019-02-04</a:t>
             </a:fld>
             <a:endParaRPr lang="sv-SE"/>
           </a:p>
@@ -3595,19 +4035,13 @@
             </a:r>
             <a:r>
               <a:rPr lang="en-US" dirty="0"/>
-              <a:t>Shoots out an energy orb in target direction. By pressing the ability button again a lighting will strike and reduce team spirit based on amount of targets hit. </a:t>
-            </a:r>
-          </a:p>
-          <a:p>
-            <a:r>
-              <a:rPr lang="en-US" dirty="0"/>
-              <a:t>Or</a:t>
-            </a:r>
-          </a:p>
-          <a:p>
-            <a:r>
-              <a:rPr lang="en-US" dirty="0"/>
-              <a:t>Lobs a projectile by holding down ability button to increase distance traveled. </a:t>
+              <a:t>Shoots out an energy orb in target direction. By pressing the ability button again the orb will explode and reduce team spirit based on amount of targets hit. </a:t>
+            </a:r>
+          </a:p>
+          <a:p>
+            <a:r>
+              <a:rPr lang="en-US" b="1" dirty="0"/>
+              <a:t>Secondary Ability: </a:t>
             </a:r>
           </a:p>
           <a:p>
@@ -4509,7 +4943,7 @@
           </p:nvPr>
         </p:nvPicPr>
         <p:blipFill>
-          <a:blip r:embed="rId2">
+          <a:blip r:embed="rId3">
             <a:extLst>
               <a:ext uri="{28A0092B-C50C-407E-A947-70E740481C1C}">
                 <a14:useLocalDpi xmlns:a14="http://schemas.microsoft.com/office/drawing/2010/main" val="0"/>
@@ -4750,6 +5184,42 @@
           </a:p>
         </p:txBody>
       </p:sp>
+      <p:cxnSp>
+        <p:nvCxnSpPr>
+          <p:cNvPr id="10" name="Straight Connector 9">
+            <a:extLst>
+              <a:ext uri="{FF2B5EF4-FFF2-40B4-BE49-F238E27FC236}">
+                <a16:creationId xmlns:a16="http://schemas.microsoft.com/office/drawing/2014/main" id="{7DDE4FF1-3CD2-4C4C-822D-EC5EB57D590A}"/>
+              </a:ext>
+            </a:extLst>
+          </p:cNvPr>
+          <p:cNvCxnSpPr/>
+          <p:nvPr/>
+        </p:nvCxnSpPr>
+        <p:spPr>
+          <a:xfrm>
+            <a:off x="525101" y="3567065"/>
+            <a:ext cx="4658087" cy="0"/>
+          </a:xfrm>
+          <a:prstGeom prst="line">
+            <a:avLst/>
+          </a:prstGeom>
+        </p:spPr>
+        <p:style>
+          <a:lnRef idx="1">
+            <a:schemeClr val="accent1"/>
+          </a:lnRef>
+          <a:fillRef idx="0">
+            <a:schemeClr val="accent1"/>
+          </a:fillRef>
+          <a:effectRef idx="0">
+            <a:schemeClr val="accent1"/>
+          </a:effectRef>
+          <a:fontRef idx="minor">
+            <a:schemeClr val="tx1"/>
+          </a:fontRef>
+        </p:style>
+      </p:cxnSp>
     </p:spTree>
     <p:extLst>
       <p:ext uri="{BB962C8B-B14F-4D97-AF65-F5344CB8AC3E}">
@@ -5392,6 +5862,1333 @@
 </p:sld>
 </file>
 
+<file path=ppt/slides/slide18.xml><?xml version="1.0" encoding="utf-8"?>
+<p:sld xmlns:a="http://schemas.openxmlformats.org/drawingml/2006/main" xmlns:r="http://schemas.openxmlformats.org/officeDocument/2006/relationships" xmlns:p="http://schemas.openxmlformats.org/presentationml/2006/main">
+  <p:cSld>
+    <p:spTree>
+      <p:nvGrpSpPr>
+        <p:cNvPr id="1" name=""/>
+        <p:cNvGrpSpPr/>
+        <p:nvPr/>
+      </p:nvGrpSpPr>
+      <p:grpSpPr>
+        <a:xfrm>
+          <a:off x="0" y="0"/>
+          <a:ext cx="0" cy="0"/>
+          <a:chOff x="0" y="0"/>
+          <a:chExt cx="0" cy="0"/>
+        </a:xfrm>
+      </p:grpSpPr>
+      <p:sp>
+        <p:nvSpPr>
+          <p:cNvPr id="2" name="Title 1">
+            <a:extLst>
+              <a:ext uri="{FF2B5EF4-FFF2-40B4-BE49-F238E27FC236}">
+                <a16:creationId xmlns:a16="http://schemas.microsoft.com/office/drawing/2014/main" id="{A76ED8F6-335D-4E50-97F4-FDEC8B58F11F}"/>
+              </a:ext>
+            </a:extLst>
+          </p:cNvPr>
+          <p:cNvSpPr>
+            <a:spLocks noGrp="1"/>
+          </p:cNvSpPr>
+          <p:nvPr>
+            <p:ph type="title"/>
+          </p:nvPr>
+        </p:nvSpPr>
+        <p:spPr/>
+        <p:txBody>
+          <a:bodyPr/>
+          <a:lstStyle/>
+          <a:p>
+            <a:r>
+              <a:rPr lang="en-US" dirty="0"/>
+              <a:t>Idea workshop</a:t>
+            </a:r>
+          </a:p>
+        </p:txBody>
+      </p:sp>
+      <p:sp>
+        <p:nvSpPr>
+          <p:cNvPr id="3" name="Content Placeholder 2">
+            <a:extLst>
+              <a:ext uri="{FF2B5EF4-FFF2-40B4-BE49-F238E27FC236}">
+                <a16:creationId xmlns:a16="http://schemas.microsoft.com/office/drawing/2014/main" id="{34A00160-5D47-409D-8736-1050815C0C88}"/>
+              </a:ext>
+            </a:extLst>
+          </p:cNvPr>
+          <p:cNvSpPr>
+            <a:spLocks noGrp="1"/>
+          </p:cNvSpPr>
+          <p:nvPr>
+            <p:ph idx="1"/>
+          </p:nvPr>
+        </p:nvSpPr>
+        <p:spPr>
+          <a:xfrm>
+            <a:off x="4835768" y="870438"/>
+            <a:ext cx="6374423" cy="5451230"/>
+          </a:xfrm>
+        </p:spPr>
+        <p:txBody>
+          <a:bodyPr>
+            <a:normAutofit fontScale="92500" lnSpcReduction="20000"/>
+          </a:bodyPr>
+          <a:lstStyle/>
+          <a:p>
+            <a:pPr marL="0" indent="0">
+              <a:buNone/>
+            </a:pPr>
+            <a:r>
+              <a:rPr lang="en-US" dirty="0"/>
+              <a:t>Feedback for moving apart, change in movement. </a:t>
+            </a:r>
+          </a:p>
+          <a:p>
+            <a:pPr marL="0" indent="0">
+              <a:buNone/>
+            </a:pPr>
+            <a:r>
+              <a:rPr lang="en-US" dirty="0"/>
+              <a:t>1p?</a:t>
+            </a:r>
+          </a:p>
+          <a:p>
+            <a:pPr marL="0" indent="0">
+              <a:buNone/>
+            </a:pPr>
+            <a:r>
+              <a:rPr lang="en-US" dirty="0"/>
+              <a:t>Just movement, make movement within the team spirit area of affection interesting/fun</a:t>
+            </a:r>
+          </a:p>
+          <a:p>
+            <a:pPr marL="0" indent="0">
+              <a:buNone/>
+            </a:pPr>
+            <a:r>
+              <a:rPr lang="en-US" dirty="0"/>
+              <a:t>Terrain/arena</a:t>
+            </a:r>
+          </a:p>
+          <a:p>
+            <a:pPr marL="0" indent="0">
+              <a:buNone/>
+            </a:pPr>
+            <a:r>
+              <a:rPr lang="en-US" dirty="0"/>
+              <a:t>	Properties</a:t>
+            </a:r>
+          </a:p>
+          <a:p>
+            <a:pPr marL="0" indent="0">
+              <a:buNone/>
+            </a:pPr>
+            <a:r>
+              <a:rPr lang="en-US" dirty="0"/>
+              <a:t>	layout</a:t>
+            </a:r>
+          </a:p>
+          <a:p>
+            <a:pPr marL="0" indent="0">
+              <a:buNone/>
+            </a:pPr>
+            <a:r>
+              <a:rPr lang="en-US" dirty="0"/>
+              <a:t>	Shape</a:t>
+            </a:r>
+          </a:p>
+          <a:p>
+            <a:pPr marL="0" indent="0">
+              <a:buNone/>
+            </a:pPr>
+            <a:r>
+              <a:rPr lang="en-US" dirty="0"/>
+              <a:t>	Theme</a:t>
+            </a:r>
+          </a:p>
+          <a:p>
+            <a:pPr marL="0" indent="0">
+              <a:buNone/>
+            </a:pPr>
+            <a:r>
+              <a:rPr lang="en-US" dirty="0"/>
+              <a:t>	Reduced vision</a:t>
+            </a:r>
+          </a:p>
+          <a:p>
+            <a:pPr marL="0" indent="0">
+              <a:buNone/>
+            </a:pPr>
+            <a:r>
+              <a:rPr lang="en-US" dirty="0"/>
+              <a:t>	Hurdles</a:t>
+            </a:r>
+          </a:p>
+          <a:p>
+            <a:pPr marL="0" indent="0">
+              <a:buNone/>
+            </a:pPr>
+            <a:r>
+              <a:rPr lang="en-US" dirty="0"/>
+              <a:t>Team spirit = </a:t>
+            </a:r>
+            <a:r>
+              <a:rPr lang="en-US" dirty="0" err="1"/>
+              <a:t>Dependant</a:t>
+            </a:r>
+            <a:r>
+              <a:rPr lang="en-US" dirty="0"/>
+              <a:t> on all characters </a:t>
+            </a:r>
+          </a:p>
+          <a:p>
+            <a:pPr marL="0" indent="0">
+              <a:buNone/>
+            </a:pPr>
+            <a:endParaRPr lang="en-US" dirty="0"/>
+          </a:p>
+        </p:txBody>
+      </p:sp>
+      <p:sp>
+        <p:nvSpPr>
+          <p:cNvPr id="5" name="Content Placeholder 2">
+            <a:extLst>
+              <a:ext uri="{FF2B5EF4-FFF2-40B4-BE49-F238E27FC236}">
+                <a16:creationId xmlns:a16="http://schemas.microsoft.com/office/drawing/2014/main" id="{7F0DAFC4-DA81-4BEA-8F9A-D1A4ECB05198}"/>
+              </a:ext>
+            </a:extLst>
+          </p:cNvPr>
+          <p:cNvSpPr txBox="1">
+            <a:spLocks/>
+          </p:cNvSpPr>
+          <p:nvPr/>
+        </p:nvSpPr>
+        <p:spPr>
+          <a:xfrm>
+            <a:off x="981810" y="1690688"/>
+            <a:ext cx="3710350" cy="4402381"/>
+          </a:xfrm>
+          <a:prstGeom prst="rect">
+            <a:avLst/>
+          </a:prstGeom>
+        </p:spPr>
+        <p:txBody>
+          <a:bodyPr vert="horz" lIns="91440" tIns="45720" rIns="91440" bIns="45720" rtlCol="0">
+            <a:normAutofit fontScale="70000" lnSpcReduction="20000"/>
+          </a:bodyPr>
+          <a:lstStyle>
+            <a:lvl1pPr marL="228600" indent="-228600" algn="l" defTabSz="914400" rtl="0" eaLnBrk="1" latinLnBrk="0" hangingPunct="1">
+              <a:lnSpc>
+                <a:spcPct val="90000"/>
+              </a:lnSpc>
+              <a:spcBef>
+                <a:spcPts val="1000"/>
+              </a:spcBef>
+              <a:buFont typeface="Arial" panose="020B0604020202020204" pitchFamily="34" charset="0"/>
+              <a:buChar char="•"/>
+              <a:defRPr sz="2800" kern="1200">
+                <a:solidFill>
+                  <a:schemeClr val="tx1"/>
+                </a:solidFill>
+                <a:latin typeface="+mn-lt"/>
+                <a:ea typeface="+mn-ea"/>
+                <a:cs typeface="+mn-cs"/>
+              </a:defRPr>
+            </a:lvl1pPr>
+            <a:lvl2pPr marL="685800" indent="-228600" algn="l" defTabSz="914400" rtl="0" eaLnBrk="1" latinLnBrk="0" hangingPunct="1">
+              <a:lnSpc>
+                <a:spcPct val="90000"/>
+              </a:lnSpc>
+              <a:spcBef>
+                <a:spcPts val="500"/>
+              </a:spcBef>
+              <a:buFont typeface="Arial" panose="020B0604020202020204" pitchFamily="34" charset="0"/>
+              <a:buChar char="•"/>
+              <a:defRPr sz="2400" kern="1200">
+                <a:solidFill>
+                  <a:schemeClr val="tx1"/>
+                </a:solidFill>
+                <a:latin typeface="+mn-lt"/>
+                <a:ea typeface="+mn-ea"/>
+                <a:cs typeface="+mn-cs"/>
+              </a:defRPr>
+            </a:lvl2pPr>
+            <a:lvl3pPr marL="1143000" indent="-228600" algn="l" defTabSz="914400" rtl="0" eaLnBrk="1" latinLnBrk="0" hangingPunct="1">
+              <a:lnSpc>
+                <a:spcPct val="90000"/>
+              </a:lnSpc>
+              <a:spcBef>
+                <a:spcPts val="500"/>
+              </a:spcBef>
+              <a:buFont typeface="Arial" panose="020B0604020202020204" pitchFamily="34" charset="0"/>
+              <a:buChar char="•"/>
+              <a:defRPr sz="2000" kern="1200">
+                <a:solidFill>
+                  <a:schemeClr val="tx1"/>
+                </a:solidFill>
+                <a:latin typeface="+mn-lt"/>
+                <a:ea typeface="+mn-ea"/>
+                <a:cs typeface="+mn-cs"/>
+              </a:defRPr>
+            </a:lvl3pPr>
+            <a:lvl4pPr marL="1600200" indent="-228600" algn="l" defTabSz="914400" rtl="0" eaLnBrk="1" latinLnBrk="0" hangingPunct="1">
+              <a:lnSpc>
+                <a:spcPct val="90000"/>
+              </a:lnSpc>
+              <a:spcBef>
+                <a:spcPts val="500"/>
+              </a:spcBef>
+              <a:buFont typeface="Arial" panose="020B0604020202020204" pitchFamily="34" charset="0"/>
+              <a:buChar char="•"/>
+              <a:defRPr sz="1800" kern="1200">
+                <a:solidFill>
+                  <a:schemeClr val="tx1"/>
+                </a:solidFill>
+                <a:latin typeface="+mn-lt"/>
+                <a:ea typeface="+mn-ea"/>
+                <a:cs typeface="+mn-cs"/>
+              </a:defRPr>
+            </a:lvl4pPr>
+            <a:lvl5pPr marL="2057400" indent="-228600" algn="l" defTabSz="914400" rtl="0" eaLnBrk="1" latinLnBrk="0" hangingPunct="1">
+              <a:lnSpc>
+                <a:spcPct val="90000"/>
+              </a:lnSpc>
+              <a:spcBef>
+                <a:spcPts val="500"/>
+              </a:spcBef>
+              <a:buFont typeface="Arial" panose="020B0604020202020204" pitchFamily="34" charset="0"/>
+              <a:buChar char="•"/>
+              <a:defRPr sz="1800" kern="1200">
+                <a:solidFill>
+                  <a:schemeClr val="tx1"/>
+                </a:solidFill>
+                <a:latin typeface="+mn-lt"/>
+                <a:ea typeface="+mn-ea"/>
+                <a:cs typeface="+mn-cs"/>
+              </a:defRPr>
+            </a:lvl5pPr>
+            <a:lvl6pPr marL="2514600" indent="-228600" algn="l" defTabSz="914400" rtl="0" eaLnBrk="1" latinLnBrk="0" hangingPunct="1">
+              <a:lnSpc>
+                <a:spcPct val="90000"/>
+              </a:lnSpc>
+              <a:spcBef>
+                <a:spcPts val="500"/>
+              </a:spcBef>
+              <a:buFont typeface="Arial" panose="020B0604020202020204" pitchFamily="34" charset="0"/>
+              <a:buChar char="•"/>
+              <a:defRPr sz="1800" kern="1200">
+                <a:solidFill>
+                  <a:schemeClr val="tx1"/>
+                </a:solidFill>
+                <a:latin typeface="+mn-lt"/>
+                <a:ea typeface="+mn-ea"/>
+                <a:cs typeface="+mn-cs"/>
+              </a:defRPr>
+            </a:lvl6pPr>
+            <a:lvl7pPr marL="2971800" indent="-228600" algn="l" defTabSz="914400" rtl="0" eaLnBrk="1" latinLnBrk="0" hangingPunct="1">
+              <a:lnSpc>
+                <a:spcPct val="90000"/>
+              </a:lnSpc>
+              <a:spcBef>
+                <a:spcPts val="500"/>
+              </a:spcBef>
+              <a:buFont typeface="Arial" panose="020B0604020202020204" pitchFamily="34" charset="0"/>
+              <a:buChar char="•"/>
+              <a:defRPr sz="1800" kern="1200">
+                <a:solidFill>
+                  <a:schemeClr val="tx1"/>
+                </a:solidFill>
+                <a:latin typeface="+mn-lt"/>
+                <a:ea typeface="+mn-ea"/>
+                <a:cs typeface="+mn-cs"/>
+              </a:defRPr>
+            </a:lvl7pPr>
+            <a:lvl8pPr marL="3429000" indent="-228600" algn="l" defTabSz="914400" rtl="0" eaLnBrk="1" latinLnBrk="0" hangingPunct="1">
+              <a:lnSpc>
+                <a:spcPct val="90000"/>
+              </a:lnSpc>
+              <a:spcBef>
+                <a:spcPts val="500"/>
+              </a:spcBef>
+              <a:buFont typeface="Arial" panose="020B0604020202020204" pitchFamily="34" charset="0"/>
+              <a:buChar char="•"/>
+              <a:defRPr sz="1800" kern="1200">
+                <a:solidFill>
+                  <a:schemeClr val="tx1"/>
+                </a:solidFill>
+                <a:latin typeface="+mn-lt"/>
+                <a:ea typeface="+mn-ea"/>
+                <a:cs typeface="+mn-cs"/>
+              </a:defRPr>
+            </a:lvl8pPr>
+            <a:lvl9pPr marL="3886200" indent="-228600" algn="l" defTabSz="914400" rtl="0" eaLnBrk="1" latinLnBrk="0" hangingPunct="1">
+              <a:lnSpc>
+                <a:spcPct val="90000"/>
+              </a:lnSpc>
+              <a:spcBef>
+                <a:spcPts val="500"/>
+              </a:spcBef>
+              <a:buFont typeface="Arial" panose="020B0604020202020204" pitchFamily="34" charset="0"/>
+              <a:buChar char="•"/>
+              <a:defRPr sz="1800" kern="1200">
+                <a:solidFill>
+                  <a:schemeClr val="tx1"/>
+                </a:solidFill>
+                <a:latin typeface="+mn-lt"/>
+                <a:ea typeface="+mn-ea"/>
+                <a:cs typeface="+mn-cs"/>
+              </a:defRPr>
+            </a:lvl9pPr>
+          </a:lstStyle>
+          <a:p>
+            <a:r>
+              <a:rPr lang="en-US" dirty="0"/>
+              <a:t>Talk to Jerry or Tommy </a:t>
+            </a:r>
+            <a:r>
+              <a:rPr lang="en-US" dirty="0" err="1"/>
+              <a:t>Liponen</a:t>
+            </a:r>
+            <a:endParaRPr lang="en-US" dirty="0"/>
+          </a:p>
+          <a:p>
+            <a:pPr lvl="1"/>
+            <a:r>
+              <a:rPr lang="en-US" dirty="0"/>
+              <a:t>Networking</a:t>
+            </a:r>
+          </a:p>
+          <a:p>
+            <a:pPr lvl="1"/>
+            <a:r>
+              <a:rPr lang="en-US" dirty="0"/>
+              <a:t>Multiplayer </a:t>
+            </a:r>
+          </a:p>
+          <a:p>
+            <a:pPr lvl="1"/>
+            <a:endParaRPr lang="en-US" dirty="0"/>
+          </a:p>
+          <a:p>
+            <a:pPr lvl="1"/>
+            <a:endParaRPr lang="en-US" dirty="0"/>
+          </a:p>
+          <a:p>
+            <a:pPr marL="457200" lvl="1" indent="0">
+              <a:buNone/>
+            </a:pPr>
+            <a:r>
+              <a:rPr lang="en-US" dirty="0" err="1"/>
+              <a:t>Teamspirit</a:t>
+            </a:r>
+            <a:r>
+              <a:rPr lang="en-US" dirty="0"/>
+              <a:t> distance reduction. Picture. Feedback. </a:t>
+            </a:r>
+          </a:p>
+          <a:p>
+            <a:pPr marL="457200" lvl="1" indent="0">
+              <a:buNone/>
+            </a:pPr>
+            <a:endParaRPr lang="en-US" dirty="0"/>
+          </a:p>
+          <a:p>
+            <a:pPr marL="457200" lvl="1" indent="0">
+              <a:buNone/>
+            </a:pPr>
+            <a:r>
+              <a:rPr lang="en-US" dirty="0"/>
+              <a:t>Mechanics that are available when only close.</a:t>
+            </a:r>
+          </a:p>
+          <a:p>
+            <a:pPr marL="457200" lvl="1" indent="0">
+              <a:buNone/>
+            </a:pPr>
+            <a:endParaRPr lang="en-US" dirty="0"/>
+          </a:p>
+          <a:p>
+            <a:pPr marL="457200" lvl="1" indent="0">
+              <a:buNone/>
+            </a:pPr>
+            <a:r>
+              <a:rPr lang="en-US" dirty="0"/>
+              <a:t>What happens after a smash has been shot?</a:t>
+            </a:r>
+          </a:p>
+          <a:p>
+            <a:pPr marL="457200" lvl="1" indent="0">
+              <a:buNone/>
+            </a:pPr>
+            <a:endParaRPr lang="en-US" dirty="0"/>
+          </a:p>
+          <a:p>
+            <a:pPr marL="457200" lvl="1" indent="0">
+              <a:buNone/>
+            </a:pPr>
+            <a:r>
+              <a:rPr lang="en-US" dirty="0"/>
+              <a:t>Round system: 1. find each other 2. strategy 3. fight</a:t>
+            </a:r>
+          </a:p>
+          <a:p>
+            <a:pPr marL="457200" lvl="1" indent="0">
+              <a:buNone/>
+            </a:pPr>
+            <a:endParaRPr lang="en-US" dirty="0"/>
+          </a:p>
+          <a:p>
+            <a:pPr marL="457200" lvl="1" indent="0">
+              <a:buNone/>
+            </a:pPr>
+            <a:r>
+              <a:rPr lang="en-US" dirty="0"/>
+              <a:t>1. Find -&gt; Fighting </a:t>
+            </a:r>
+          </a:p>
+          <a:p>
+            <a:pPr marL="457200" lvl="1" indent="0">
+              <a:buNone/>
+            </a:pPr>
+            <a:endParaRPr lang="en-US" dirty="0"/>
+          </a:p>
+        </p:txBody>
+      </p:sp>
+    </p:spTree>
+    <p:extLst>
+      <p:ext uri="{BB962C8B-B14F-4D97-AF65-F5344CB8AC3E}">
+        <p14:creationId xmlns:p14="http://schemas.microsoft.com/office/powerpoint/2010/main" val="854355500"/>
+      </p:ext>
+    </p:extLst>
+  </p:cSld>
+  <p:clrMapOvr>
+    <a:masterClrMapping/>
+  </p:clrMapOvr>
+</p:sld>
+</file>
+
+<file path=ppt/slides/slide19.xml><?xml version="1.0" encoding="utf-8"?>
+<p:sld xmlns:a="http://schemas.openxmlformats.org/drawingml/2006/main" xmlns:r="http://schemas.openxmlformats.org/officeDocument/2006/relationships" xmlns:p="http://schemas.openxmlformats.org/presentationml/2006/main">
+  <p:cSld>
+    <p:spTree>
+      <p:nvGrpSpPr>
+        <p:cNvPr id="1" name=""/>
+        <p:cNvGrpSpPr/>
+        <p:nvPr/>
+      </p:nvGrpSpPr>
+      <p:grpSpPr>
+        <a:xfrm>
+          <a:off x="0" y="0"/>
+          <a:ext cx="0" cy="0"/>
+          <a:chOff x="0" y="0"/>
+          <a:chExt cx="0" cy="0"/>
+        </a:xfrm>
+      </p:grpSpPr>
+      <p:sp>
+        <p:nvSpPr>
+          <p:cNvPr id="3" name="Content Placeholder 2">
+            <a:extLst>
+              <a:ext uri="{FF2B5EF4-FFF2-40B4-BE49-F238E27FC236}">
+                <a16:creationId xmlns:a16="http://schemas.microsoft.com/office/drawing/2014/main" id="{34A00160-5D47-409D-8736-1050815C0C88}"/>
+              </a:ext>
+            </a:extLst>
+          </p:cNvPr>
+          <p:cNvSpPr>
+            <a:spLocks noGrp="1"/>
+          </p:cNvSpPr>
+          <p:nvPr>
+            <p:ph idx="1"/>
+          </p:nvPr>
+        </p:nvSpPr>
+        <p:spPr>
+          <a:xfrm>
+            <a:off x="5671038" y="418856"/>
+            <a:ext cx="5539153" cy="5902813"/>
+          </a:xfrm>
+        </p:spPr>
+        <p:txBody>
+          <a:bodyPr/>
+          <a:lstStyle/>
+          <a:p>
+            <a:pPr marL="0" indent="0">
+              <a:buNone/>
+            </a:pPr>
+            <a:r>
+              <a:rPr lang="en-US" dirty="0"/>
+              <a:t>MDA </a:t>
+            </a:r>
+          </a:p>
+          <a:p>
+            <a:pPr marL="0" indent="0">
+              <a:buNone/>
+            </a:pPr>
+            <a:r>
+              <a:rPr lang="en-US" dirty="0"/>
+              <a:t>Mail Johan, Tommy... </a:t>
+            </a:r>
+          </a:p>
+          <a:p>
+            <a:pPr marL="0" indent="0">
+              <a:buNone/>
+            </a:pPr>
+            <a:endParaRPr lang="en-US" dirty="0"/>
+          </a:p>
+        </p:txBody>
+      </p:sp>
+      <p:sp>
+        <p:nvSpPr>
+          <p:cNvPr id="5" name="Content Placeholder 2">
+            <a:extLst>
+              <a:ext uri="{FF2B5EF4-FFF2-40B4-BE49-F238E27FC236}">
+                <a16:creationId xmlns:a16="http://schemas.microsoft.com/office/drawing/2014/main" id="{7F0DAFC4-DA81-4BEA-8F9A-D1A4ECB05198}"/>
+              </a:ext>
+            </a:extLst>
+          </p:cNvPr>
+          <p:cNvSpPr txBox="1">
+            <a:spLocks/>
+          </p:cNvSpPr>
+          <p:nvPr/>
+        </p:nvSpPr>
+        <p:spPr>
+          <a:xfrm>
+            <a:off x="981809" y="418856"/>
+            <a:ext cx="3959467" cy="5674214"/>
+          </a:xfrm>
+          <a:prstGeom prst="rect">
+            <a:avLst/>
+          </a:prstGeom>
+        </p:spPr>
+        <p:txBody>
+          <a:bodyPr vert="horz" lIns="91440" tIns="45720" rIns="91440" bIns="45720" rtlCol="0">
+            <a:normAutofit fontScale="62500" lnSpcReduction="20000"/>
+          </a:bodyPr>
+          <a:lstStyle>
+            <a:lvl1pPr marL="228600" indent="-228600" algn="l" defTabSz="914400" rtl="0" eaLnBrk="1" latinLnBrk="0" hangingPunct="1">
+              <a:lnSpc>
+                <a:spcPct val="90000"/>
+              </a:lnSpc>
+              <a:spcBef>
+                <a:spcPts val="1000"/>
+              </a:spcBef>
+              <a:buFont typeface="Arial" panose="020B0604020202020204" pitchFamily="34" charset="0"/>
+              <a:buChar char="•"/>
+              <a:defRPr sz="2800" kern="1200">
+                <a:solidFill>
+                  <a:schemeClr val="tx1"/>
+                </a:solidFill>
+                <a:latin typeface="+mn-lt"/>
+                <a:ea typeface="+mn-ea"/>
+                <a:cs typeface="+mn-cs"/>
+              </a:defRPr>
+            </a:lvl1pPr>
+            <a:lvl2pPr marL="685800" indent="-228600" algn="l" defTabSz="914400" rtl="0" eaLnBrk="1" latinLnBrk="0" hangingPunct="1">
+              <a:lnSpc>
+                <a:spcPct val="90000"/>
+              </a:lnSpc>
+              <a:spcBef>
+                <a:spcPts val="500"/>
+              </a:spcBef>
+              <a:buFont typeface="Arial" panose="020B0604020202020204" pitchFamily="34" charset="0"/>
+              <a:buChar char="•"/>
+              <a:defRPr sz="2400" kern="1200">
+                <a:solidFill>
+                  <a:schemeClr val="tx1"/>
+                </a:solidFill>
+                <a:latin typeface="+mn-lt"/>
+                <a:ea typeface="+mn-ea"/>
+                <a:cs typeface="+mn-cs"/>
+              </a:defRPr>
+            </a:lvl2pPr>
+            <a:lvl3pPr marL="1143000" indent="-228600" algn="l" defTabSz="914400" rtl="0" eaLnBrk="1" latinLnBrk="0" hangingPunct="1">
+              <a:lnSpc>
+                <a:spcPct val="90000"/>
+              </a:lnSpc>
+              <a:spcBef>
+                <a:spcPts val="500"/>
+              </a:spcBef>
+              <a:buFont typeface="Arial" panose="020B0604020202020204" pitchFamily="34" charset="0"/>
+              <a:buChar char="•"/>
+              <a:defRPr sz="2000" kern="1200">
+                <a:solidFill>
+                  <a:schemeClr val="tx1"/>
+                </a:solidFill>
+                <a:latin typeface="+mn-lt"/>
+                <a:ea typeface="+mn-ea"/>
+                <a:cs typeface="+mn-cs"/>
+              </a:defRPr>
+            </a:lvl3pPr>
+            <a:lvl4pPr marL="1600200" indent="-228600" algn="l" defTabSz="914400" rtl="0" eaLnBrk="1" latinLnBrk="0" hangingPunct="1">
+              <a:lnSpc>
+                <a:spcPct val="90000"/>
+              </a:lnSpc>
+              <a:spcBef>
+                <a:spcPts val="500"/>
+              </a:spcBef>
+              <a:buFont typeface="Arial" panose="020B0604020202020204" pitchFamily="34" charset="0"/>
+              <a:buChar char="•"/>
+              <a:defRPr sz="1800" kern="1200">
+                <a:solidFill>
+                  <a:schemeClr val="tx1"/>
+                </a:solidFill>
+                <a:latin typeface="+mn-lt"/>
+                <a:ea typeface="+mn-ea"/>
+                <a:cs typeface="+mn-cs"/>
+              </a:defRPr>
+            </a:lvl4pPr>
+            <a:lvl5pPr marL="2057400" indent="-228600" algn="l" defTabSz="914400" rtl="0" eaLnBrk="1" latinLnBrk="0" hangingPunct="1">
+              <a:lnSpc>
+                <a:spcPct val="90000"/>
+              </a:lnSpc>
+              <a:spcBef>
+                <a:spcPts val="500"/>
+              </a:spcBef>
+              <a:buFont typeface="Arial" panose="020B0604020202020204" pitchFamily="34" charset="0"/>
+              <a:buChar char="•"/>
+              <a:defRPr sz="1800" kern="1200">
+                <a:solidFill>
+                  <a:schemeClr val="tx1"/>
+                </a:solidFill>
+                <a:latin typeface="+mn-lt"/>
+                <a:ea typeface="+mn-ea"/>
+                <a:cs typeface="+mn-cs"/>
+              </a:defRPr>
+            </a:lvl5pPr>
+            <a:lvl6pPr marL="2514600" indent="-228600" algn="l" defTabSz="914400" rtl="0" eaLnBrk="1" latinLnBrk="0" hangingPunct="1">
+              <a:lnSpc>
+                <a:spcPct val="90000"/>
+              </a:lnSpc>
+              <a:spcBef>
+                <a:spcPts val="500"/>
+              </a:spcBef>
+              <a:buFont typeface="Arial" panose="020B0604020202020204" pitchFamily="34" charset="0"/>
+              <a:buChar char="•"/>
+              <a:defRPr sz="1800" kern="1200">
+                <a:solidFill>
+                  <a:schemeClr val="tx1"/>
+                </a:solidFill>
+                <a:latin typeface="+mn-lt"/>
+                <a:ea typeface="+mn-ea"/>
+                <a:cs typeface="+mn-cs"/>
+              </a:defRPr>
+            </a:lvl6pPr>
+            <a:lvl7pPr marL="2971800" indent="-228600" algn="l" defTabSz="914400" rtl="0" eaLnBrk="1" latinLnBrk="0" hangingPunct="1">
+              <a:lnSpc>
+                <a:spcPct val="90000"/>
+              </a:lnSpc>
+              <a:spcBef>
+                <a:spcPts val="500"/>
+              </a:spcBef>
+              <a:buFont typeface="Arial" panose="020B0604020202020204" pitchFamily="34" charset="0"/>
+              <a:buChar char="•"/>
+              <a:defRPr sz="1800" kern="1200">
+                <a:solidFill>
+                  <a:schemeClr val="tx1"/>
+                </a:solidFill>
+                <a:latin typeface="+mn-lt"/>
+                <a:ea typeface="+mn-ea"/>
+                <a:cs typeface="+mn-cs"/>
+              </a:defRPr>
+            </a:lvl7pPr>
+            <a:lvl8pPr marL="3429000" indent="-228600" algn="l" defTabSz="914400" rtl="0" eaLnBrk="1" latinLnBrk="0" hangingPunct="1">
+              <a:lnSpc>
+                <a:spcPct val="90000"/>
+              </a:lnSpc>
+              <a:spcBef>
+                <a:spcPts val="500"/>
+              </a:spcBef>
+              <a:buFont typeface="Arial" panose="020B0604020202020204" pitchFamily="34" charset="0"/>
+              <a:buChar char="•"/>
+              <a:defRPr sz="1800" kern="1200">
+                <a:solidFill>
+                  <a:schemeClr val="tx1"/>
+                </a:solidFill>
+                <a:latin typeface="+mn-lt"/>
+                <a:ea typeface="+mn-ea"/>
+                <a:cs typeface="+mn-cs"/>
+              </a:defRPr>
+            </a:lvl8pPr>
+            <a:lvl9pPr marL="3886200" indent="-228600" algn="l" defTabSz="914400" rtl="0" eaLnBrk="1" latinLnBrk="0" hangingPunct="1">
+              <a:lnSpc>
+                <a:spcPct val="90000"/>
+              </a:lnSpc>
+              <a:spcBef>
+                <a:spcPts val="500"/>
+              </a:spcBef>
+              <a:buFont typeface="Arial" panose="020B0604020202020204" pitchFamily="34" charset="0"/>
+              <a:buChar char="•"/>
+              <a:defRPr sz="1800" kern="1200">
+                <a:solidFill>
+                  <a:schemeClr val="tx1"/>
+                </a:solidFill>
+                <a:latin typeface="+mn-lt"/>
+                <a:ea typeface="+mn-ea"/>
+                <a:cs typeface="+mn-cs"/>
+              </a:defRPr>
+            </a:lvl9pPr>
+          </a:lstStyle>
+          <a:p>
+            <a:pPr marL="0" indent="0">
+              <a:buNone/>
+            </a:pPr>
+            <a:r>
+              <a:rPr lang="en-US" dirty="0" err="1"/>
+              <a:t>Ántingen</a:t>
+            </a:r>
+            <a:r>
+              <a:rPr lang="en-US" dirty="0"/>
+              <a:t> </a:t>
+            </a:r>
+            <a:r>
+              <a:rPr lang="en-US" dirty="0" err="1"/>
+              <a:t>gör</a:t>
+            </a:r>
+            <a:r>
+              <a:rPr lang="en-US" dirty="0"/>
+              <a:t> </a:t>
+            </a:r>
+            <a:r>
+              <a:rPr lang="en-US" dirty="0" err="1"/>
+              <a:t>en</a:t>
+            </a:r>
+            <a:r>
+              <a:rPr lang="en-US" dirty="0"/>
+              <a:t> </a:t>
+            </a:r>
+            <a:r>
+              <a:rPr lang="en-US" dirty="0" err="1"/>
+              <a:t>Über</a:t>
+            </a:r>
+            <a:r>
+              <a:rPr lang="en-US" dirty="0"/>
+              <a:t> med </a:t>
+            </a:r>
+            <a:r>
+              <a:rPr lang="en-US" dirty="0" err="1"/>
+              <a:t>allas</a:t>
+            </a:r>
+            <a:r>
+              <a:rPr lang="en-US" dirty="0"/>
+              <a:t> abilities </a:t>
+            </a:r>
+            <a:r>
+              <a:rPr lang="en-US" dirty="0" err="1"/>
+              <a:t>combinade</a:t>
+            </a:r>
+            <a:r>
+              <a:rPr lang="en-US" dirty="0"/>
+              <a:t>. Eller </a:t>
+            </a:r>
+            <a:r>
+              <a:rPr lang="en-US" dirty="0" err="1"/>
+              <a:t>simplifiera</a:t>
+            </a:r>
+            <a:r>
+              <a:rPr lang="en-US" dirty="0"/>
+              <a:t> </a:t>
+            </a:r>
+            <a:r>
+              <a:rPr lang="en-US" dirty="0" err="1"/>
+              <a:t>alla</a:t>
+            </a:r>
+            <a:r>
+              <a:rPr lang="en-US" dirty="0"/>
+              <a:t> </a:t>
+            </a:r>
+            <a:r>
+              <a:rPr lang="en-US" dirty="0" err="1"/>
+              <a:t>karaktärer</a:t>
+            </a:r>
+            <a:r>
+              <a:rPr lang="en-US" dirty="0"/>
+              <a:t> </a:t>
+            </a:r>
+            <a:r>
+              <a:rPr lang="en-US" dirty="0" err="1"/>
+              <a:t>och</a:t>
+            </a:r>
+            <a:r>
+              <a:rPr lang="en-US" dirty="0"/>
+              <a:t> </a:t>
+            </a:r>
+            <a:r>
+              <a:rPr lang="en-US" dirty="0" err="1"/>
+              <a:t>gör</a:t>
+            </a:r>
+            <a:r>
+              <a:rPr lang="en-US" dirty="0"/>
+              <a:t> </a:t>
+            </a:r>
+            <a:r>
+              <a:rPr lang="en-US" dirty="0" err="1"/>
+              <a:t>allting</a:t>
+            </a:r>
+            <a:r>
+              <a:rPr lang="en-US" dirty="0"/>
+              <a:t> </a:t>
+            </a:r>
+            <a:r>
+              <a:rPr lang="en-US" dirty="0" err="1"/>
+              <a:t>helt</a:t>
+            </a:r>
+            <a:r>
+              <a:rPr lang="en-US" dirty="0"/>
+              <a:t> </a:t>
+            </a:r>
+            <a:r>
+              <a:rPr lang="en-US" dirty="0" err="1"/>
+              <a:t>klart</a:t>
+            </a:r>
+            <a:r>
+              <a:rPr lang="en-US" dirty="0"/>
+              <a:t>. </a:t>
+            </a:r>
+          </a:p>
+          <a:p>
+            <a:pPr marL="0" indent="0">
+              <a:buNone/>
+            </a:pPr>
+            <a:endParaRPr lang="en-US" dirty="0"/>
+          </a:p>
+          <a:p>
+            <a:pPr marL="0" indent="0">
+              <a:buNone/>
+            </a:pPr>
+            <a:r>
+              <a:rPr lang="en-US" dirty="0"/>
+              <a:t>MVP </a:t>
+            </a:r>
+            <a:r>
+              <a:rPr lang="en-US" dirty="0" err="1"/>
+              <a:t>är</a:t>
+            </a:r>
+            <a:r>
+              <a:rPr lang="en-US" dirty="0"/>
+              <a:t> </a:t>
+            </a:r>
+            <a:r>
+              <a:rPr lang="en-US" dirty="0" err="1"/>
+              <a:t>en</a:t>
+            </a:r>
+            <a:r>
+              <a:rPr lang="en-US" dirty="0"/>
+              <a:t> </a:t>
+            </a:r>
+            <a:r>
+              <a:rPr lang="en-US" dirty="0" err="1"/>
+              <a:t>Über</a:t>
+            </a:r>
+            <a:r>
+              <a:rPr lang="en-US" dirty="0"/>
+              <a:t> </a:t>
+            </a:r>
+            <a:r>
+              <a:rPr lang="en-US" dirty="0" err="1"/>
+              <a:t>delad</a:t>
+            </a:r>
+            <a:r>
+              <a:rPr lang="en-US" dirty="0"/>
+              <a:t> </a:t>
+            </a:r>
+            <a:r>
+              <a:rPr lang="en-US" dirty="0" err="1"/>
+              <a:t>upp</a:t>
+            </a:r>
+            <a:r>
+              <a:rPr lang="en-US" dirty="0"/>
+              <a:t> </a:t>
+            </a:r>
+            <a:r>
+              <a:rPr lang="en-US" dirty="0" err="1"/>
+              <a:t>på</a:t>
+            </a:r>
+            <a:r>
+              <a:rPr lang="en-US" dirty="0"/>
+              <a:t> </a:t>
+            </a:r>
+            <a:r>
+              <a:rPr lang="en-US" dirty="0" err="1"/>
+              <a:t>tre</a:t>
+            </a:r>
+            <a:r>
+              <a:rPr lang="en-US" dirty="0"/>
+              <a:t> </a:t>
+            </a:r>
+            <a:r>
+              <a:rPr lang="en-US" dirty="0" err="1"/>
+              <a:t>spelare</a:t>
+            </a:r>
+            <a:r>
+              <a:rPr lang="en-US" dirty="0"/>
+              <a:t> </a:t>
+            </a:r>
+            <a:r>
+              <a:rPr lang="en-US" dirty="0" err="1"/>
+              <a:t>och</a:t>
+            </a:r>
+            <a:r>
+              <a:rPr lang="en-US" dirty="0"/>
+              <a:t> </a:t>
+            </a:r>
+            <a:r>
+              <a:rPr lang="en-US" dirty="0" err="1"/>
+              <a:t>en</a:t>
+            </a:r>
+            <a:r>
+              <a:rPr lang="en-US" dirty="0"/>
+              <a:t> environment </a:t>
+            </a:r>
+            <a:r>
+              <a:rPr lang="en-US" dirty="0" err="1"/>
+              <a:t>att</a:t>
+            </a:r>
+            <a:r>
+              <a:rPr lang="en-US" dirty="0"/>
+              <a:t> ta sig </a:t>
+            </a:r>
+            <a:r>
+              <a:rPr lang="en-US" dirty="0" err="1"/>
+              <a:t>igenom</a:t>
+            </a:r>
+            <a:r>
+              <a:rPr lang="en-US" dirty="0"/>
+              <a:t>. Team spirit </a:t>
+            </a:r>
+            <a:r>
+              <a:rPr lang="en-US" dirty="0" err="1"/>
+              <a:t>som</a:t>
+            </a:r>
+            <a:r>
+              <a:rPr lang="en-US" dirty="0"/>
+              <a:t> </a:t>
+            </a:r>
+            <a:r>
+              <a:rPr lang="en-US" dirty="0" err="1"/>
+              <a:t>är</a:t>
+            </a:r>
+            <a:r>
+              <a:rPr lang="en-US" dirty="0"/>
+              <a:t> </a:t>
+            </a:r>
+            <a:r>
+              <a:rPr lang="en-US" dirty="0" err="1"/>
+              <a:t>logisk</a:t>
+            </a:r>
+            <a:r>
+              <a:rPr lang="en-US" dirty="0"/>
+              <a:t> </a:t>
+            </a:r>
+            <a:r>
+              <a:rPr lang="en-US" dirty="0" err="1"/>
+              <a:t>även</a:t>
+            </a:r>
+            <a:r>
+              <a:rPr lang="en-US" dirty="0"/>
+              <a:t> </a:t>
+            </a:r>
+            <a:r>
+              <a:rPr lang="en-US" dirty="0" err="1"/>
+              <a:t>mött</a:t>
+            </a:r>
+            <a:r>
+              <a:rPr lang="en-US" dirty="0"/>
+              <a:t> med </a:t>
+            </a:r>
+            <a:r>
+              <a:rPr lang="en-US" dirty="0" err="1"/>
+              <a:t>byggd</a:t>
+            </a:r>
+            <a:r>
+              <a:rPr lang="en-US" dirty="0"/>
+              <a:t> environment </a:t>
+            </a:r>
+            <a:r>
+              <a:rPr lang="en-US" dirty="0" err="1"/>
+              <a:t>utan</a:t>
+            </a:r>
+            <a:r>
+              <a:rPr lang="en-US" dirty="0"/>
+              <a:t> </a:t>
+            </a:r>
+            <a:r>
+              <a:rPr lang="en-US" dirty="0" err="1"/>
+              <a:t>att</a:t>
+            </a:r>
+            <a:r>
+              <a:rPr lang="en-US" dirty="0"/>
+              <a:t> ha </a:t>
+            </a:r>
+            <a:r>
+              <a:rPr lang="en-US" dirty="0" err="1"/>
+              <a:t>ett</a:t>
+            </a:r>
+            <a:r>
+              <a:rPr lang="en-US" dirty="0"/>
+              <a:t> enemy team </a:t>
+            </a:r>
+            <a:r>
+              <a:rPr lang="en-US" dirty="0" err="1"/>
+              <a:t>att</a:t>
+            </a:r>
+            <a:r>
+              <a:rPr lang="en-US" dirty="0"/>
+              <a:t> </a:t>
+            </a:r>
+            <a:r>
+              <a:rPr lang="en-US" dirty="0" err="1"/>
+              <a:t>tänka</a:t>
+            </a:r>
+            <a:r>
+              <a:rPr lang="en-US" dirty="0"/>
+              <a:t> </a:t>
+            </a:r>
+            <a:r>
+              <a:rPr lang="en-US" dirty="0" err="1"/>
+              <a:t>på</a:t>
+            </a:r>
+            <a:r>
+              <a:rPr lang="en-US" dirty="0"/>
+              <a:t>. </a:t>
+            </a:r>
+          </a:p>
+          <a:p>
+            <a:pPr marL="0" indent="0">
+              <a:buNone/>
+            </a:pPr>
+            <a:endParaRPr lang="en-US" dirty="0"/>
+          </a:p>
+          <a:p>
+            <a:pPr marL="0" indent="0">
+              <a:buNone/>
+            </a:pPr>
+            <a:r>
+              <a:rPr lang="en-US" dirty="0" err="1"/>
+              <a:t>Proplist</a:t>
+            </a:r>
+            <a:r>
+              <a:rPr lang="en-US" dirty="0"/>
+              <a:t> environment. Med </a:t>
+            </a:r>
+            <a:r>
+              <a:rPr lang="en-US" dirty="0" err="1"/>
+              <a:t>animationer</a:t>
+            </a:r>
+            <a:r>
+              <a:rPr lang="en-US" dirty="0"/>
+              <a:t> </a:t>
+            </a:r>
+            <a:r>
+              <a:rPr lang="en-US" dirty="0" err="1"/>
+              <a:t>o.s.v</a:t>
+            </a:r>
+            <a:r>
+              <a:rPr lang="en-US" dirty="0"/>
+              <a:t>. </a:t>
+            </a:r>
+          </a:p>
+          <a:p>
+            <a:pPr marL="0" indent="0">
+              <a:buNone/>
+            </a:pPr>
+            <a:endParaRPr lang="en-US" dirty="0"/>
+          </a:p>
+          <a:p>
+            <a:pPr marL="0" indent="0">
+              <a:buNone/>
+            </a:pPr>
+            <a:r>
+              <a:rPr lang="en-US" dirty="0" err="1"/>
+              <a:t>Hur</a:t>
+            </a:r>
+            <a:r>
+              <a:rPr lang="en-US" dirty="0"/>
+              <a:t> </a:t>
+            </a:r>
+            <a:r>
+              <a:rPr lang="en-US" dirty="0" err="1"/>
+              <a:t>kommunicerar</a:t>
+            </a:r>
+            <a:r>
+              <a:rPr lang="en-US" dirty="0"/>
+              <a:t> man </a:t>
+            </a:r>
+            <a:r>
+              <a:rPr lang="en-US" dirty="0" err="1"/>
+              <a:t>utan</a:t>
+            </a:r>
+            <a:r>
+              <a:rPr lang="en-US" dirty="0"/>
+              <a:t> text? </a:t>
+            </a:r>
+            <a:r>
+              <a:rPr lang="en-US" dirty="0" err="1"/>
+              <a:t>Ljud</a:t>
+            </a:r>
+            <a:r>
+              <a:rPr lang="en-US" dirty="0"/>
+              <a:t>, </a:t>
+            </a:r>
+            <a:r>
+              <a:rPr lang="en-US" dirty="0" err="1"/>
+              <a:t>tecken</a:t>
+            </a:r>
+            <a:r>
+              <a:rPr lang="en-US" dirty="0"/>
+              <a:t>, </a:t>
+            </a:r>
+            <a:r>
+              <a:rPr lang="en-US" dirty="0" err="1"/>
+              <a:t>symboler</a:t>
+            </a:r>
+            <a:r>
+              <a:rPr lang="en-US" dirty="0"/>
+              <a:t>, </a:t>
+            </a:r>
+            <a:r>
+              <a:rPr lang="en-US" dirty="0" err="1"/>
+              <a:t>färger</a:t>
+            </a:r>
+            <a:r>
+              <a:rPr lang="en-US" dirty="0"/>
+              <a:t>, monster, </a:t>
+            </a:r>
+            <a:r>
+              <a:rPr lang="en-US" dirty="0" err="1"/>
+              <a:t>animationer</a:t>
+            </a:r>
+            <a:r>
+              <a:rPr lang="en-US" dirty="0"/>
+              <a:t>, etc.</a:t>
+            </a:r>
+          </a:p>
+          <a:p>
+            <a:pPr marL="0" indent="0">
+              <a:buNone/>
+            </a:pPr>
+            <a:r>
+              <a:rPr lang="en-US" dirty="0" err="1"/>
+              <a:t>Semiotik</a:t>
+            </a:r>
+            <a:r>
+              <a:rPr lang="en-US" dirty="0"/>
+              <a:t> m. Johan, Mika. </a:t>
+            </a:r>
+          </a:p>
+          <a:p>
+            <a:pPr marL="0" indent="0">
+              <a:buNone/>
+            </a:pPr>
+            <a:endParaRPr lang="en-US" dirty="0"/>
+          </a:p>
+          <a:p>
+            <a:pPr marL="0" indent="0">
+              <a:buNone/>
+            </a:pPr>
+            <a:r>
+              <a:rPr lang="en-US" dirty="0" err="1"/>
+              <a:t>Hur</a:t>
+            </a:r>
+            <a:r>
+              <a:rPr lang="en-US" dirty="0"/>
+              <a:t> ser </a:t>
+            </a:r>
+            <a:r>
+              <a:rPr lang="en-US" dirty="0" err="1"/>
+              <a:t>en</a:t>
+            </a:r>
+            <a:r>
+              <a:rPr lang="en-US" dirty="0"/>
+              <a:t> environment </a:t>
+            </a:r>
+            <a:r>
+              <a:rPr lang="en-US" dirty="0" err="1"/>
+              <a:t>ut</a:t>
+            </a:r>
+            <a:r>
+              <a:rPr lang="en-US" dirty="0"/>
+              <a:t> </a:t>
+            </a:r>
+            <a:r>
+              <a:rPr lang="en-US" dirty="0" err="1"/>
+              <a:t>för</a:t>
+            </a:r>
+            <a:r>
+              <a:rPr lang="en-US" dirty="0"/>
+              <a:t> </a:t>
+            </a:r>
+            <a:r>
+              <a:rPr lang="en-US" dirty="0" err="1"/>
+              <a:t>varje</a:t>
+            </a:r>
+            <a:r>
+              <a:rPr lang="en-US" dirty="0"/>
+              <a:t> individual </a:t>
+            </a:r>
+            <a:r>
+              <a:rPr lang="en-US" dirty="0" err="1"/>
+              <a:t>spelare</a:t>
+            </a:r>
+            <a:r>
+              <a:rPr lang="en-US" dirty="0"/>
+              <a:t>?</a:t>
+            </a:r>
+          </a:p>
+          <a:p>
+            <a:pPr marL="0" indent="0">
+              <a:buNone/>
+            </a:pPr>
+            <a:endParaRPr lang="en-US" dirty="0"/>
+          </a:p>
+          <a:p>
+            <a:pPr marL="0" indent="0">
+              <a:buNone/>
+            </a:pPr>
+            <a:endParaRPr lang="en-US" dirty="0"/>
+          </a:p>
+        </p:txBody>
+      </p:sp>
+      <p:sp>
+        <p:nvSpPr>
+          <p:cNvPr id="6" name="Title 5">
+            <a:extLst>
+              <a:ext uri="{FF2B5EF4-FFF2-40B4-BE49-F238E27FC236}">
+                <a16:creationId xmlns:a16="http://schemas.microsoft.com/office/drawing/2014/main" id="{A84D53AD-E875-4B12-B0FE-C25FDF46F8D0}"/>
+              </a:ext>
+            </a:extLst>
+          </p:cNvPr>
+          <p:cNvSpPr>
+            <a:spLocks noGrp="1"/>
+          </p:cNvSpPr>
+          <p:nvPr>
+            <p:ph type="title"/>
+          </p:nvPr>
+        </p:nvSpPr>
+        <p:spPr>
+          <a:xfrm>
+            <a:off x="284285" y="6858000"/>
+            <a:ext cx="10515600" cy="1325563"/>
+          </a:xfrm>
+        </p:spPr>
+        <p:txBody>
+          <a:bodyPr/>
+          <a:lstStyle/>
+          <a:p>
+            <a:endParaRPr lang="en-US" dirty="0"/>
+          </a:p>
+        </p:txBody>
+      </p:sp>
+    </p:spTree>
+    <p:extLst>
+      <p:ext uri="{BB962C8B-B14F-4D97-AF65-F5344CB8AC3E}">
+        <p14:creationId xmlns:p14="http://schemas.microsoft.com/office/powerpoint/2010/main" val="304454630"/>
+      </p:ext>
+    </p:extLst>
+  </p:cSld>
+  <p:clrMapOvr>
+    <a:masterClrMapping/>
+  </p:clrMapOvr>
+</p:sld>
+</file>
+
 <file path=ppt/slides/slide2.xml><?xml version="1.0" encoding="utf-8"?>
 <p:sld xmlns:a="http://schemas.openxmlformats.org/drawingml/2006/main" xmlns:r="http://schemas.openxmlformats.org/officeDocument/2006/relationships" xmlns:p="http://schemas.openxmlformats.org/presentationml/2006/main">
   <p:cSld>
@@ -5707,7 +7504,7 @@
           <a:p>
             <a:r>
               <a:rPr lang="en-US" dirty="0"/>
-              <a:t>Top down RTS/</a:t>
+              <a:t>RTS/</a:t>
             </a:r>
             <a:r>
               <a:rPr lang="en-US" dirty="0" err="1"/>
@@ -5715,7 +7512,7 @@
             </a:r>
             <a:r>
               <a:rPr lang="en-US" dirty="0"/>
-              <a:t> view</a:t>
+              <a:t> camera, asymmetric </a:t>
             </a:r>
           </a:p>
           <a:p>
@@ -6195,7 +7992,7 @@
         </p:nvSpPr>
         <p:spPr>
           <a:xfrm>
-            <a:off x="839788" y="2057400"/>
+            <a:off x="836612" y="1855177"/>
             <a:ext cx="3932237" cy="3811588"/>
           </a:xfrm>
         </p:spPr>
@@ -6204,29 +8001,29 @@
           <a:lstStyle/>
           <a:p>
             <a:r>
-              <a:rPr lang="en-US"/>
+              <a:rPr lang="en-US" dirty="0"/>
               <a:t>All characters are invisible unless pinged by </a:t>
             </a:r>
             <a:r>
-              <a:rPr lang="en-US" i="1"/>
+              <a:rPr lang="en-US" i="1" dirty="0"/>
               <a:t>Settler</a:t>
             </a:r>
             <a:r>
-              <a:rPr lang="en-US"/>
+              <a:rPr lang="en-US" dirty="0"/>
               <a:t> or sensed by a burrowed </a:t>
             </a:r>
             <a:r>
-              <a:rPr lang="en-US" i="1"/>
+              <a:rPr lang="en-US" i="1" dirty="0"/>
               <a:t>Blocker</a:t>
             </a:r>
             <a:r>
-              <a:rPr lang="en-US"/>
+              <a:rPr lang="en-US" dirty="0"/>
               <a:t>. </a:t>
             </a:r>
           </a:p>
           <a:p>
             <a:r>
-              <a:rPr lang="en-US"/>
+              <a:rPr lang="en-US" dirty="0"/>
               <a:t>Or low field of vision</a:t>
             </a:r>
           </a:p>
@@ -6236,7 +8033,7 @@
               <a:buChar char="•"/>
             </a:pPr>
             <a:r>
-              <a:rPr lang="en-US"/>
+              <a:rPr lang="en-US" dirty="0"/>
               <a:t>Dark</a:t>
             </a:r>
           </a:p>
@@ -6246,7 +8043,7 @@
               <a:buChar char="•"/>
             </a:pPr>
             <a:r>
-              <a:rPr lang="en-US"/>
+              <a:rPr lang="en-US" dirty="0"/>
               <a:t>Lost saturation</a:t>
             </a:r>
           </a:p>
@@ -6256,7 +8053,7 @@
               <a:buChar char="•"/>
             </a:pPr>
             <a:r>
-              <a:rPr lang="en-US"/>
+              <a:rPr lang="en-US" dirty="0"/>
               <a:t>Fog of war</a:t>
             </a:r>
           </a:p>
@@ -6266,19 +8063,19 @@
               <a:buChar char="•"/>
             </a:pPr>
             <a:r>
-              <a:rPr lang="en-US"/>
+              <a:rPr lang="en-US" dirty="0"/>
               <a:t>Less LOD</a:t>
             </a:r>
           </a:p>
           <a:p>
             <a:r>
-              <a:rPr lang="en-US"/>
+              <a:rPr lang="en-US" dirty="0"/>
               <a:t>Or tricky terrain</a:t>
             </a:r>
           </a:p>
           <a:p>
             <a:r>
-              <a:rPr lang="en-US"/>
+              <a:rPr lang="en-US" dirty="0"/>
               <a:t>Or </a:t>
             </a:r>
           </a:p>
@@ -6993,6 +8790,12 @@
           <a:p>
             <a:endParaRPr lang="sv-SE" dirty="0"/>
           </a:p>
+          <a:p>
+            <a:r>
+              <a:rPr lang="sv-SE" dirty="0"/>
+              <a:t>Care for not making him too brown. Add some elements of brown</a:t>
+            </a:r>
+          </a:p>
         </p:txBody>
       </p:sp>
     </p:spTree>
@@ -7143,8 +8946,12 @@
           </a:p>
           <a:p>
             <a:r>
-              <a:rPr lang="en-US" dirty="0"/>
-              <a:t>Has the ability to drag enemies in an area together into one spot </a:t>
+              <a:rPr lang="en-US" b="1" dirty="0"/>
+              <a:t>Secondary Ability: </a:t>
+            </a:r>
+            <a:r>
+              <a:rPr lang="en-US" dirty="0"/>
+              <a:t>Has the ability to drag enemies in an area together into one spot. </a:t>
             </a:r>
           </a:p>
           <a:p>
@@ -7458,4 +9265,299 @@
     </a:ext>
   </a:extLst>
 </a:theme>
+</file>
+
+<file path=ppt/theme/theme2.xml><?xml version="1.0" encoding="utf-8"?>
+<a:theme xmlns:a="http://schemas.openxmlformats.org/drawingml/2006/main" name="Office Theme">
+  <a:themeElements>
+    <a:clrScheme name="Office">
+      <a:dk1>
+        <a:sysClr val="windowText" lastClr="000000"/>
+      </a:dk1>
+      <a:lt1>
+        <a:sysClr val="window" lastClr="FFFFFF"/>
+      </a:lt1>
+      <a:dk2>
+        <a:srgbClr val="44546A"/>
+      </a:dk2>
+      <a:lt2>
+        <a:srgbClr val="E7E6E6"/>
+      </a:lt2>
+      <a:accent1>
+        <a:srgbClr val="4472C4"/>
+      </a:accent1>
+      <a:accent2>
+        <a:srgbClr val="ED7D31"/>
+      </a:accent2>
+      <a:accent3>
+        <a:srgbClr val="A5A5A5"/>
+      </a:accent3>
+      <a:accent4>
+        <a:srgbClr val="FFC000"/>
+      </a:accent4>
+      <a:accent5>
+        <a:srgbClr val="5B9BD5"/>
+      </a:accent5>
+      <a:accent6>
+        <a:srgbClr val="70AD47"/>
+      </a:accent6>
+      <a:hlink>
+        <a:srgbClr val="0563C1"/>
+      </a:hlink>
+      <a:folHlink>
+        <a:srgbClr val="954F72"/>
+      </a:folHlink>
+    </a:clrScheme>
+    <a:fontScheme name="Office">
+      <a:majorFont>
+        <a:latin typeface="Calibri Light" panose="020F0302020204030204"/>
+        <a:ea typeface=""/>
+        <a:cs typeface=""/>
+        <a:font script="Jpan" typeface="游ゴシック Light"/>
+        <a:font script="Hang" typeface="맑은 고딕"/>
+        <a:font script="Hans" typeface="等线 Light"/>
+        <a:font script="Hant" typeface="新細明體"/>
+        <a:font script="Arab" typeface="Times New Roman"/>
+        <a:font script="Hebr" typeface="Times New Roman"/>
+        <a:font script="Thai" typeface="Angsana New"/>
+        <a:font script="Ethi" typeface="Nyala"/>
+        <a:font script="Beng" typeface="Vrinda"/>
+        <a:font script="Gujr" typeface="Shruti"/>
+        <a:font script="Khmr" typeface="MoolBoran"/>
+        <a:font script="Knda" typeface="Tunga"/>
+        <a:font script="Guru" typeface="Raavi"/>
+        <a:font script="Cans" typeface="Euphemia"/>
+        <a:font script="Cher" typeface="Plantagenet Cherokee"/>
+        <a:font script="Yiii" typeface="Microsoft Yi Baiti"/>
+        <a:font script="Tibt" typeface="Microsoft Himalaya"/>
+        <a:font script="Thaa" typeface="MV Boli"/>
+        <a:font script="Deva" typeface="Mangal"/>
+        <a:font script="Telu" typeface="Gautami"/>
+        <a:font script="Taml" typeface="Latha"/>
+        <a:font script="Syrc" typeface="Estrangelo Edessa"/>
+        <a:font script="Orya" typeface="Kalinga"/>
+        <a:font script="Mlym" typeface="Kartika"/>
+        <a:font script="Laoo" typeface="DokChampa"/>
+        <a:font script="Sinh" typeface="Iskoola Pota"/>
+        <a:font script="Mong" typeface="Mongolian Baiti"/>
+        <a:font script="Viet" typeface="Times New Roman"/>
+        <a:font script="Uigh" typeface="Microsoft Uighur"/>
+        <a:font script="Geor" typeface="Sylfaen"/>
+        <a:font script="Armn" typeface="Arial"/>
+        <a:font script="Bugi" typeface="Leelawadee UI"/>
+        <a:font script="Bopo" typeface="Microsoft JhengHei"/>
+        <a:font script="Java" typeface="Javanese Text"/>
+        <a:font script="Lisu" typeface="Segoe UI"/>
+        <a:font script="Mymr" typeface="Myanmar Text"/>
+        <a:font script="Nkoo" typeface="Ebrima"/>
+        <a:font script="Olck" typeface="Nirmala UI"/>
+        <a:font script="Osma" typeface="Ebrima"/>
+        <a:font script="Phag" typeface="Phagspa"/>
+        <a:font script="Syrn" typeface="Estrangelo Edessa"/>
+        <a:font script="Syrj" typeface="Estrangelo Edessa"/>
+        <a:font script="Syre" typeface="Estrangelo Edessa"/>
+        <a:font script="Sora" typeface="Nirmala UI"/>
+        <a:font script="Tale" typeface="Microsoft Tai Le"/>
+        <a:font script="Talu" typeface="Microsoft New Tai Lue"/>
+        <a:font script="Tfng" typeface="Ebrima"/>
+      </a:majorFont>
+      <a:minorFont>
+        <a:latin typeface="Calibri" panose="020F0502020204030204"/>
+        <a:ea typeface=""/>
+        <a:cs typeface=""/>
+        <a:font script="Jpan" typeface="游ゴシック"/>
+        <a:font script="Hang" typeface="맑은 고딕"/>
+        <a:font script="Hans" typeface="等线"/>
+        <a:font script="Hant" typeface="新細明體"/>
+        <a:font script="Arab" typeface="Arial"/>
+        <a:font script="Hebr" typeface="Arial"/>
+        <a:font script="Thai" typeface="Cordia New"/>
+        <a:font script="Ethi" typeface="Nyala"/>
+        <a:font script="Beng" typeface="Vrinda"/>
+        <a:font script="Gujr" typeface="Shruti"/>
+        <a:font script="Khmr" typeface="DaunPenh"/>
+        <a:font script="Knda" typeface="Tunga"/>
+        <a:font script="Guru" typeface="Raavi"/>
+        <a:font script="Cans" typeface="Euphemia"/>
+        <a:font script="Cher" typeface="Plantagenet Cherokee"/>
+        <a:font script="Yiii" typeface="Microsoft Yi Baiti"/>
+        <a:font script="Tibt" typeface="Microsoft Himalaya"/>
+        <a:font script="Thaa" typeface="MV Boli"/>
+        <a:font script="Deva" typeface="Mangal"/>
+        <a:font script="Telu" typeface="Gautami"/>
+        <a:font script="Taml" typeface="Latha"/>
+        <a:font script="Syrc" typeface="Estrangelo Edessa"/>
+        <a:font script="Orya" typeface="Kalinga"/>
+        <a:font script="Mlym" typeface="Kartika"/>
+        <a:font script="Laoo" typeface="DokChampa"/>
+        <a:font script="Sinh" typeface="Iskoola Pota"/>
+        <a:font script="Mong" typeface="Mongolian Baiti"/>
+        <a:font script="Viet" typeface="Arial"/>
+        <a:font script="Uigh" typeface="Microsoft Uighur"/>
+        <a:font script="Geor" typeface="Sylfaen"/>
+        <a:font script="Armn" typeface="Arial"/>
+        <a:font script="Bugi" typeface="Leelawadee UI"/>
+        <a:font script="Bopo" typeface="Microsoft JhengHei"/>
+        <a:font script="Java" typeface="Javanese Text"/>
+        <a:font script="Lisu" typeface="Segoe UI"/>
+        <a:font script="Mymr" typeface="Myanmar Text"/>
+        <a:font script="Nkoo" typeface="Ebrima"/>
+        <a:font script="Olck" typeface="Nirmala UI"/>
+        <a:font script="Osma" typeface="Ebrima"/>
+        <a:font script="Phag" typeface="Phagspa"/>
+        <a:font script="Syrn" typeface="Estrangelo Edessa"/>
+        <a:font script="Syrj" typeface="Estrangelo Edessa"/>
+        <a:font script="Syre" typeface="Estrangelo Edessa"/>
+        <a:font script="Sora" typeface="Nirmala UI"/>
+        <a:font script="Tale" typeface="Microsoft Tai Le"/>
+        <a:font script="Talu" typeface="Microsoft New Tai Lue"/>
+        <a:font script="Tfng" typeface="Ebrima"/>
+      </a:minorFont>
+    </a:fontScheme>
+    <a:fmtScheme name="Office">
+      <a:fillStyleLst>
+        <a:solidFill>
+          <a:schemeClr val="phClr"/>
+        </a:solidFill>
+        <a:gradFill rotWithShape="1">
+          <a:gsLst>
+            <a:gs pos="0">
+              <a:schemeClr val="phClr">
+                <a:lumMod val="110000"/>
+                <a:satMod val="105000"/>
+                <a:tint val="67000"/>
+              </a:schemeClr>
+            </a:gs>
+            <a:gs pos="50000">
+              <a:schemeClr val="phClr">
+                <a:lumMod val="105000"/>
+                <a:satMod val="103000"/>
+                <a:tint val="73000"/>
+              </a:schemeClr>
+            </a:gs>
+            <a:gs pos="100000">
+              <a:schemeClr val="phClr">
+                <a:lumMod val="105000"/>
+                <a:satMod val="109000"/>
+                <a:tint val="81000"/>
+              </a:schemeClr>
+            </a:gs>
+          </a:gsLst>
+          <a:lin ang="5400000" scaled="0"/>
+        </a:gradFill>
+        <a:gradFill rotWithShape="1">
+          <a:gsLst>
+            <a:gs pos="0">
+              <a:schemeClr val="phClr">
+                <a:satMod val="103000"/>
+                <a:lumMod val="102000"/>
+                <a:tint val="94000"/>
+              </a:schemeClr>
+            </a:gs>
+            <a:gs pos="50000">
+              <a:schemeClr val="phClr">
+                <a:satMod val="110000"/>
+                <a:lumMod val="100000"/>
+                <a:shade val="100000"/>
+              </a:schemeClr>
+            </a:gs>
+            <a:gs pos="100000">
+              <a:schemeClr val="phClr">
+                <a:lumMod val="99000"/>
+                <a:satMod val="120000"/>
+                <a:shade val="78000"/>
+              </a:schemeClr>
+            </a:gs>
+          </a:gsLst>
+          <a:lin ang="5400000" scaled="0"/>
+        </a:gradFill>
+      </a:fillStyleLst>
+      <a:lnStyleLst>
+        <a:ln w="6350" cap="flat" cmpd="sng" algn="ctr">
+          <a:solidFill>
+            <a:schemeClr val="phClr"/>
+          </a:solidFill>
+          <a:prstDash val="solid"/>
+          <a:miter lim="800000"/>
+        </a:ln>
+        <a:ln w="12700" cap="flat" cmpd="sng" algn="ctr">
+          <a:solidFill>
+            <a:schemeClr val="phClr"/>
+          </a:solidFill>
+          <a:prstDash val="solid"/>
+          <a:miter lim="800000"/>
+        </a:ln>
+        <a:ln w="19050" cap="flat" cmpd="sng" algn="ctr">
+          <a:solidFill>
+            <a:schemeClr val="phClr"/>
+          </a:solidFill>
+          <a:prstDash val="solid"/>
+          <a:miter lim="800000"/>
+        </a:ln>
+      </a:lnStyleLst>
+      <a:effectStyleLst>
+        <a:effectStyle>
+          <a:effectLst/>
+        </a:effectStyle>
+        <a:effectStyle>
+          <a:effectLst/>
+        </a:effectStyle>
+        <a:effectStyle>
+          <a:effectLst>
+            <a:outerShdw blurRad="57150" dist="19050" dir="5400000" algn="ctr" rotWithShape="0">
+              <a:srgbClr val="000000">
+                <a:alpha val="63000"/>
+              </a:srgbClr>
+            </a:outerShdw>
+          </a:effectLst>
+        </a:effectStyle>
+      </a:effectStyleLst>
+      <a:bgFillStyleLst>
+        <a:solidFill>
+          <a:schemeClr val="phClr"/>
+        </a:solidFill>
+        <a:solidFill>
+          <a:schemeClr val="phClr">
+            <a:tint val="95000"/>
+            <a:satMod val="170000"/>
+          </a:schemeClr>
+        </a:solidFill>
+        <a:gradFill rotWithShape="1">
+          <a:gsLst>
+            <a:gs pos="0">
+              <a:schemeClr val="phClr">
+                <a:tint val="93000"/>
+                <a:satMod val="150000"/>
+                <a:shade val="98000"/>
+                <a:lumMod val="102000"/>
+              </a:schemeClr>
+            </a:gs>
+            <a:gs pos="50000">
+              <a:schemeClr val="phClr">
+                <a:tint val="98000"/>
+                <a:satMod val="130000"/>
+                <a:shade val="90000"/>
+                <a:lumMod val="103000"/>
+              </a:schemeClr>
+            </a:gs>
+            <a:gs pos="100000">
+              <a:schemeClr val="phClr">
+                <a:shade val="63000"/>
+                <a:satMod val="120000"/>
+              </a:schemeClr>
+            </a:gs>
+          </a:gsLst>
+          <a:lin ang="5400000" scaled="0"/>
+        </a:gradFill>
+      </a:bgFillStyleLst>
+    </a:fmtScheme>
+  </a:themeElements>
+  <a:objectDefaults/>
+  <a:extraClrSchemeLst/>
+  <a:extLst>
+    <a:ext uri="{05A4C25C-085E-4340-85A3-A5531E510DB2}">
+      <thm15:themeFamily xmlns:thm15="http://schemas.microsoft.com/office/thememl/2012/main" name="Office Theme" id="{62F939B6-93AF-4DB8-9C6B-D6C7DFDC589F}" vid="{4A3C46E8-61CC-4603-A589-7422A47A8E4A}"/>
+    </a:ext>
+  </a:extLst>
+</a:theme>
 </file>
</xml_diff>

<commit_message>
Logo for not wombo
</commit_message>
<xml_diff>
--- a/Phase 2 - Writing down the details.pptx
+++ b/Phase 2 - Writing down the details.pptx
@@ -242,7 +242,7 @@
           <a:p>
             <a:fld id="{79E66A4A-C2E0-4DF6-9D5C-EB676889AEDC}" type="datetimeFigureOut">
               <a:rPr lang="en-US" smtClean="0"/>
-              <a:t>2/4/2019</a:t>
+              <a:t>2/5/2019</a:t>
             </a:fld>
             <a:endParaRPr lang="en-US"/>
           </a:p>
@@ -742,7 +742,7 @@
           <a:p>
             <a:fld id="{F1B00FCE-A7A8-443A-ABD2-F1E5E91ABEB0}" type="datetimeFigureOut">
               <a:rPr lang="sv-SE" smtClean="0"/>
-              <a:t>2019-02-04</a:t>
+              <a:t>2019-02-05</a:t>
             </a:fld>
             <a:endParaRPr lang="sv-SE"/>
           </a:p>
@@ -942,7 +942,7 @@
           <a:p>
             <a:fld id="{F1B00FCE-A7A8-443A-ABD2-F1E5E91ABEB0}" type="datetimeFigureOut">
               <a:rPr lang="sv-SE" smtClean="0"/>
-              <a:t>2019-02-04</a:t>
+              <a:t>2019-02-05</a:t>
             </a:fld>
             <a:endParaRPr lang="sv-SE"/>
           </a:p>
@@ -1152,7 +1152,7 @@
           <a:p>
             <a:fld id="{F1B00FCE-A7A8-443A-ABD2-F1E5E91ABEB0}" type="datetimeFigureOut">
               <a:rPr lang="sv-SE" smtClean="0"/>
-              <a:t>2019-02-04</a:t>
+              <a:t>2019-02-05</a:t>
             </a:fld>
             <a:endParaRPr lang="sv-SE"/>
           </a:p>
@@ -1352,7 +1352,7 @@
           <a:p>
             <a:fld id="{F1B00FCE-A7A8-443A-ABD2-F1E5E91ABEB0}" type="datetimeFigureOut">
               <a:rPr lang="sv-SE" smtClean="0"/>
-              <a:t>2019-02-04</a:t>
+              <a:t>2019-02-05</a:t>
             </a:fld>
             <a:endParaRPr lang="sv-SE"/>
           </a:p>
@@ -1628,7 +1628,7 @@
           <a:p>
             <a:fld id="{F1B00FCE-A7A8-443A-ABD2-F1E5E91ABEB0}" type="datetimeFigureOut">
               <a:rPr lang="sv-SE" smtClean="0"/>
-              <a:t>2019-02-04</a:t>
+              <a:t>2019-02-05</a:t>
             </a:fld>
             <a:endParaRPr lang="sv-SE"/>
           </a:p>
@@ -1896,7 +1896,7 @@
           <a:p>
             <a:fld id="{F1B00FCE-A7A8-443A-ABD2-F1E5E91ABEB0}" type="datetimeFigureOut">
               <a:rPr lang="sv-SE" smtClean="0"/>
-              <a:t>2019-02-04</a:t>
+              <a:t>2019-02-05</a:t>
             </a:fld>
             <a:endParaRPr lang="sv-SE"/>
           </a:p>
@@ -2311,7 +2311,7 @@
           <a:p>
             <a:fld id="{F1B00FCE-A7A8-443A-ABD2-F1E5E91ABEB0}" type="datetimeFigureOut">
               <a:rPr lang="sv-SE" smtClean="0"/>
-              <a:t>2019-02-04</a:t>
+              <a:t>2019-02-05</a:t>
             </a:fld>
             <a:endParaRPr lang="sv-SE"/>
           </a:p>
@@ -2453,7 +2453,7 @@
           <a:p>
             <a:fld id="{F1B00FCE-A7A8-443A-ABD2-F1E5E91ABEB0}" type="datetimeFigureOut">
               <a:rPr lang="sv-SE" smtClean="0"/>
-              <a:t>2019-02-04</a:t>
+              <a:t>2019-02-05</a:t>
             </a:fld>
             <a:endParaRPr lang="sv-SE"/>
           </a:p>
@@ -2566,7 +2566,7 @@
           <a:p>
             <a:fld id="{F1B00FCE-A7A8-443A-ABD2-F1E5E91ABEB0}" type="datetimeFigureOut">
               <a:rPr lang="sv-SE" smtClean="0"/>
-              <a:t>2019-02-04</a:t>
+              <a:t>2019-02-05</a:t>
             </a:fld>
             <a:endParaRPr lang="sv-SE"/>
           </a:p>
@@ -2879,7 +2879,7 @@
           <a:p>
             <a:fld id="{F1B00FCE-A7A8-443A-ABD2-F1E5E91ABEB0}" type="datetimeFigureOut">
               <a:rPr lang="sv-SE" smtClean="0"/>
-              <a:t>2019-02-04</a:t>
+              <a:t>2019-02-05</a:t>
             </a:fld>
             <a:endParaRPr lang="sv-SE"/>
           </a:p>
@@ -3168,7 +3168,7 @@
           <a:p>
             <a:fld id="{F1B00FCE-A7A8-443A-ABD2-F1E5E91ABEB0}" type="datetimeFigureOut">
               <a:rPr lang="sv-SE" smtClean="0"/>
-              <a:t>2019-02-04</a:t>
+              <a:t>2019-02-05</a:t>
             </a:fld>
             <a:endParaRPr lang="sv-SE"/>
           </a:p>
@@ -3411,7 +3411,7 @@
           <a:p>
             <a:fld id="{F1B00FCE-A7A8-443A-ABD2-F1E5E91ABEB0}" type="datetimeFigureOut">
               <a:rPr lang="sv-SE" smtClean="0"/>
-              <a:t>2019-02-04</a:t>
+              <a:t>2019-02-05</a:t>
             </a:fld>
             <a:endParaRPr lang="sv-SE"/>
           </a:p>
@@ -7539,9 +7539,10 @@
               <a:rPr lang="en-US" i="1" dirty="0"/>
               <a:t>Team Spirit</a:t>
             </a:r>
-          </a:p>
-          <a:p>
-            <a:endParaRPr lang="sv-SE" dirty="0"/>
+            <a:endParaRPr lang="sv-SE" i="1" dirty="0"/>
+          </a:p>
+          <a:p>
+            <a:endParaRPr lang="en-US" i="1" dirty="0"/>
           </a:p>
         </p:txBody>
       </p:sp>
@@ -8724,7 +8725,7 @@
         </p:blipFill>
         <p:spPr>
           <a:xfrm>
-            <a:off x="5379741" y="1706969"/>
+            <a:off x="5379741" y="1607185"/>
             <a:ext cx="6130922" cy="3643630"/>
           </a:xfrm>
         </p:spPr>

</xml_diff>